<commit_message>
added start to presentation
</commit_message>
<xml_diff>
--- a/Presentation.pptx
+++ b/Presentation.pptx
@@ -14,9 +14,12 @@
     <p:sldId id="262" r:id="rId8"/>
     <p:sldId id="263" r:id="rId9"/>
     <p:sldId id="260" r:id="rId10"/>
-    <p:sldId id="261" r:id="rId11"/>
-    <p:sldId id="268" r:id="rId12"/>
-    <p:sldId id="257" r:id="rId13"/>
+    <p:sldId id="272" r:id="rId11"/>
+    <p:sldId id="270" r:id="rId12"/>
+    <p:sldId id="261" r:id="rId13"/>
+    <p:sldId id="268" r:id="rId14"/>
+    <p:sldId id="271" r:id="rId15"/>
+    <p:sldId id="257" r:id="rId16"/>
   </p:sldIdLst>
   <p:sldSz cx="12192000" cy="6858000"/>
   <p:notesSz cx="6858000" cy="9144000"/>
@@ -115,6 +118,11 @@
       </a:defRPr>
     </a:lvl9pPr>
   </p:defaultTextStyle>
+  <p:extLst>
+    <p:ext uri="{EFAFB233-063F-42B5-8137-9DF3F51BA10A}">
+      <p15:sldGuideLst xmlns:p15="http://schemas.microsoft.com/office/powerpoint/2012/main"/>
+    </p:ext>
+  </p:extLst>
 </p:presentation>
 </file>
 
@@ -5343,7 +5351,7 @@
           <a:p>
             <a:r>
               <a:rPr lang="en-US" dirty="0"/>
-              <a:t>Title</a:t>
+              <a:t>What makes a song popular</a:t>
             </a:r>
           </a:p>
         </p:txBody>
@@ -5947,6 +5955,544 @@
 <file path=ppt/slides/slide10.xml><?xml version="1.0" encoding="utf-8"?>
 <p:sld xmlns:a="http://schemas.openxmlformats.org/drawingml/2006/main" xmlns:r="http://schemas.openxmlformats.org/officeDocument/2006/relationships" xmlns:p="http://schemas.openxmlformats.org/presentationml/2006/main">
   <p:cSld>
+    <p:bg>
+      <p:bgPr>
+        <a:gradFill rotWithShape="1">
+          <a:gsLst>
+            <a:gs pos="10000">
+              <a:schemeClr val="bg2">
+                <a:tint val="97000"/>
+                <a:hueMod val="92000"/>
+                <a:satMod val="169000"/>
+                <a:lumMod val="164000"/>
+              </a:schemeClr>
+            </a:gs>
+            <a:gs pos="100000">
+              <a:schemeClr val="bg2">
+                <a:shade val="96000"/>
+                <a:satMod val="120000"/>
+                <a:lumMod val="90000"/>
+              </a:schemeClr>
+            </a:gs>
+          </a:gsLst>
+          <a:lin ang="6120000" scaled="1"/>
+        </a:gradFill>
+        <a:effectLst/>
+      </p:bgPr>
+    </p:bg>
+    <p:spTree>
+      <p:nvGrpSpPr>
+        <p:cNvPr id="1" name=""/>
+        <p:cNvGrpSpPr/>
+        <p:nvPr/>
+      </p:nvGrpSpPr>
+      <p:grpSpPr>
+        <a:xfrm>
+          <a:off x="0" y="0"/>
+          <a:ext cx="0" cy="0"/>
+          <a:chOff x="0" y="0"/>
+          <a:chExt cx="0" cy="0"/>
+        </a:xfrm>
+      </p:grpSpPr>
+      <p:sp useBgFill="1">
+        <p:nvSpPr>
+          <p:cNvPr id="16" name="Rectangle 7">
+            <a:extLst>
+              <a:ext uri="{FF2B5EF4-FFF2-40B4-BE49-F238E27FC236}">
+                <a16:creationId xmlns:a16="http://schemas.microsoft.com/office/drawing/2014/main" id="{0392160F-30B7-4465-8A19-68977E4AECE6}"/>
+              </a:ext>
+              <a:ext uri="{C183D7F6-B498-43B3-948B-1728B52AA6E4}">
+                <adec:decorative xmlns:adec="http://schemas.microsoft.com/office/drawing/2017/decorative" val="1"/>
+              </a:ext>
+            </a:extLst>
+          </p:cNvPr>
+          <p:cNvSpPr>
+            <a:spLocks noGrp="1" noRot="1" noChangeAspect="1" noMove="1" noResize="1" noEditPoints="1" noAdjustHandles="1" noChangeArrowheads="1" noChangeShapeType="1" noTextEdit="1"/>
+          </p:cNvSpPr>
+          <p:nvPr>
+            <p:extLst>
+              <p:ext uri="{386F3935-93C4-4BCD-93E2-E3B085C9AB24}">
+                <p16:designElem xmlns:p16="http://schemas.microsoft.com/office/powerpoint/2015/main" val="1"/>
+              </p:ext>
+            </p:extLst>
+          </p:nvPr>
+        </p:nvSpPr>
+        <p:spPr>
+          <a:xfrm>
+            <a:off x="0" y="0"/>
+            <a:ext cx="12192000" cy="6858000"/>
+          </a:xfrm>
+          <a:prstGeom prst="rect">
+            <a:avLst/>
+          </a:prstGeom>
+          <a:ln>
+            <a:noFill/>
+          </a:ln>
+        </p:spPr>
+        <p:style>
+          <a:lnRef idx="2">
+            <a:schemeClr val="accent1">
+              <a:shade val="50000"/>
+            </a:schemeClr>
+          </a:lnRef>
+          <a:fillRef idx="1">
+            <a:schemeClr val="accent1"/>
+          </a:fillRef>
+          <a:effectRef idx="0">
+            <a:schemeClr val="accent1"/>
+          </a:effectRef>
+          <a:fontRef idx="minor">
+            <a:schemeClr val="lt1"/>
+          </a:fontRef>
+        </p:style>
+        <p:txBody>
+          <a:bodyPr rtlCol="0" anchor="ctr"/>
+          <a:lstStyle/>
+          <a:p>
+            <a:pPr algn="ctr"/>
+            <a:endParaRPr lang="en-US"/>
+          </a:p>
+        </p:txBody>
+      </p:sp>
+      <p:pic>
+        <p:nvPicPr>
+          <p:cNvPr id="3" name="Picture 2" descr="A close up of a window&#10;&#10;Description automatically generated">
+            <a:extLst>
+              <a:ext uri="{FF2B5EF4-FFF2-40B4-BE49-F238E27FC236}">
+                <a16:creationId xmlns:a16="http://schemas.microsoft.com/office/drawing/2014/main" id="{26959BAE-2CC9-46B0-A5B6-53773372511D}"/>
+              </a:ext>
+            </a:extLst>
+          </p:cNvPr>
+          <p:cNvPicPr>
+            <a:picLocks noChangeAspect="1"/>
+          </p:cNvPicPr>
+          <p:nvPr/>
+        </p:nvPicPr>
+        <p:blipFill rotWithShape="1">
+          <a:blip r:embed="rId2">
+            <a:grayscl/>
+          </a:blip>
+          <a:srcRect t="47099" b="38839"/>
+          <a:stretch/>
+        </p:blipFill>
+        <p:spPr>
+          <a:xfrm>
+            <a:off x="0" y="0"/>
+            <a:ext cx="12191980" cy="6857990"/>
+          </a:xfrm>
+          <a:custGeom>
+            <a:avLst/>
+            <a:gdLst/>
+            <a:ahLst/>
+            <a:cxnLst/>
+            <a:rect l="l" t="t" r="r" b="b"/>
+            <a:pathLst>
+              <a:path w="12192000" h="6858000">
+                <a:moveTo>
+                  <a:pt x="0" y="0"/>
+                </a:moveTo>
+                <a:lnTo>
+                  <a:pt x="12192000" y="0"/>
+                </a:lnTo>
+                <a:lnTo>
+                  <a:pt x="12192000" y="4360335"/>
+                </a:lnTo>
+                <a:lnTo>
+                  <a:pt x="9607053" y="6858000"/>
+                </a:lnTo>
+                <a:lnTo>
+                  <a:pt x="0" y="6858000"/>
+                </a:lnTo>
+                <a:close/>
+              </a:path>
+            </a:pathLst>
+          </a:custGeom>
+        </p:spPr>
+      </p:pic>
+      <p:grpSp>
+        <p:nvGrpSpPr>
+          <p:cNvPr id="17" name="Group 9">
+            <a:extLst>
+              <a:ext uri="{FF2B5EF4-FFF2-40B4-BE49-F238E27FC236}">
+                <a16:creationId xmlns:a16="http://schemas.microsoft.com/office/drawing/2014/main" id="{9C1AEAC6-74C1-4404-A024-D1CE7E981DFF}"/>
+              </a:ext>
+              <a:ext uri="{C183D7F6-B498-43B3-948B-1728B52AA6E4}">
+                <adec:decorative xmlns:adec="http://schemas.microsoft.com/office/drawing/2017/decorative" val="1"/>
+              </a:ext>
+            </a:extLst>
+          </p:cNvPr>
+          <p:cNvGrpSpPr>
+            <a:grpSpLocks noGrp="1" noUngrp="1" noRot="1" noChangeAspect="1" noMove="1" noResize="1"/>
+          </p:cNvGrpSpPr>
+          <p:nvPr>
+            <p:extLst>
+              <p:ext uri="{386F3935-93C4-4BCD-93E2-E3B085C9AB24}">
+                <p16:designElem xmlns:p16="http://schemas.microsoft.com/office/powerpoint/2015/main" val="1"/>
+              </p:ext>
+            </p:extLst>
+          </p:nvPr>
+        </p:nvGrpSpPr>
+        <p:grpSpPr>
+          <a:xfrm>
+            <a:off x="9197444" y="3629675"/>
+            <a:ext cx="2981858" cy="3208867"/>
+            <a:chOff x="9206969" y="2963333"/>
+            <a:chExt cx="2981858" cy="3208867"/>
+          </a:xfrm>
+        </p:grpSpPr>
+        <p:cxnSp>
+          <p:nvCxnSpPr>
+            <p:cNvPr id="11" name="Straight Connector 10">
+              <a:extLst>
+                <a:ext uri="{FF2B5EF4-FFF2-40B4-BE49-F238E27FC236}">
+                  <a16:creationId xmlns:a16="http://schemas.microsoft.com/office/drawing/2014/main" id="{27A18122-B6D9-4581-A99D-EDA875C9C127}"/>
+                </a:ext>
+                <a:ext uri="{C183D7F6-B498-43B3-948B-1728B52AA6E4}">
+                  <adec:decorative xmlns:adec="http://schemas.microsoft.com/office/drawing/2017/decorative" val="1"/>
+                </a:ext>
+              </a:extLst>
+            </p:cNvPr>
+            <p:cNvCxnSpPr/>
+            <p:nvPr>
+              <p:extLst>
+                <p:ext uri="{386F3935-93C4-4BCD-93E2-E3B085C9AB24}">
+                  <p16:designElem xmlns:p16="http://schemas.microsoft.com/office/powerpoint/2015/main" val="1"/>
+                </p:ext>
+              </p:extLst>
+            </p:nvPr>
+          </p:nvCxnSpPr>
+          <p:spPr>
+            <a:xfrm flipH="1">
+              <a:off x="11276012" y="2963333"/>
+              <a:ext cx="912814" cy="912812"/>
+            </a:xfrm>
+            <a:prstGeom prst="line">
+              <a:avLst/>
+            </a:prstGeom>
+            <a:ln w="9525">
+              <a:solidFill>
+                <a:schemeClr val="tx1"/>
+              </a:solidFill>
+            </a:ln>
+          </p:spPr>
+          <p:style>
+            <a:lnRef idx="2">
+              <a:schemeClr val="accent1"/>
+            </a:lnRef>
+            <a:fillRef idx="0">
+              <a:schemeClr val="accent1"/>
+            </a:fillRef>
+            <a:effectRef idx="1">
+              <a:schemeClr val="accent1"/>
+            </a:effectRef>
+            <a:fontRef idx="minor">
+              <a:schemeClr val="tx1"/>
+            </a:fontRef>
+          </p:style>
+        </p:cxnSp>
+        <p:cxnSp>
+          <p:nvCxnSpPr>
+            <p:cNvPr id="12" name="Straight Connector 11">
+              <a:extLst>
+                <a:ext uri="{FF2B5EF4-FFF2-40B4-BE49-F238E27FC236}">
+                  <a16:creationId xmlns:a16="http://schemas.microsoft.com/office/drawing/2014/main" id="{B9EEB4CB-A704-4714-AFB5-3253600D0366}"/>
+                </a:ext>
+                <a:ext uri="{C183D7F6-B498-43B3-948B-1728B52AA6E4}">
+                  <adec:decorative xmlns:adec="http://schemas.microsoft.com/office/drawing/2017/decorative" val="1"/>
+                </a:ext>
+              </a:extLst>
+            </p:cNvPr>
+            <p:cNvCxnSpPr/>
+            <p:nvPr>
+              <p:extLst>
+                <p:ext uri="{386F3935-93C4-4BCD-93E2-E3B085C9AB24}">
+                  <p16:designElem xmlns:p16="http://schemas.microsoft.com/office/powerpoint/2015/main" val="1"/>
+                </p:ext>
+              </p:extLst>
+            </p:nvPr>
+          </p:nvCxnSpPr>
+          <p:spPr>
+            <a:xfrm flipH="1">
+              <a:off x="9206969" y="3190344"/>
+              <a:ext cx="2981857" cy="2981856"/>
+            </a:xfrm>
+            <a:prstGeom prst="line">
+              <a:avLst/>
+            </a:prstGeom>
+            <a:ln w="9525">
+              <a:solidFill>
+                <a:schemeClr val="tx1"/>
+              </a:solidFill>
+            </a:ln>
+          </p:spPr>
+          <p:style>
+            <a:lnRef idx="2">
+              <a:schemeClr val="accent1"/>
+            </a:lnRef>
+            <a:fillRef idx="0">
+              <a:schemeClr val="accent1"/>
+            </a:fillRef>
+            <a:effectRef idx="1">
+              <a:schemeClr val="accent1"/>
+            </a:effectRef>
+            <a:fontRef idx="minor">
+              <a:schemeClr val="tx1"/>
+            </a:fontRef>
+          </p:style>
+        </p:cxnSp>
+        <p:cxnSp>
+          <p:nvCxnSpPr>
+            <p:cNvPr id="13" name="Straight Connector 12">
+              <a:extLst>
+                <a:ext uri="{FF2B5EF4-FFF2-40B4-BE49-F238E27FC236}">
+                  <a16:creationId xmlns:a16="http://schemas.microsoft.com/office/drawing/2014/main" id="{2A8D76B5-3DFA-4E0E-9756-E751A6B0DC6D}"/>
+                </a:ext>
+                <a:ext uri="{C183D7F6-B498-43B3-948B-1728B52AA6E4}">
+                  <adec:decorative xmlns:adec="http://schemas.microsoft.com/office/drawing/2017/decorative" val="1"/>
+                </a:ext>
+              </a:extLst>
+            </p:cNvPr>
+            <p:cNvCxnSpPr/>
+            <p:nvPr>
+              <p:extLst>
+                <p:ext uri="{386F3935-93C4-4BCD-93E2-E3B085C9AB24}">
+                  <p16:designElem xmlns:p16="http://schemas.microsoft.com/office/powerpoint/2015/main" val="1"/>
+                </p:ext>
+              </p:extLst>
+            </p:nvPr>
+          </p:nvCxnSpPr>
+          <p:spPr>
+            <a:xfrm flipH="1">
+              <a:off x="10292292" y="3285067"/>
+              <a:ext cx="1896534" cy="1896533"/>
+            </a:xfrm>
+            <a:prstGeom prst="line">
+              <a:avLst/>
+            </a:prstGeom>
+            <a:ln w="9525">
+              <a:solidFill>
+                <a:schemeClr val="tx1"/>
+              </a:solidFill>
+            </a:ln>
+          </p:spPr>
+          <p:style>
+            <a:lnRef idx="2">
+              <a:schemeClr val="accent1"/>
+            </a:lnRef>
+            <a:fillRef idx="0">
+              <a:schemeClr val="accent1"/>
+            </a:fillRef>
+            <a:effectRef idx="1">
+              <a:schemeClr val="accent1"/>
+            </a:effectRef>
+            <a:fontRef idx="minor">
+              <a:schemeClr val="tx1"/>
+            </a:fontRef>
+          </p:style>
+        </p:cxnSp>
+        <p:cxnSp>
+          <p:nvCxnSpPr>
+            <p:cNvPr id="14" name="Straight Connector 13">
+              <a:extLst>
+                <a:ext uri="{FF2B5EF4-FFF2-40B4-BE49-F238E27FC236}">
+                  <a16:creationId xmlns:a16="http://schemas.microsoft.com/office/drawing/2014/main" id="{6ABED0E1-D860-4493-B2D4-311F54DF961E}"/>
+                </a:ext>
+                <a:ext uri="{C183D7F6-B498-43B3-948B-1728B52AA6E4}">
+                  <adec:decorative xmlns:adec="http://schemas.microsoft.com/office/drawing/2017/decorative" val="1"/>
+                </a:ext>
+              </a:extLst>
+            </p:cNvPr>
+            <p:cNvCxnSpPr/>
+            <p:nvPr>
+              <p:extLst>
+                <p:ext uri="{386F3935-93C4-4BCD-93E2-E3B085C9AB24}">
+                  <p16:designElem xmlns:p16="http://schemas.microsoft.com/office/powerpoint/2015/main" val="1"/>
+                </p:ext>
+              </p:extLst>
+            </p:nvPr>
+          </p:nvCxnSpPr>
+          <p:spPr>
+            <a:xfrm flipH="1">
+              <a:off x="10443103" y="3131080"/>
+              <a:ext cx="1745722" cy="1745720"/>
+            </a:xfrm>
+            <a:prstGeom prst="line">
+              <a:avLst/>
+            </a:prstGeom>
+            <a:ln w="28575">
+              <a:solidFill>
+                <a:schemeClr val="tx1"/>
+              </a:solidFill>
+            </a:ln>
+          </p:spPr>
+          <p:style>
+            <a:lnRef idx="2">
+              <a:schemeClr val="accent1"/>
+            </a:lnRef>
+            <a:fillRef idx="0">
+              <a:schemeClr val="accent1"/>
+            </a:fillRef>
+            <a:effectRef idx="1">
+              <a:schemeClr val="accent1"/>
+            </a:effectRef>
+            <a:fontRef idx="minor">
+              <a:schemeClr val="tx1"/>
+            </a:fontRef>
+          </p:style>
+        </p:cxnSp>
+        <p:cxnSp>
+          <p:nvCxnSpPr>
+            <p:cNvPr id="15" name="Straight Connector 14">
+              <a:extLst>
+                <a:ext uri="{FF2B5EF4-FFF2-40B4-BE49-F238E27FC236}">
+                  <a16:creationId xmlns:a16="http://schemas.microsoft.com/office/drawing/2014/main" id="{7A44A8A0-B44F-423F-9640-FA10CD18BFD3}"/>
+                </a:ext>
+                <a:ext uri="{C183D7F6-B498-43B3-948B-1728B52AA6E4}">
+                  <adec:decorative xmlns:adec="http://schemas.microsoft.com/office/drawing/2017/decorative" val="1"/>
+                </a:ext>
+              </a:extLst>
+            </p:cNvPr>
+            <p:cNvCxnSpPr/>
+            <p:nvPr>
+              <p:extLst>
+                <p:ext uri="{386F3935-93C4-4BCD-93E2-E3B085C9AB24}">
+                  <p16:designElem xmlns:p16="http://schemas.microsoft.com/office/powerpoint/2015/main" val="1"/>
+                </p:ext>
+              </p:extLst>
+            </p:nvPr>
+          </p:nvCxnSpPr>
+          <p:spPr>
+            <a:xfrm flipH="1">
+              <a:off x="10918826" y="3683001"/>
+              <a:ext cx="1270001" cy="1269999"/>
+            </a:xfrm>
+            <a:prstGeom prst="line">
+              <a:avLst/>
+            </a:prstGeom>
+            <a:ln w="28575">
+              <a:solidFill>
+                <a:schemeClr val="tx1"/>
+              </a:solidFill>
+            </a:ln>
+          </p:spPr>
+          <p:style>
+            <a:lnRef idx="2">
+              <a:schemeClr val="accent1"/>
+            </a:lnRef>
+            <a:fillRef idx="0">
+              <a:schemeClr val="accent1"/>
+            </a:fillRef>
+            <a:effectRef idx="1">
+              <a:schemeClr val="accent1"/>
+            </a:effectRef>
+            <a:fontRef idx="minor">
+              <a:schemeClr val="tx1"/>
+            </a:fontRef>
+          </p:style>
+        </p:cxnSp>
+      </p:grpSp>
+    </p:spTree>
+    <p:extLst>
+      <p:ext uri="{BB962C8B-B14F-4D97-AF65-F5344CB8AC3E}">
+        <p14:creationId xmlns:p14="http://schemas.microsoft.com/office/powerpoint/2010/main" val="1864514973"/>
+      </p:ext>
+    </p:extLst>
+  </p:cSld>
+  <p:clrMapOvr>
+    <a:masterClrMapping/>
+  </p:clrMapOvr>
+</p:sld>
+</file>
+
+<file path=ppt/slides/slide11.xml><?xml version="1.0" encoding="utf-8"?>
+<p:sld xmlns:a="http://schemas.openxmlformats.org/drawingml/2006/main" xmlns:r="http://schemas.openxmlformats.org/officeDocument/2006/relationships" xmlns:p="http://schemas.openxmlformats.org/presentationml/2006/main">
+  <p:cSld>
+    <p:spTree>
+      <p:nvGrpSpPr>
+        <p:cNvPr id="1" name=""/>
+        <p:cNvGrpSpPr/>
+        <p:nvPr/>
+      </p:nvGrpSpPr>
+      <p:grpSpPr>
+        <a:xfrm>
+          <a:off x="0" y="0"/>
+          <a:ext cx="0" cy="0"/>
+          <a:chOff x="0" y="0"/>
+          <a:chExt cx="0" cy="0"/>
+        </a:xfrm>
+      </p:grpSpPr>
+      <p:sp>
+        <p:nvSpPr>
+          <p:cNvPr id="2" name="Title 1">
+            <a:extLst>
+              <a:ext uri="{FF2B5EF4-FFF2-40B4-BE49-F238E27FC236}">
+                <a16:creationId xmlns:a16="http://schemas.microsoft.com/office/drawing/2014/main" id="{C275FB83-4E1B-44CD-AEBA-0CB0699DDCA0}"/>
+              </a:ext>
+            </a:extLst>
+          </p:cNvPr>
+          <p:cNvSpPr>
+            <a:spLocks noGrp="1"/>
+          </p:cNvSpPr>
+          <p:nvPr>
+            <p:ph type="title"/>
+          </p:nvPr>
+        </p:nvSpPr>
+        <p:spPr/>
+        <p:txBody>
+          <a:bodyPr/>
+          <a:lstStyle/>
+          <a:p>
+            <a:r>
+              <a:rPr lang="en-US" dirty="0"/>
+              <a:t>Trends over the Decade</a:t>
+            </a:r>
+          </a:p>
+        </p:txBody>
+      </p:sp>
+      <p:sp>
+        <p:nvSpPr>
+          <p:cNvPr id="3" name="Text Placeholder 2">
+            <a:extLst>
+              <a:ext uri="{FF2B5EF4-FFF2-40B4-BE49-F238E27FC236}">
+                <a16:creationId xmlns:a16="http://schemas.microsoft.com/office/drawing/2014/main" id="{A0A3622C-6085-44EC-A3C8-64A6A0BA3B39}"/>
+              </a:ext>
+            </a:extLst>
+          </p:cNvPr>
+          <p:cNvSpPr>
+            <a:spLocks noGrp="1"/>
+          </p:cNvSpPr>
+          <p:nvPr>
+            <p:ph type="body" idx="1"/>
+          </p:nvPr>
+        </p:nvSpPr>
+        <p:spPr/>
+        <p:txBody>
+          <a:bodyPr/>
+          <a:lstStyle/>
+          <a:p>
+            <a:r>
+              <a:rPr lang="en-US" dirty="0"/>
+              <a:t>Music seems to not be directly associated to an attribute captured by the Spotify system.  As we can see in the next set of slides the trend changes.</a:t>
+            </a:r>
+          </a:p>
+        </p:txBody>
+      </p:sp>
+    </p:spTree>
+    <p:extLst>
+      <p:ext uri="{BB962C8B-B14F-4D97-AF65-F5344CB8AC3E}">
+        <p14:creationId xmlns:p14="http://schemas.microsoft.com/office/powerpoint/2010/main" val="1039126759"/>
+      </p:ext>
+    </p:extLst>
+  </p:cSld>
+  <p:clrMapOvr>
+    <a:masterClrMapping/>
+  </p:clrMapOvr>
+</p:sld>
+</file>
+
+<file path=ppt/slides/slide12.xml><?xml version="1.0" encoding="utf-8"?>
+<p:sld xmlns:a="http://schemas.openxmlformats.org/drawingml/2006/main" xmlns:r="http://schemas.openxmlformats.org/officeDocument/2006/relationships" xmlns:p="http://schemas.openxmlformats.org/presentationml/2006/main">
+  <p:cSld>
     <p:spTree>
       <p:nvGrpSpPr>
         <p:cNvPr id="1" name=""/>
@@ -6086,6 +6632,41 @@
           </a:p>
         </p:txBody>
       </p:sp>
+      <p:sp>
+        <p:nvSpPr>
+          <p:cNvPr id="6" name="TextBox 5">
+            <a:extLst>
+              <a:ext uri="{FF2B5EF4-FFF2-40B4-BE49-F238E27FC236}">
+                <a16:creationId xmlns:a16="http://schemas.microsoft.com/office/drawing/2014/main" id="{988C996B-EC3A-4D76-A2FA-8A5D9A0CFAAD}"/>
+              </a:ext>
+            </a:extLst>
+          </p:cNvPr>
+          <p:cNvSpPr txBox="1"/>
+          <p:nvPr/>
+        </p:nvSpPr>
+        <p:spPr>
+          <a:xfrm>
+            <a:off x="2493818" y="5333395"/>
+            <a:ext cx="7992094" cy="461665"/>
+          </a:xfrm>
+          <a:prstGeom prst="rect">
+            <a:avLst/>
+          </a:prstGeom>
+          <a:noFill/>
+        </p:spPr>
+        <p:txBody>
+          <a:bodyPr wrap="square" rtlCol="0">
+            <a:spAutoFit/>
+          </a:bodyPr>
+          <a:lstStyle/>
+          <a:p>
+            <a:r>
+              <a:rPr lang="en-US" sz="2400" b="1" dirty="0"/>
+              <a:t>Music has increased in loudness over the years</a:t>
+            </a:r>
+          </a:p>
+        </p:txBody>
+      </p:sp>
     </p:spTree>
     <p:extLst>
       <p:ext uri="{BB962C8B-B14F-4D97-AF65-F5344CB8AC3E}">
@@ -6099,7 +6680,7 @@
 </p:sld>
 </file>
 
-<file path=ppt/slides/slide11.xml><?xml version="1.0" encoding="utf-8"?>
+<file path=ppt/slides/slide13.xml><?xml version="1.0" encoding="utf-8"?>
 <p:sld xmlns:a="http://schemas.openxmlformats.org/drawingml/2006/main" xmlns:r="http://schemas.openxmlformats.org/officeDocument/2006/relationships" xmlns:p="http://schemas.openxmlformats.org/presentationml/2006/main">
   <p:cSld>
     <p:bg>
@@ -6977,36 +7558,6 @@
       </p:sp>
       <p:pic>
         <p:nvPicPr>
-          <p:cNvPr id="5" name="Picture 4" descr="A screenshot of a cell phone&#10;&#10;Description automatically generated">
-            <a:extLst>
-              <a:ext uri="{FF2B5EF4-FFF2-40B4-BE49-F238E27FC236}">
-                <a16:creationId xmlns:a16="http://schemas.microsoft.com/office/drawing/2014/main" id="{578AF76E-AF71-4203-98B0-72238FAF18D4}"/>
-              </a:ext>
-            </a:extLst>
-          </p:cNvPr>
-          <p:cNvPicPr>
-            <a:picLocks noChangeAspect="1"/>
-          </p:cNvPicPr>
-          <p:nvPr/>
-        </p:nvPicPr>
-        <p:blipFill>
-          <a:blip r:embed="rId2"/>
-          <a:stretch>
-            <a:fillRect/>
-          </a:stretch>
-        </p:blipFill>
-        <p:spPr>
-          <a:xfrm>
-            <a:off x="489705" y="999896"/>
-            <a:ext cx="3217333" cy="2144888"/>
-          </a:xfrm>
-          <a:prstGeom prst="rect">
-            <a:avLst/>
-          </a:prstGeom>
-        </p:spPr>
-      </p:pic>
-      <p:pic>
-        <p:nvPicPr>
           <p:cNvPr id="9" name="Picture 8" descr="A screenshot of a cell phone&#10;&#10;Description automatically generated">
             <a:extLst>
               <a:ext uri="{FF2B5EF4-FFF2-40B4-BE49-F238E27FC236}">
@@ -7020,7 +7571,7 @@
           <p:nvPr/>
         </p:nvPicPr>
         <p:blipFill>
-          <a:blip r:embed="rId3"/>
+          <a:blip r:embed="rId2"/>
           <a:stretch>
             <a:fillRect/>
           </a:stretch>
@@ -7050,7 +7601,7 @@
           <p:nvPr/>
         </p:nvPicPr>
         <p:blipFill>
-          <a:blip r:embed="rId4"/>
+          <a:blip r:embed="rId3"/>
           <a:stretch>
             <a:fillRect/>
           </a:stretch>
@@ -7344,14 +7895,14 @@
           <p:nvPr/>
         </p:nvPicPr>
         <p:blipFill>
-          <a:blip r:embed="rId5"/>
+          <a:blip r:embed="rId4"/>
           <a:stretch>
             <a:fillRect/>
           </a:stretch>
         </p:blipFill>
         <p:spPr>
           <a:xfrm>
-            <a:off x="9093634" y="336377"/>
+            <a:off x="664602" y="2421124"/>
             <a:ext cx="2639326" cy="1759551"/>
           </a:xfrm>
           <a:prstGeom prst="rect">
@@ -7374,7 +7925,7 @@
           <p:nvPr/>
         </p:nvPicPr>
         <p:blipFill>
-          <a:blip r:embed="rId6"/>
+          <a:blip r:embed="rId5"/>
           <a:stretch>
             <a:fillRect/>
           </a:stretch>
@@ -7404,7 +7955,7 @@
           <p:nvPr/>
         </p:nvPicPr>
         <p:blipFill>
-          <a:blip r:embed="rId7"/>
+          <a:blip r:embed="rId6"/>
           <a:stretch>
             <a:fillRect/>
           </a:stretch>
@@ -7434,6 +7985,36 @@
           <p:nvPr/>
         </p:nvPicPr>
         <p:blipFill>
+          <a:blip r:embed="rId7"/>
+          <a:stretch>
+            <a:fillRect/>
+          </a:stretch>
+        </p:blipFill>
+        <p:spPr>
+          <a:xfrm>
+            <a:off x="529591" y="110968"/>
+            <a:ext cx="3217332" cy="2144888"/>
+          </a:xfrm>
+          <a:prstGeom prst="rect">
+            <a:avLst/>
+          </a:prstGeom>
+        </p:spPr>
+      </p:pic>
+      <p:pic>
+        <p:nvPicPr>
+          <p:cNvPr id="5" name="Picture 4" descr="A screenshot of a cell phone&#10;&#10;Description automatically generated">
+            <a:extLst>
+              <a:ext uri="{FF2B5EF4-FFF2-40B4-BE49-F238E27FC236}">
+                <a16:creationId xmlns:a16="http://schemas.microsoft.com/office/drawing/2014/main" id="{578AF76E-AF71-4203-98B0-72238FAF18D4}"/>
+              </a:ext>
+            </a:extLst>
+          </p:cNvPr>
+          <p:cNvPicPr>
+            <a:picLocks noChangeAspect="1"/>
+          </p:cNvPicPr>
+          <p:nvPr/>
+        </p:nvPicPr>
+        <p:blipFill>
           <a:blip r:embed="rId8"/>
           <a:stretch>
             <a:fillRect/>
@@ -7441,14 +8022,49 @@
         </p:blipFill>
         <p:spPr>
           <a:xfrm>
-            <a:off x="3352175" y="1599783"/>
-            <a:ext cx="5487650" cy="3658433"/>
+            <a:off x="9020889" y="112418"/>
+            <a:ext cx="3055525" cy="2037016"/>
           </a:xfrm>
           <a:prstGeom prst="rect">
             <a:avLst/>
           </a:prstGeom>
         </p:spPr>
       </p:pic>
+      <p:sp>
+        <p:nvSpPr>
+          <p:cNvPr id="17" name="TextBox 16">
+            <a:extLst>
+              <a:ext uri="{FF2B5EF4-FFF2-40B4-BE49-F238E27FC236}">
+                <a16:creationId xmlns:a16="http://schemas.microsoft.com/office/drawing/2014/main" id="{FA14430D-D6F5-465E-B083-6D79D405F07D}"/>
+              </a:ext>
+            </a:extLst>
+          </p:cNvPr>
+          <p:cNvSpPr txBox="1"/>
+          <p:nvPr/>
+        </p:nvSpPr>
+        <p:spPr>
+          <a:xfrm>
+            <a:off x="3900145" y="6195624"/>
+            <a:ext cx="6844145" cy="461665"/>
+          </a:xfrm>
+          <a:prstGeom prst="rect">
+            <a:avLst/>
+          </a:prstGeom>
+          <a:noFill/>
+        </p:spPr>
+        <p:txBody>
+          <a:bodyPr wrap="square" rtlCol="0">
+            <a:spAutoFit/>
+          </a:bodyPr>
+          <a:lstStyle/>
+          <a:p>
+            <a:r>
+              <a:rPr lang="en-US" sz="2400" b="1" dirty="0"/>
+              <a:t>Tempo trends over the last 70 years</a:t>
+            </a:r>
+          </a:p>
+        </p:txBody>
+      </p:sp>
     </p:spTree>
     <p:extLst>
       <p:ext uri="{BB962C8B-B14F-4D97-AF65-F5344CB8AC3E}">
@@ -7462,7 +8078,319 @@
 </p:sld>
 </file>
 
-<file path=ppt/slides/slide12.xml><?xml version="1.0" encoding="utf-8"?>
+<file path=ppt/slides/slide14.xml><?xml version="1.0" encoding="utf-8"?>
+<p:sld xmlns:a="http://schemas.openxmlformats.org/drawingml/2006/main" xmlns:r="http://schemas.openxmlformats.org/officeDocument/2006/relationships" xmlns:p="http://schemas.openxmlformats.org/presentationml/2006/main">
+  <p:cSld>
+    <p:spTree>
+      <p:nvGrpSpPr>
+        <p:cNvPr id="1" name=""/>
+        <p:cNvGrpSpPr/>
+        <p:nvPr/>
+      </p:nvGrpSpPr>
+      <p:grpSpPr>
+        <a:xfrm>
+          <a:off x="0" y="0"/>
+          <a:ext cx="0" cy="0"/>
+          <a:chOff x="0" y="0"/>
+          <a:chExt cx="0" cy="0"/>
+        </a:xfrm>
+      </p:grpSpPr>
+      <p:pic>
+        <p:nvPicPr>
+          <p:cNvPr id="3" name="Picture 2" descr="A close up of a map&#10;&#10;Description automatically generated">
+            <a:extLst>
+              <a:ext uri="{FF2B5EF4-FFF2-40B4-BE49-F238E27FC236}">
+                <a16:creationId xmlns:a16="http://schemas.microsoft.com/office/drawing/2014/main" id="{36179786-E955-4DE6-AFD9-AB760A7DCFA6}"/>
+              </a:ext>
+            </a:extLst>
+          </p:cNvPr>
+          <p:cNvPicPr>
+            <a:picLocks noChangeAspect="1"/>
+          </p:cNvPicPr>
+          <p:nvPr/>
+        </p:nvPicPr>
+        <p:blipFill>
+          <a:blip r:embed="rId2"/>
+          <a:stretch>
+            <a:fillRect/>
+          </a:stretch>
+        </p:blipFill>
+        <p:spPr>
+          <a:xfrm>
+            <a:off x="220601" y="103491"/>
+            <a:ext cx="3225405" cy="2150270"/>
+          </a:xfrm>
+          <a:prstGeom prst="rect">
+            <a:avLst/>
+          </a:prstGeom>
+        </p:spPr>
+      </p:pic>
+      <p:pic>
+        <p:nvPicPr>
+          <p:cNvPr id="5" name="Picture 4" descr="A screenshot of a cell phone&#10;&#10;Description automatically generated">
+            <a:extLst>
+              <a:ext uri="{FF2B5EF4-FFF2-40B4-BE49-F238E27FC236}">
+                <a16:creationId xmlns:a16="http://schemas.microsoft.com/office/drawing/2014/main" id="{3BCFC70E-6057-4B6D-89F1-E7D043D685D0}"/>
+              </a:ext>
+            </a:extLst>
+          </p:cNvPr>
+          <p:cNvPicPr>
+            <a:picLocks noChangeAspect="1"/>
+          </p:cNvPicPr>
+          <p:nvPr/>
+        </p:nvPicPr>
+        <p:blipFill>
+          <a:blip r:embed="rId3"/>
+          <a:stretch>
+            <a:fillRect/>
+          </a:stretch>
+        </p:blipFill>
+        <p:spPr>
+          <a:xfrm>
+            <a:off x="4162176" y="103491"/>
+            <a:ext cx="3225404" cy="2150269"/>
+          </a:xfrm>
+          <a:prstGeom prst="rect">
+            <a:avLst/>
+          </a:prstGeom>
+        </p:spPr>
+      </p:pic>
+      <p:pic>
+        <p:nvPicPr>
+          <p:cNvPr id="7" name="Picture 6" descr="A screenshot of a cell phone&#10;&#10;Description automatically generated">
+            <a:extLst>
+              <a:ext uri="{FF2B5EF4-FFF2-40B4-BE49-F238E27FC236}">
+                <a16:creationId xmlns:a16="http://schemas.microsoft.com/office/drawing/2014/main" id="{8FF34F0F-2765-4A68-A2F6-9F708C8DFBC8}"/>
+              </a:ext>
+            </a:extLst>
+          </p:cNvPr>
+          <p:cNvPicPr>
+            <a:picLocks noChangeAspect="1"/>
+          </p:cNvPicPr>
+          <p:nvPr/>
+        </p:nvPicPr>
+        <p:blipFill>
+          <a:blip r:embed="rId4"/>
+          <a:stretch>
+            <a:fillRect/>
+          </a:stretch>
+        </p:blipFill>
+        <p:spPr>
+          <a:xfrm>
+            <a:off x="8103750" y="103491"/>
+            <a:ext cx="3225406" cy="2150270"/>
+          </a:xfrm>
+          <a:prstGeom prst="rect">
+            <a:avLst/>
+          </a:prstGeom>
+        </p:spPr>
+      </p:pic>
+      <p:pic>
+        <p:nvPicPr>
+          <p:cNvPr id="9" name="Picture 8" descr="A close up of a map&#10;&#10;Description automatically generated">
+            <a:extLst>
+              <a:ext uri="{FF2B5EF4-FFF2-40B4-BE49-F238E27FC236}">
+                <a16:creationId xmlns:a16="http://schemas.microsoft.com/office/drawing/2014/main" id="{678D6515-BB5E-4797-82FF-3D8B685F0F0D}"/>
+              </a:ext>
+            </a:extLst>
+          </p:cNvPr>
+          <p:cNvPicPr>
+            <a:picLocks noChangeAspect="1"/>
+          </p:cNvPicPr>
+          <p:nvPr/>
+        </p:nvPicPr>
+        <p:blipFill>
+          <a:blip r:embed="rId5"/>
+          <a:stretch>
+            <a:fillRect/>
+          </a:stretch>
+        </p:blipFill>
+        <p:spPr>
+          <a:xfrm>
+            <a:off x="220600" y="2410272"/>
+            <a:ext cx="3225405" cy="2150269"/>
+          </a:xfrm>
+          <a:prstGeom prst="rect">
+            <a:avLst/>
+          </a:prstGeom>
+        </p:spPr>
+      </p:pic>
+      <p:pic>
+        <p:nvPicPr>
+          <p:cNvPr id="11" name="Picture 10" descr="A close up of a map&#10;&#10;Description automatically generated">
+            <a:extLst>
+              <a:ext uri="{FF2B5EF4-FFF2-40B4-BE49-F238E27FC236}">
+                <a16:creationId xmlns:a16="http://schemas.microsoft.com/office/drawing/2014/main" id="{FC336E67-438E-40DE-B4AC-0B617692CF08}"/>
+              </a:ext>
+            </a:extLst>
+          </p:cNvPr>
+          <p:cNvPicPr>
+            <a:picLocks noChangeAspect="1"/>
+          </p:cNvPicPr>
+          <p:nvPr/>
+        </p:nvPicPr>
+        <p:blipFill>
+          <a:blip r:embed="rId6"/>
+          <a:stretch>
+            <a:fillRect/>
+          </a:stretch>
+        </p:blipFill>
+        <p:spPr>
+          <a:xfrm>
+            <a:off x="4162174" y="2410271"/>
+            <a:ext cx="3225406" cy="2150270"/>
+          </a:xfrm>
+          <a:prstGeom prst="rect">
+            <a:avLst/>
+          </a:prstGeom>
+        </p:spPr>
+      </p:pic>
+      <p:pic>
+        <p:nvPicPr>
+          <p:cNvPr id="13" name="Picture 12" descr="A screenshot of a cell phone&#10;&#10;Description automatically generated">
+            <a:extLst>
+              <a:ext uri="{FF2B5EF4-FFF2-40B4-BE49-F238E27FC236}">
+                <a16:creationId xmlns:a16="http://schemas.microsoft.com/office/drawing/2014/main" id="{72B6400E-3C8D-4F2F-8288-0A883A5CD1A4}"/>
+              </a:ext>
+            </a:extLst>
+          </p:cNvPr>
+          <p:cNvPicPr>
+            <a:picLocks noChangeAspect="1"/>
+          </p:cNvPicPr>
+          <p:nvPr/>
+        </p:nvPicPr>
+        <p:blipFill>
+          <a:blip r:embed="rId7"/>
+          <a:stretch>
+            <a:fillRect/>
+          </a:stretch>
+        </p:blipFill>
+        <p:spPr>
+          <a:xfrm>
+            <a:off x="8103752" y="2453970"/>
+            <a:ext cx="3225404" cy="2150269"/>
+          </a:xfrm>
+          <a:prstGeom prst="rect">
+            <a:avLst/>
+          </a:prstGeom>
+        </p:spPr>
+      </p:pic>
+      <p:pic>
+        <p:nvPicPr>
+          <p:cNvPr id="15" name="Picture 14" descr="A screenshot of a cell phone&#10;&#10;Description automatically generated">
+            <a:extLst>
+              <a:ext uri="{FF2B5EF4-FFF2-40B4-BE49-F238E27FC236}">
+                <a16:creationId xmlns:a16="http://schemas.microsoft.com/office/drawing/2014/main" id="{7443100F-B243-4DE5-B32E-061FF143B788}"/>
+              </a:ext>
+            </a:extLst>
+          </p:cNvPr>
+          <p:cNvPicPr>
+            <a:picLocks noChangeAspect="1"/>
+          </p:cNvPicPr>
+          <p:nvPr/>
+        </p:nvPicPr>
+        <p:blipFill>
+          <a:blip r:embed="rId8"/>
+          <a:stretch>
+            <a:fillRect/>
+          </a:stretch>
+        </p:blipFill>
+        <p:spPr>
+          <a:xfrm>
+            <a:off x="4162176" y="4707730"/>
+            <a:ext cx="3225404" cy="2150269"/>
+          </a:xfrm>
+          <a:prstGeom prst="rect">
+            <a:avLst/>
+          </a:prstGeom>
+        </p:spPr>
+      </p:pic>
+      <p:pic>
+        <p:nvPicPr>
+          <p:cNvPr id="17" name="Picture 16" descr="A screenshot of a cell phone&#10;&#10;Description automatically generated">
+            <a:extLst>
+              <a:ext uri="{FF2B5EF4-FFF2-40B4-BE49-F238E27FC236}">
+                <a16:creationId xmlns:a16="http://schemas.microsoft.com/office/drawing/2014/main" id="{F911470E-0436-4F5B-8204-4640ABF63536}"/>
+              </a:ext>
+            </a:extLst>
+          </p:cNvPr>
+          <p:cNvPicPr>
+            <a:picLocks noChangeAspect="1"/>
+          </p:cNvPicPr>
+          <p:nvPr/>
+        </p:nvPicPr>
+        <p:blipFill>
+          <a:blip r:embed="rId8"/>
+          <a:stretch>
+            <a:fillRect/>
+          </a:stretch>
+        </p:blipFill>
+        <p:spPr>
+          <a:xfrm>
+            <a:off x="220599" y="4707730"/>
+            <a:ext cx="3225405" cy="2150270"/>
+          </a:xfrm>
+          <a:prstGeom prst="rect">
+            <a:avLst/>
+          </a:prstGeom>
+        </p:spPr>
+      </p:pic>
+      <p:sp>
+        <p:nvSpPr>
+          <p:cNvPr id="18" name="TextBox 17">
+            <a:extLst>
+              <a:ext uri="{FF2B5EF4-FFF2-40B4-BE49-F238E27FC236}">
+                <a16:creationId xmlns:a16="http://schemas.microsoft.com/office/drawing/2014/main" id="{728EC546-ACA8-49B9-8F8E-F74496FD813D}"/>
+              </a:ext>
+            </a:extLst>
+          </p:cNvPr>
+          <p:cNvSpPr txBox="1"/>
+          <p:nvPr/>
+        </p:nvSpPr>
+        <p:spPr>
+          <a:xfrm>
+            <a:off x="7537938" y="5228492"/>
+            <a:ext cx="4433463" cy="646331"/>
+          </a:xfrm>
+          <a:prstGeom prst="rect">
+            <a:avLst/>
+          </a:prstGeom>
+          <a:noFill/>
+          <a:ln>
+            <a:solidFill>
+              <a:schemeClr val="tx1">
+                <a:lumMod val="95000"/>
+              </a:schemeClr>
+            </a:solidFill>
+          </a:ln>
+        </p:spPr>
+        <p:txBody>
+          <a:bodyPr wrap="square" rtlCol="0">
+            <a:spAutoFit/>
+          </a:bodyPr>
+          <a:lstStyle/>
+          <a:p>
+            <a:r>
+              <a:rPr lang="en-US" b="1" dirty="0"/>
+              <a:t>Energy level of top songs have seemed to increase over the decades</a:t>
+            </a:r>
+          </a:p>
+        </p:txBody>
+      </p:sp>
+    </p:spTree>
+    <p:extLst>
+      <p:ext uri="{BB962C8B-B14F-4D97-AF65-F5344CB8AC3E}">
+        <p14:creationId xmlns:p14="http://schemas.microsoft.com/office/powerpoint/2010/main" val="463451567"/>
+      </p:ext>
+    </p:extLst>
+  </p:cSld>
+  <p:clrMapOvr>
+    <a:masterClrMapping/>
+  </p:clrMapOvr>
+</p:sld>
+</file>
+
+<file path=ppt/slides/slide15.xml><?xml version="1.0" encoding="utf-8"?>
 <p:sld xmlns:a="http://schemas.openxmlformats.org/drawingml/2006/main" xmlns:r="http://schemas.openxmlformats.org/officeDocument/2006/relationships" xmlns:p="http://schemas.openxmlformats.org/presentationml/2006/main">
   <p:cSld>
     <p:spTree>
@@ -7574,7 +8502,7 @@
         <p:spPr>
           <a:xfrm>
             <a:off x="864524" y="714895"/>
-            <a:ext cx="10557163" cy="4154984"/>
+            <a:ext cx="10557163" cy="4893647"/>
           </a:xfrm>
           <a:prstGeom prst="rect">
             <a:avLst/>
@@ -7588,19 +8516,23 @@
           <a:lstStyle/>
           <a:p>
             <a:r>
-              <a:rPr lang="en-US" sz="2400" u="sng" dirty="0"/>
-              <a:t>Goal:</a:t>
-            </a:r>
-          </a:p>
-          <a:p>
-            <a:r>
-              <a:rPr lang="en-US" dirty="0"/>
+              <a:rPr lang="en-US" sz="2800" b="1" u="sng" dirty="0"/>
+              <a:t>Goal</a:t>
+            </a:r>
+            <a:r>
+              <a:rPr lang="en-US" sz="2400" b="1" u="sng" dirty="0"/>
+              <a:t>:</a:t>
+            </a:r>
+          </a:p>
+          <a:p>
+            <a:r>
+              <a:rPr lang="en-US" sz="2000" dirty="0"/>
               <a:t>Examine the top songs from the Billboard 100 spanning from 1958 to 2019</a:t>
             </a:r>
           </a:p>
           <a:p>
             <a:r>
-              <a:rPr lang="en-US" dirty="0"/>
+              <a:rPr lang="en-US" sz="2000" dirty="0"/>
               <a:t>and see if there are characteristics that these songs share. Are these characteristics propelling certain songs to become hits? Through data cleaning and plotting what we find, we hope to find if there are any correlations that support the questions that follow.</a:t>
             </a:r>
           </a:p>
@@ -7609,58 +8541,62 @@
           </a:p>
           <a:p>
             <a:r>
-              <a:rPr lang="en-US" sz="2400" u="sng" dirty="0"/>
-              <a:t>Questions:</a:t>
-            </a:r>
-          </a:p>
-          <a:p>
-            <a:r>
-              <a:rPr lang="en-US" dirty="0"/>
+              <a:rPr lang="en-US" sz="2800" b="1" u="sng" dirty="0"/>
+              <a:t>Questions</a:t>
+            </a:r>
+            <a:r>
+              <a:rPr lang="en-US" sz="2400" b="1" u="sng" dirty="0"/>
+              <a:t>:</a:t>
+            </a:r>
+          </a:p>
+          <a:p>
+            <a:r>
+              <a:rPr lang="en-US" sz="2000" dirty="0"/>
               <a:t>Overarching Question : What makes a top hit a top hit</a:t>
             </a:r>
           </a:p>
           <a:p>
             <a:pPr marL="465138" indent="-298450"/>
             <a:r>
-              <a:rPr lang="en-US" dirty="0"/>
+              <a:rPr lang="en-US" sz="2000" dirty="0"/>
               <a:t>1) Is there a similar attribute (</a:t>
             </a:r>
             <a:r>
-              <a:rPr lang="en-US" dirty="0" err="1"/>
+              <a:rPr lang="en-US" sz="2000" dirty="0" err="1"/>
               <a:t>i.e</a:t>
             </a:r>
             <a:r>
-              <a:rPr lang="en-US" dirty="0"/>
+              <a:rPr lang="en-US" sz="2000" dirty="0"/>
               <a:t> </a:t>
             </a:r>
             <a:r>
-              <a:rPr lang="en-US" dirty="0" err="1"/>
+              <a:rPr lang="en-US" sz="2000" dirty="0" err="1"/>
               <a:t>acousticness</a:t>
             </a:r>
             <a:r>
-              <a:rPr lang="en-US" dirty="0"/>
+              <a:rPr lang="en-US" sz="2000" dirty="0"/>
               <a:t>/valence/energy/danceability) that a large portion of the songs have?</a:t>
             </a:r>
           </a:p>
           <a:p>
             <a:pPr marL="465138" indent="-298450"/>
             <a:r>
-              <a:rPr lang="en-US" dirty="0"/>
+              <a:rPr lang="en-US" sz="2000" dirty="0"/>
               <a:t>2) Is there a particular genre that dominates the top hits playlist?</a:t>
             </a:r>
           </a:p>
           <a:p>
             <a:pPr marL="465138" indent="-298450"/>
             <a:r>
-              <a:rPr lang="en-US" dirty="0"/>
+              <a:rPr lang="en-US" sz="2000" dirty="0"/>
               <a:t>3) Is there a connection between the hits globally and what countries it ‘blows up’ in? (</a:t>
             </a:r>
             <a:r>
-              <a:rPr lang="en-US" dirty="0" err="1"/>
+              <a:rPr lang="en-US" sz="2000" dirty="0" err="1"/>
               <a:t>i.e</a:t>
             </a:r>
             <a:r>
-              <a:rPr lang="en-US" dirty="0"/>
+              <a:rPr lang="en-US" sz="2000" dirty="0"/>
               <a:t> if it ‘blows up’ in the USA, is it more likely to be a hit in the global playlist)</a:t>
             </a:r>
           </a:p>
@@ -7714,7 +8650,7 @@
         <p:spPr>
           <a:xfrm>
             <a:off x="897775" y="1147156"/>
-            <a:ext cx="10490661" cy="3231654"/>
+            <a:ext cx="10490661" cy="4401205"/>
           </a:xfrm>
           <a:prstGeom prst="rect">
             <a:avLst/>
@@ -7728,7 +8664,7 @@
           <a:lstStyle/>
           <a:p>
             <a:r>
-              <a:rPr lang="en-US" sz="2400" u="sng" dirty="0"/>
+              <a:rPr lang="en-US" sz="2800" u="sng" dirty="0"/>
               <a:t>Data Sources:</a:t>
             </a:r>
           </a:p>
@@ -7741,14 +8677,14 @@
               <a:buChar char="•"/>
             </a:pPr>
             <a:r>
-              <a:rPr lang="en-US" dirty="0">
+              <a:rPr lang="en-US" sz="2400" dirty="0">
                 <a:hlinkClick r:id="rId2"/>
               </a:rPr>
               <a:t>https://data.world/kcmillersean/billboard-hot-100-1958-2017</a:t>
             </a:r>
             <a:r>
-              <a:rPr lang="en-US" dirty="0"/>
-              <a:t> - Data World Top 100 audio features </a:t>
+              <a:rPr lang="en-US" sz="2400" dirty="0"/>
+              <a:t> - Data World Top 100 audio features (2 data files)</a:t>
             </a:r>
           </a:p>
           <a:p>
@@ -7757,7 +8693,7 @@
               <a:buChar char="•"/>
             </a:pPr>
             <a:r>
-              <a:rPr lang="en-US" dirty="0"/>
+              <a:rPr lang="en-US" sz="2400" dirty="0"/>
               <a:t>Data file on the top 100 taken every week from 1958 to 2019</a:t>
             </a:r>
           </a:p>
@@ -7767,7 +8703,7 @@
               <a:buChar char="•"/>
             </a:pPr>
             <a:r>
-              <a:rPr lang="en-US" dirty="0"/>
+              <a:rPr lang="en-US" sz="2400" dirty="0"/>
               <a:t>Data file on songs with Spotify attributes associated with the songs</a:t>
             </a:r>
           </a:p>
@@ -7776,7 +8712,7 @@
               <a:buFont typeface="Arial" panose="020B0604020202020204" pitchFamily="34" charset="0"/>
               <a:buChar char="•"/>
             </a:pPr>
-            <a:endParaRPr lang="en-US" dirty="0"/>
+            <a:endParaRPr lang="en-US" sz="2400" dirty="0"/>
           </a:p>
           <a:p>
             <a:pPr marL="285750" indent="-285750">
@@ -7784,13 +8720,13 @@
               <a:buChar char="•"/>
             </a:pPr>
             <a:r>
-              <a:rPr lang="en-US" dirty="0">
+              <a:rPr lang="en-US" sz="2400" dirty="0">
                 <a:hlinkClick r:id="rId3"/>
               </a:rPr>
               <a:t>https://spotifycharts.com/regional</a:t>
             </a:r>
             <a:r>
-              <a:rPr lang="en-US" dirty="0"/>
+              <a:rPr lang="en-US" sz="2400" dirty="0"/>
               <a:t> - csv data on top 200</a:t>
             </a:r>
           </a:p>
@@ -7799,7 +8735,7 @@
               <a:buFont typeface="Arial" panose="020B0604020202020204" pitchFamily="34" charset="0"/>
               <a:buChar char="•"/>
             </a:pPr>
-            <a:endParaRPr lang="en-US" dirty="0"/>
+            <a:endParaRPr lang="en-US" sz="2400" dirty="0"/>
           </a:p>
           <a:p>
             <a:pPr marL="285750" indent="-285750">
@@ -7807,7 +8743,7 @@
               <a:buChar char="•"/>
             </a:pPr>
             <a:r>
-              <a:rPr lang="en-US" dirty="0"/>
+              <a:rPr lang="en-US" sz="2400" dirty="0"/>
               <a:t>Spotify API (for playlist data / song valuations)</a:t>
             </a:r>
           </a:p>

</xml_diff>

<commit_message>
changes to presentation and notes.
</commit_message>
<xml_diff>
--- a/Presentation.pptx
+++ b/Presentation.pptx
@@ -10,16 +10,21 @@
     <p:sldId id="266" r:id="rId4"/>
     <p:sldId id="259" r:id="rId5"/>
     <p:sldId id="258" r:id="rId6"/>
-    <p:sldId id="267" r:id="rId7"/>
-    <p:sldId id="262" r:id="rId8"/>
+    <p:sldId id="262" r:id="rId7"/>
+    <p:sldId id="277" r:id="rId8"/>
     <p:sldId id="263" r:id="rId9"/>
     <p:sldId id="260" r:id="rId10"/>
-    <p:sldId id="272" r:id="rId11"/>
-    <p:sldId id="270" r:id="rId12"/>
-    <p:sldId id="261" r:id="rId13"/>
-    <p:sldId id="268" r:id="rId14"/>
-    <p:sldId id="271" r:id="rId15"/>
-    <p:sldId id="257" r:id="rId16"/>
+    <p:sldId id="270" r:id="rId11"/>
+    <p:sldId id="261" r:id="rId12"/>
+    <p:sldId id="268" r:id="rId13"/>
+    <p:sldId id="271" r:id="rId14"/>
+    <p:sldId id="275" r:id="rId15"/>
+    <p:sldId id="272" r:id="rId16"/>
+    <p:sldId id="273" r:id="rId17"/>
+    <p:sldId id="274" r:id="rId18"/>
+    <p:sldId id="276" r:id="rId19"/>
+    <p:sldId id="257" r:id="rId20"/>
+    <p:sldId id="267" r:id="rId21"/>
   </p:sldIdLst>
   <p:sldSz cx="12192000" cy="6858000"/>
   <p:notesSz cx="6858000" cy="9144000"/>
@@ -5415,7 +5420,7 @@
         </p:blipFill>
         <p:spPr bwMode="auto">
           <a:xfrm>
-            <a:off x="3465512" y="5039579"/>
+            <a:off x="4054474" y="5374287"/>
             <a:ext cx="1219200" cy="1219200"/>
           </a:xfrm>
           <a:prstGeom prst="rect">
@@ -5509,7 +5514,7 @@
         </p:blipFill>
         <p:spPr bwMode="auto">
           <a:xfrm>
-            <a:off x="9033163" y="685799"/>
+            <a:off x="8061799" y="2741814"/>
             <a:ext cx="1219200" cy="1219200"/>
           </a:xfrm>
           <a:prstGeom prst="rect">
@@ -5603,7 +5608,7 @@
         </p:blipFill>
         <p:spPr bwMode="auto">
           <a:xfrm>
-            <a:off x="4267200" y="635888"/>
+            <a:off x="5313362" y="367783"/>
             <a:ext cx="1219200" cy="1219200"/>
           </a:xfrm>
           <a:prstGeom prst="rect">
@@ -5697,7 +5702,7 @@
         </p:blipFill>
         <p:spPr bwMode="auto">
           <a:xfrm>
-            <a:off x="1509587" y="50222"/>
+            <a:off x="1532447" y="269472"/>
             <a:ext cx="1657350" cy="1714500"/>
           </a:xfrm>
           <a:prstGeom prst="rect">
@@ -5744,7 +5749,7 @@
         </p:blipFill>
         <p:spPr bwMode="auto">
           <a:xfrm>
-            <a:off x="6326097" y="685799"/>
+            <a:off x="7787550" y="234917"/>
             <a:ext cx="2019300" cy="2019300"/>
           </a:xfrm>
           <a:prstGeom prst="rect">
@@ -5791,7 +5796,7 @@
         </p:blipFill>
         <p:spPr bwMode="auto">
           <a:xfrm>
-            <a:off x="5486400" y="3848101"/>
+            <a:off x="5783500" y="3306597"/>
             <a:ext cx="2209800" cy="1714500"/>
           </a:xfrm>
           <a:prstGeom prst="rect">
@@ -5955,31 +5960,6 @@
 <file path=ppt/slides/slide10.xml><?xml version="1.0" encoding="utf-8"?>
 <p:sld xmlns:a="http://schemas.openxmlformats.org/drawingml/2006/main" xmlns:r="http://schemas.openxmlformats.org/officeDocument/2006/relationships" xmlns:p="http://schemas.openxmlformats.org/presentationml/2006/main">
   <p:cSld>
-    <p:bg>
-      <p:bgPr>
-        <a:gradFill rotWithShape="1">
-          <a:gsLst>
-            <a:gs pos="10000">
-              <a:schemeClr val="bg2">
-                <a:tint val="97000"/>
-                <a:hueMod val="92000"/>
-                <a:satMod val="169000"/>
-                <a:lumMod val="164000"/>
-              </a:schemeClr>
-            </a:gs>
-            <a:gs pos="100000">
-              <a:schemeClr val="bg2">
-                <a:shade val="96000"/>
-                <a:satMod val="120000"/>
-                <a:lumMod val="90000"/>
-              </a:schemeClr>
-            </a:gs>
-          </a:gsLst>
-          <a:lin ang="6120000" scaled="1"/>
-        </a:gradFill>
-        <a:effectLst/>
-      </p:bgPr>
-    </p:bg>
     <p:spTree>
       <p:nvGrpSpPr>
         <p:cNvPr id="1" name=""/>
@@ -5994,433 +5974,6 @@
           <a:chExt cx="0" cy="0"/>
         </a:xfrm>
       </p:grpSpPr>
-      <p:sp useBgFill="1">
-        <p:nvSpPr>
-          <p:cNvPr id="16" name="Rectangle 7">
-            <a:extLst>
-              <a:ext uri="{FF2B5EF4-FFF2-40B4-BE49-F238E27FC236}">
-                <a16:creationId xmlns:a16="http://schemas.microsoft.com/office/drawing/2014/main" id="{0392160F-30B7-4465-8A19-68977E4AECE6}"/>
-              </a:ext>
-              <a:ext uri="{C183D7F6-B498-43B3-948B-1728B52AA6E4}">
-                <adec:decorative xmlns:adec="http://schemas.microsoft.com/office/drawing/2017/decorative" val="1"/>
-              </a:ext>
-            </a:extLst>
-          </p:cNvPr>
-          <p:cNvSpPr>
-            <a:spLocks noGrp="1" noRot="1" noChangeAspect="1" noMove="1" noResize="1" noEditPoints="1" noAdjustHandles="1" noChangeArrowheads="1" noChangeShapeType="1" noTextEdit="1"/>
-          </p:cNvSpPr>
-          <p:nvPr>
-            <p:extLst>
-              <p:ext uri="{386F3935-93C4-4BCD-93E2-E3B085C9AB24}">
-                <p16:designElem xmlns:p16="http://schemas.microsoft.com/office/powerpoint/2015/main" val="1"/>
-              </p:ext>
-            </p:extLst>
-          </p:nvPr>
-        </p:nvSpPr>
-        <p:spPr>
-          <a:xfrm>
-            <a:off x="0" y="0"/>
-            <a:ext cx="12192000" cy="6858000"/>
-          </a:xfrm>
-          <a:prstGeom prst="rect">
-            <a:avLst/>
-          </a:prstGeom>
-          <a:ln>
-            <a:noFill/>
-          </a:ln>
-        </p:spPr>
-        <p:style>
-          <a:lnRef idx="2">
-            <a:schemeClr val="accent1">
-              <a:shade val="50000"/>
-            </a:schemeClr>
-          </a:lnRef>
-          <a:fillRef idx="1">
-            <a:schemeClr val="accent1"/>
-          </a:fillRef>
-          <a:effectRef idx="0">
-            <a:schemeClr val="accent1"/>
-          </a:effectRef>
-          <a:fontRef idx="minor">
-            <a:schemeClr val="lt1"/>
-          </a:fontRef>
-        </p:style>
-        <p:txBody>
-          <a:bodyPr rtlCol="0" anchor="ctr"/>
-          <a:lstStyle/>
-          <a:p>
-            <a:pPr algn="ctr"/>
-            <a:endParaRPr lang="en-US"/>
-          </a:p>
-        </p:txBody>
-      </p:sp>
-      <p:pic>
-        <p:nvPicPr>
-          <p:cNvPr id="3" name="Picture 2" descr="A close up of a window&#10;&#10;Description automatically generated">
-            <a:extLst>
-              <a:ext uri="{FF2B5EF4-FFF2-40B4-BE49-F238E27FC236}">
-                <a16:creationId xmlns:a16="http://schemas.microsoft.com/office/drawing/2014/main" id="{26959BAE-2CC9-46B0-A5B6-53773372511D}"/>
-              </a:ext>
-            </a:extLst>
-          </p:cNvPr>
-          <p:cNvPicPr>
-            <a:picLocks noChangeAspect="1"/>
-          </p:cNvPicPr>
-          <p:nvPr/>
-        </p:nvPicPr>
-        <p:blipFill rotWithShape="1">
-          <a:blip r:embed="rId2">
-            <a:grayscl/>
-          </a:blip>
-          <a:srcRect t="47099" b="38839"/>
-          <a:stretch/>
-        </p:blipFill>
-        <p:spPr>
-          <a:xfrm>
-            <a:off x="0" y="0"/>
-            <a:ext cx="12191980" cy="6857990"/>
-          </a:xfrm>
-          <a:custGeom>
-            <a:avLst/>
-            <a:gdLst/>
-            <a:ahLst/>
-            <a:cxnLst/>
-            <a:rect l="l" t="t" r="r" b="b"/>
-            <a:pathLst>
-              <a:path w="12192000" h="6858000">
-                <a:moveTo>
-                  <a:pt x="0" y="0"/>
-                </a:moveTo>
-                <a:lnTo>
-                  <a:pt x="12192000" y="0"/>
-                </a:lnTo>
-                <a:lnTo>
-                  <a:pt x="12192000" y="4360335"/>
-                </a:lnTo>
-                <a:lnTo>
-                  <a:pt x="9607053" y="6858000"/>
-                </a:lnTo>
-                <a:lnTo>
-                  <a:pt x="0" y="6858000"/>
-                </a:lnTo>
-                <a:close/>
-              </a:path>
-            </a:pathLst>
-          </a:custGeom>
-        </p:spPr>
-      </p:pic>
-      <p:grpSp>
-        <p:nvGrpSpPr>
-          <p:cNvPr id="17" name="Group 9">
-            <a:extLst>
-              <a:ext uri="{FF2B5EF4-FFF2-40B4-BE49-F238E27FC236}">
-                <a16:creationId xmlns:a16="http://schemas.microsoft.com/office/drawing/2014/main" id="{9C1AEAC6-74C1-4404-A024-D1CE7E981DFF}"/>
-              </a:ext>
-              <a:ext uri="{C183D7F6-B498-43B3-948B-1728B52AA6E4}">
-                <adec:decorative xmlns:adec="http://schemas.microsoft.com/office/drawing/2017/decorative" val="1"/>
-              </a:ext>
-            </a:extLst>
-          </p:cNvPr>
-          <p:cNvGrpSpPr>
-            <a:grpSpLocks noGrp="1" noUngrp="1" noRot="1" noChangeAspect="1" noMove="1" noResize="1"/>
-          </p:cNvGrpSpPr>
-          <p:nvPr>
-            <p:extLst>
-              <p:ext uri="{386F3935-93C4-4BCD-93E2-E3B085C9AB24}">
-                <p16:designElem xmlns:p16="http://schemas.microsoft.com/office/powerpoint/2015/main" val="1"/>
-              </p:ext>
-            </p:extLst>
-          </p:nvPr>
-        </p:nvGrpSpPr>
-        <p:grpSpPr>
-          <a:xfrm>
-            <a:off x="9197444" y="3629675"/>
-            <a:ext cx="2981858" cy="3208867"/>
-            <a:chOff x="9206969" y="2963333"/>
-            <a:chExt cx="2981858" cy="3208867"/>
-          </a:xfrm>
-        </p:grpSpPr>
-        <p:cxnSp>
-          <p:nvCxnSpPr>
-            <p:cNvPr id="11" name="Straight Connector 10">
-              <a:extLst>
-                <a:ext uri="{FF2B5EF4-FFF2-40B4-BE49-F238E27FC236}">
-                  <a16:creationId xmlns:a16="http://schemas.microsoft.com/office/drawing/2014/main" id="{27A18122-B6D9-4581-A99D-EDA875C9C127}"/>
-                </a:ext>
-                <a:ext uri="{C183D7F6-B498-43B3-948B-1728B52AA6E4}">
-                  <adec:decorative xmlns:adec="http://schemas.microsoft.com/office/drawing/2017/decorative" val="1"/>
-                </a:ext>
-              </a:extLst>
-            </p:cNvPr>
-            <p:cNvCxnSpPr/>
-            <p:nvPr>
-              <p:extLst>
-                <p:ext uri="{386F3935-93C4-4BCD-93E2-E3B085C9AB24}">
-                  <p16:designElem xmlns:p16="http://schemas.microsoft.com/office/powerpoint/2015/main" val="1"/>
-                </p:ext>
-              </p:extLst>
-            </p:nvPr>
-          </p:nvCxnSpPr>
-          <p:spPr>
-            <a:xfrm flipH="1">
-              <a:off x="11276012" y="2963333"/>
-              <a:ext cx="912814" cy="912812"/>
-            </a:xfrm>
-            <a:prstGeom prst="line">
-              <a:avLst/>
-            </a:prstGeom>
-            <a:ln w="9525">
-              <a:solidFill>
-                <a:schemeClr val="tx1"/>
-              </a:solidFill>
-            </a:ln>
-          </p:spPr>
-          <p:style>
-            <a:lnRef idx="2">
-              <a:schemeClr val="accent1"/>
-            </a:lnRef>
-            <a:fillRef idx="0">
-              <a:schemeClr val="accent1"/>
-            </a:fillRef>
-            <a:effectRef idx="1">
-              <a:schemeClr val="accent1"/>
-            </a:effectRef>
-            <a:fontRef idx="minor">
-              <a:schemeClr val="tx1"/>
-            </a:fontRef>
-          </p:style>
-        </p:cxnSp>
-        <p:cxnSp>
-          <p:nvCxnSpPr>
-            <p:cNvPr id="12" name="Straight Connector 11">
-              <a:extLst>
-                <a:ext uri="{FF2B5EF4-FFF2-40B4-BE49-F238E27FC236}">
-                  <a16:creationId xmlns:a16="http://schemas.microsoft.com/office/drawing/2014/main" id="{B9EEB4CB-A704-4714-AFB5-3253600D0366}"/>
-                </a:ext>
-                <a:ext uri="{C183D7F6-B498-43B3-948B-1728B52AA6E4}">
-                  <adec:decorative xmlns:adec="http://schemas.microsoft.com/office/drawing/2017/decorative" val="1"/>
-                </a:ext>
-              </a:extLst>
-            </p:cNvPr>
-            <p:cNvCxnSpPr/>
-            <p:nvPr>
-              <p:extLst>
-                <p:ext uri="{386F3935-93C4-4BCD-93E2-E3B085C9AB24}">
-                  <p16:designElem xmlns:p16="http://schemas.microsoft.com/office/powerpoint/2015/main" val="1"/>
-                </p:ext>
-              </p:extLst>
-            </p:nvPr>
-          </p:nvCxnSpPr>
-          <p:spPr>
-            <a:xfrm flipH="1">
-              <a:off x="9206969" y="3190344"/>
-              <a:ext cx="2981857" cy="2981856"/>
-            </a:xfrm>
-            <a:prstGeom prst="line">
-              <a:avLst/>
-            </a:prstGeom>
-            <a:ln w="9525">
-              <a:solidFill>
-                <a:schemeClr val="tx1"/>
-              </a:solidFill>
-            </a:ln>
-          </p:spPr>
-          <p:style>
-            <a:lnRef idx="2">
-              <a:schemeClr val="accent1"/>
-            </a:lnRef>
-            <a:fillRef idx="0">
-              <a:schemeClr val="accent1"/>
-            </a:fillRef>
-            <a:effectRef idx="1">
-              <a:schemeClr val="accent1"/>
-            </a:effectRef>
-            <a:fontRef idx="minor">
-              <a:schemeClr val="tx1"/>
-            </a:fontRef>
-          </p:style>
-        </p:cxnSp>
-        <p:cxnSp>
-          <p:nvCxnSpPr>
-            <p:cNvPr id="13" name="Straight Connector 12">
-              <a:extLst>
-                <a:ext uri="{FF2B5EF4-FFF2-40B4-BE49-F238E27FC236}">
-                  <a16:creationId xmlns:a16="http://schemas.microsoft.com/office/drawing/2014/main" id="{2A8D76B5-3DFA-4E0E-9756-E751A6B0DC6D}"/>
-                </a:ext>
-                <a:ext uri="{C183D7F6-B498-43B3-948B-1728B52AA6E4}">
-                  <adec:decorative xmlns:adec="http://schemas.microsoft.com/office/drawing/2017/decorative" val="1"/>
-                </a:ext>
-              </a:extLst>
-            </p:cNvPr>
-            <p:cNvCxnSpPr/>
-            <p:nvPr>
-              <p:extLst>
-                <p:ext uri="{386F3935-93C4-4BCD-93E2-E3B085C9AB24}">
-                  <p16:designElem xmlns:p16="http://schemas.microsoft.com/office/powerpoint/2015/main" val="1"/>
-                </p:ext>
-              </p:extLst>
-            </p:nvPr>
-          </p:nvCxnSpPr>
-          <p:spPr>
-            <a:xfrm flipH="1">
-              <a:off x="10292292" y="3285067"/>
-              <a:ext cx="1896534" cy="1896533"/>
-            </a:xfrm>
-            <a:prstGeom prst="line">
-              <a:avLst/>
-            </a:prstGeom>
-            <a:ln w="9525">
-              <a:solidFill>
-                <a:schemeClr val="tx1"/>
-              </a:solidFill>
-            </a:ln>
-          </p:spPr>
-          <p:style>
-            <a:lnRef idx="2">
-              <a:schemeClr val="accent1"/>
-            </a:lnRef>
-            <a:fillRef idx="0">
-              <a:schemeClr val="accent1"/>
-            </a:fillRef>
-            <a:effectRef idx="1">
-              <a:schemeClr val="accent1"/>
-            </a:effectRef>
-            <a:fontRef idx="minor">
-              <a:schemeClr val="tx1"/>
-            </a:fontRef>
-          </p:style>
-        </p:cxnSp>
-        <p:cxnSp>
-          <p:nvCxnSpPr>
-            <p:cNvPr id="14" name="Straight Connector 13">
-              <a:extLst>
-                <a:ext uri="{FF2B5EF4-FFF2-40B4-BE49-F238E27FC236}">
-                  <a16:creationId xmlns:a16="http://schemas.microsoft.com/office/drawing/2014/main" id="{6ABED0E1-D860-4493-B2D4-311F54DF961E}"/>
-                </a:ext>
-                <a:ext uri="{C183D7F6-B498-43B3-948B-1728B52AA6E4}">
-                  <adec:decorative xmlns:adec="http://schemas.microsoft.com/office/drawing/2017/decorative" val="1"/>
-                </a:ext>
-              </a:extLst>
-            </p:cNvPr>
-            <p:cNvCxnSpPr/>
-            <p:nvPr>
-              <p:extLst>
-                <p:ext uri="{386F3935-93C4-4BCD-93E2-E3B085C9AB24}">
-                  <p16:designElem xmlns:p16="http://schemas.microsoft.com/office/powerpoint/2015/main" val="1"/>
-                </p:ext>
-              </p:extLst>
-            </p:nvPr>
-          </p:nvCxnSpPr>
-          <p:spPr>
-            <a:xfrm flipH="1">
-              <a:off x="10443103" y="3131080"/>
-              <a:ext cx="1745722" cy="1745720"/>
-            </a:xfrm>
-            <a:prstGeom prst="line">
-              <a:avLst/>
-            </a:prstGeom>
-            <a:ln w="28575">
-              <a:solidFill>
-                <a:schemeClr val="tx1"/>
-              </a:solidFill>
-            </a:ln>
-          </p:spPr>
-          <p:style>
-            <a:lnRef idx="2">
-              <a:schemeClr val="accent1"/>
-            </a:lnRef>
-            <a:fillRef idx="0">
-              <a:schemeClr val="accent1"/>
-            </a:fillRef>
-            <a:effectRef idx="1">
-              <a:schemeClr val="accent1"/>
-            </a:effectRef>
-            <a:fontRef idx="minor">
-              <a:schemeClr val="tx1"/>
-            </a:fontRef>
-          </p:style>
-        </p:cxnSp>
-        <p:cxnSp>
-          <p:nvCxnSpPr>
-            <p:cNvPr id="15" name="Straight Connector 14">
-              <a:extLst>
-                <a:ext uri="{FF2B5EF4-FFF2-40B4-BE49-F238E27FC236}">
-                  <a16:creationId xmlns:a16="http://schemas.microsoft.com/office/drawing/2014/main" id="{7A44A8A0-B44F-423F-9640-FA10CD18BFD3}"/>
-                </a:ext>
-                <a:ext uri="{C183D7F6-B498-43B3-948B-1728B52AA6E4}">
-                  <adec:decorative xmlns:adec="http://schemas.microsoft.com/office/drawing/2017/decorative" val="1"/>
-                </a:ext>
-              </a:extLst>
-            </p:cNvPr>
-            <p:cNvCxnSpPr/>
-            <p:nvPr>
-              <p:extLst>
-                <p:ext uri="{386F3935-93C4-4BCD-93E2-E3B085C9AB24}">
-                  <p16:designElem xmlns:p16="http://schemas.microsoft.com/office/powerpoint/2015/main" val="1"/>
-                </p:ext>
-              </p:extLst>
-            </p:nvPr>
-          </p:nvCxnSpPr>
-          <p:spPr>
-            <a:xfrm flipH="1">
-              <a:off x="10918826" y="3683001"/>
-              <a:ext cx="1270001" cy="1269999"/>
-            </a:xfrm>
-            <a:prstGeom prst="line">
-              <a:avLst/>
-            </a:prstGeom>
-            <a:ln w="28575">
-              <a:solidFill>
-                <a:schemeClr val="tx1"/>
-              </a:solidFill>
-            </a:ln>
-          </p:spPr>
-          <p:style>
-            <a:lnRef idx="2">
-              <a:schemeClr val="accent1"/>
-            </a:lnRef>
-            <a:fillRef idx="0">
-              <a:schemeClr val="accent1"/>
-            </a:fillRef>
-            <a:effectRef idx="1">
-              <a:schemeClr val="accent1"/>
-            </a:effectRef>
-            <a:fontRef idx="minor">
-              <a:schemeClr val="tx1"/>
-            </a:fontRef>
-          </p:style>
-        </p:cxnSp>
-      </p:grpSp>
-    </p:spTree>
-    <p:extLst>
-      <p:ext uri="{BB962C8B-B14F-4D97-AF65-F5344CB8AC3E}">
-        <p14:creationId xmlns:p14="http://schemas.microsoft.com/office/powerpoint/2010/main" val="1864514973"/>
-      </p:ext>
-    </p:extLst>
-  </p:cSld>
-  <p:clrMapOvr>
-    <a:masterClrMapping/>
-  </p:clrMapOvr>
-</p:sld>
-</file>
-
-<file path=ppt/slides/slide11.xml><?xml version="1.0" encoding="utf-8"?>
-<p:sld xmlns:a="http://schemas.openxmlformats.org/drawingml/2006/main" xmlns:r="http://schemas.openxmlformats.org/officeDocument/2006/relationships" xmlns:p="http://schemas.openxmlformats.org/presentationml/2006/main">
-  <p:cSld>
-    <p:spTree>
-      <p:nvGrpSpPr>
-        <p:cNvPr id="1" name=""/>
-        <p:cNvGrpSpPr/>
-        <p:nvPr/>
-      </p:nvGrpSpPr>
-      <p:grpSpPr>
-        <a:xfrm>
-          <a:off x="0" y="0"/>
-          <a:ext cx="0" cy="0"/>
-          <a:chOff x="0" y="0"/>
-          <a:chExt cx="0" cy="0"/>
-        </a:xfrm>
-      </p:grpSpPr>
       <p:sp>
         <p:nvSpPr>
           <p:cNvPr id="2" name="Title 1">
@@ -6465,14 +6018,29 @@
             <p:ph type="body" idx="1"/>
           </p:nvPr>
         </p:nvSpPr>
-        <p:spPr/>
-        <p:txBody>
-          <a:bodyPr/>
+        <p:spPr>
+          <a:xfrm>
+            <a:off x="684213" y="4495800"/>
+            <a:ext cx="8534400" cy="864870"/>
+          </a:xfrm>
+        </p:spPr>
+        <p:txBody>
+          <a:bodyPr>
+            <a:normAutofit lnSpcReduction="10000"/>
+          </a:bodyPr>
           <a:lstStyle/>
           <a:p>
             <a:r>
               <a:rPr lang="en-US" dirty="0"/>
-              <a:t>Music seems to not be directly associated to an attribute captured by the Spotify system.  As we can see in the next set of slides the trend changes.</a:t>
+              <a:t>While the top songs have only a small correlation with the attributes for the full 60 years, we decided to breakdown the songs using the </a:t>
+            </a:r>
+            <a:r>
+              <a:rPr lang="en-US" dirty="0" err="1"/>
+              <a:t>WeekID</a:t>
+            </a:r>
+            <a:r>
+              <a:rPr lang="en-US" dirty="0"/>
+              <a:t> by decade.  </a:t>
             </a:r>
           </a:p>
         </p:txBody>
@@ -6490,7 +6058,7 @@
 </p:sld>
 </file>
 
-<file path=ppt/slides/slide12.xml><?xml version="1.0" encoding="utf-8"?>
+<file path=ppt/slides/slide11.xml><?xml version="1.0" encoding="utf-8"?>
 <p:sld xmlns:a="http://schemas.openxmlformats.org/drawingml/2006/main" xmlns:r="http://schemas.openxmlformats.org/officeDocument/2006/relationships" xmlns:p="http://schemas.openxmlformats.org/presentationml/2006/main">
   <p:cSld>
     <p:spTree>
@@ -6611,7 +6179,7 @@
         </p:nvSpPr>
         <p:spPr>
           <a:xfrm>
-            <a:off x="2493818" y="332510"/>
+            <a:off x="2673927" y="338096"/>
             <a:ext cx="6844145" cy="461665"/>
           </a:xfrm>
           <a:prstGeom prst="rect">
@@ -6625,9 +6193,10 @@
           </a:bodyPr>
           <a:lstStyle/>
           <a:p>
+            <a:pPr algn="ctr"/>
             <a:r>
               <a:rPr lang="en-US" sz="2400" b="1" dirty="0"/>
-              <a:t>Loudness trends over the last 70 years</a:t>
+              <a:t>Loudness trends over the last 60+ years</a:t>
             </a:r>
           </a:p>
         </p:txBody>
@@ -6661,7 +6230,13 @@
           <a:lstStyle/>
           <a:p>
             <a:r>
-              <a:rPr lang="en-US" sz="2400" b="1" dirty="0"/>
+              <a:rPr lang="en-US" sz="2400" b="1" dirty="0">
+                <a:solidFill>
+                  <a:schemeClr val="tx2">
+                    <a:lumMod val="75000"/>
+                  </a:schemeClr>
+                </a:solidFill>
+              </a:rPr>
               <a:t>Music has increased in loudness over the years</a:t>
             </a:r>
           </a:p>
@@ -6680,7 +6255,7 @@
 </p:sld>
 </file>
 
-<file path=ppt/slides/slide13.xml><?xml version="1.0" encoding="utf-8"?>
+<file path=ppt/slides/slide12.xml><?xml version="1.0" encoding="utf-8"?>
 <p:sld xmlns:a="http://schemas.openxmlformats.org/drawingml/2006/main" xmlns:r="http://schemas.openxmlformats.org/officeDocument/2006/relationships" xmlns:p="http://schemas.openxmlformats.org/presentationml/2006/main">
   <p:cSld>
     <p:bg>
@@ -7992,8 +7567,8 @@
         </p:blipFill>
         <p:spPr>
           <a:xfrm>
-            <a:off x="529591" y="110968"/>
-            <a:ext cx="3217332" cy="2144888"/>
+            <a:off x="542043" y="177522"/>
+            <a:ext cx="3024696" cy="2016464"/>
           </a:xfrm>
           <a:prstGeom prst="rect">
             <a:avLst/>
@@ -8044,13 +7619,20 @@
         </p:nvSpPr>
         <p:spPr>
           <a:xfrm>
-            <a:off x="3900145" y="6195624"/>
-            <a:ext cx="6844145" cy="461665"/>
+            <a:off x="3566739" y="5541390"/>
+            <a:ext cx="6844145" cy="1077218"/>
           </a:xfrm>
           <a:prstGeom prst="rect">
             <a:avLst/>
           </a:prstGeom>
-          <a:noFill/>
+          <a:solidFill>
+            <a:schemeClr val="bg1"/>
+          </a:solidFill>
+          <a:ln>
+            <a:solidFill>
+              <a:schemeClr val="tx1"/>
+            </a:solidFill>
+          </a:ln>
         </p:spPr>
         <p:txBody>
           <a:bodyPr wrap="square" rtlCol="0">
@@ -8058,9 +7640,51 @@
           </a:bodyPr>
           <a:lstStyle/>
           <a:p>
-            <a:r>
-              <a:rPr lang="en-US" sz="2400" b="1" dirty="0"/>
-              <a:t>Tempo trends over the last 70 years</a:t>
+            <a:pPr algn="ctr"/>
+            <a:r>
+              <a:rPr lang="en-US" sz="2400" b="1" dirty="0">
+                <a:solidFill>
+                  <a:schemeClr val="bg2">
+                    <a:lumMod val="20000"/>
+                    <a:lumOff val="80000"/>
+                  </a:schemeClr>
+                </a:solidFill>
+              </a:rPr>
+              <a:t>Tempo trends over the last 60+ years</a:t>
+            </a:r>
+          </a:p>
+          <a:p>
+            <a:pPr marL="342900" indent="-342900">
+              <a:buFont typeface="Arial" panose="020B0604020202020204" pitchFamily="34" charset="0"/>
+              <a:buChar char="•"/>
+            </a:pPr>
+            <a:r>
+              <a:rPr lang="en-US" sz="2000" b="1" dirty="0">
+                <a:solidFill>
+                  <a:schemeClr val="bg2">
+                    <a:lumMod val="20000"/>
+                    <a:lumOff val="80000"/>
+                  </a:schemeClr>
+                </a:solidFill>
+              </a:rPr>
+              <a:t>Large jump from 50’s to 60’s</a:t>
+            </a:r>
+          </a:p>
+          <a:p>
+            <a:pPr marL="342900" indent="-342900">
+              <a:buFont typeface="Arial" panose="020B0604020202020204" pitchFamily="34" charset="0"/>
+              <a:buChar char="•"/>
+            </a:pPr>
+            <a:r>
+              <a:rPr lang="en-US" sz="2000" b="1" dirty="0">
+                <a:solidFill>
+                  <a:schemeClr val="bg2">
+                    <a:lumMod val="20000"/>
+                    <a:lumOff val="80000"/>
+                  </a:schemeClr>
+                </a:solidFill>
+              </a:rPr>
+              <a:t>Slow increase for the last 60 years</a:t>
             </a:r>
           </a:p>
         </p:txBody>
@@ -8078,7 +7702,7 @@
 </p:sld>
 </file>
 
-<file path=ppt/slides/slide14.xml><?xml version="1.0" encoding="utf-8"?>
+<file path=ppt/slides/slide13.xml><?xml version="1.0" encoding="utf-8"?>
 <p:sld xmlns:a="http://schemas.openxmlformats.org/drawingml/2006/main" xmlns:r="http://schemas.openxmlformats.org/officeDocument/2006/relationships" xmlns:p="http://schemas.openxmlformats.org/presentationml/2006/main">
   <p:cSld>
     <p:spTree>
@@ -8277,36 +7901,6 @@
       </p:pic>
       <p:pic>
         <p:nvPicPr>
-          <p:cNvPr id="15" name="Picture 14" descr="A screenshot of a cell phone&#10;&#10;Description automatically generated">
-            <a:extLst>
-              <a:ext uri="{FF2B5EF4-FFF2-40B4-BE49-F238E27FC236}">
-                <a16:creationId xmlns:a16="http://schemas.microsoft.com/office/drawing/2014/main" id="{7443100F-B243-4DE5-B32E-061FF143B788}"/>
-              </a:ext>
-            </a:extLst>
-          </p:cNvPr>
-          <p:cNvPicPr>
-            <a:picLocks noChangeAspect="1"/>
-          </p:cNvPicPr>
-          <p:nvPr/>
-        </p:nvPicPr>
-        <p:blipFill>
-          <a:blip r:embed="rId8"/>
-          <a:stretch>
-            <a:fillRect/>
-          </a:stretch>
-        </p:blipFill>
-        <p:spPr>
-          <a:xfrm>
-            <a:off x="4162176" y="4707730"/>
-            <a:ext cx="3225404" cy="2150269"/>
-          </a:xfrm>
-          <a:prstGeom prst="rect">
-            <a:avLst/>
-          </a:prstGeom>
-        </p:spPr>
-      </p:pic>
-      <p:pic>
-        <p:nvPicPr>
           <p:cNvPr id="17" name="Picture 16" descr="A screenshot of a cell phone&#10;&#10;Description automatically generated">
             <a:extLst>
               <a:ext uri="{FF2B5EF4-FFF2-40B4-BE49-F238E27FC236}">
@@ -8349,8 +7943,8 @@
         </p:nvSpPr>
         <p:spPr>
           <a:xfrm>
-            <a:off x="7537938" y="5228492"/>
-            <a:ext cx="4433463" cy="646331"/>
+            <a:off x="4036444" y="4804448"/>
+            <a:ext cx="7667876" cy="1477328"/>
           </a:xfrm>
           <a:prstGeom prst="rect">
             <a:avLst/>
@@ -8370,9 +7964,50 @@
           </a:bodyPr>
           <a:lstStyle/>
           <a:p>
+            <a:pPr algn="ctr"/>
             <a:r>
               <a:rPr lang="en-US" b="1" dirty="0"/>
-              <a:t>Energy level of top songs have seemed to increase over the decades</a:t>
+              <a:t>Energy level of top songs </a:t>
+            </a:r>
+          </a:p>
+          <a:p>
+            <a:pPr marL="285750" indent="-285750">
+              <a:buFont typeface="Arial" panose="020B0604020202020204" pitchFamily="34" charset="0"/>
+              <a:buChar char="•"/>
+            </a:pPr>
+            <a:r>
+              <a:rPr lang="en-US" b="1" dirty="0"/>
+              <a:t>increase by 10% between 50’s and 60’s</a:t>
+            </a:r>
+          </a:p>
+          <a:p>
+            <a:pPr marL="285750" indent="-285750">
+              <a:buFont typeface="Arial" panose="020B0604020202020204" pitchFamily="34" charset="0"/>
+              <a:buChar char="•"/>
+            </a:pPr>
+            <a:r>
+              <a:rPr lang="en-US" b="1" dirty="0"/>
+              <a:t>increase by only 5% between 60’s and 80’s</a:t>
+            </a:r>
+          </a:p>
+          <a:p>
+            <a:pPr marL="285750" indent="-285750">
+              <a:buFont typeface="Arial" panose="020B0604020202020204" pitchFamily="34" charset="0"/>
+              <a:buChar char="•"/>
+            </a:pPr>
+            <a:r>
+              <a:rPr lang="en-US" b="1" dirty="0"/>
+              <a:t>stabilizes after 1980’s</a:t>
+            </a:r>
+          </a:p>
+          <a:p>
+            <a:pPr marL="285750" indent="-285750">
+              <a:buFont typeface="Arial" panose="020B0604020202020204" pitchFamily="34" charset="0"/>
+              <a:buChar char="•"/>
+            </a:pPr>
+            <a:r>
+              <a:rPr lang="en-US" b="1" dirty="0"/>
+              <a:t>roughly over 25% over the 60+ years</a:t>
             </a:r>
           </a:p>
         </p:txBody>
@@ -8390,7 +8025,7 @@
 </p:sld>
 </file>
 
-<file path=ppt/slides/slide15.xml><?xml version="1.0" encoding="utf-8"?>
+<file path=ppt/slides/slide14.xml><?xml version="1.0" encoding="utf-8"?>
 <p:sld xmlns:a="http://schemas.openxmlformats.org/drawingml/2006/main" xmlns:r="http://schemas.openxmlformats.org/officeDocument/2006/relationships" xmlns:p="http://schemas.openxmlformats.org/presentationml/2006/main">
   <p:cSld>
     <p:spTree>
@@ -8409,10 +8044,724 @@
       </p:grpSpPr>
       <p:sp>
         <p:nvSpPr>
-          <p:cNvPr id="2" name="Title 1">
+          <p:cNvPr id="4" name="AutoShape 4">
             <a:extLst>
               <a:ext uri="{FF2B5EF4-FFF2-40B4-BE49-F238E27FC236}">
-                <a16:creationId xmlns:a16="http://schemas.microsoft.com/office/drawing/2014/main" id="{E4AADE62-ED62-4107-A5BA-DD4BF44C106D}"/>
+                <a16:creationId xmlns:a16="http://schemas.microsoft.com/office/drawing/2014/main" id="{FC86168F-EAC4-4162-B0A1-DF0BBC3ADCD5}"/>
+              </a:ext>
+            </a:extLst>
+          </p:cNvPr>
+          <p:cNvSpPr>
+            <a:spLocks noChangeAspect="1" noChangeArrowheads="1"/>
+          </p:cNvSpPr>
+          <p:nvPr/>
+        </p:nvSpPr>
+        <p:spPr bwMode="auto">
+          <a:xfrm>
+            <a:off x="5566410" y="3276600"/>
+            <a:ext cx="681990" cy="681990"/>
+          </a:xfrm>
+          <a:prstGeom prst="rect">
+            <a:avLst/>
+          </a:prstGeom>
+          <a:noFill/>
+          <a:extLst>
+            <a:ext uri="{909E8E84-426E-40DD-AFC4-6F175D3DCCD1}">
+              <a14:hiddenFill xmlns:a14="http://schemas.microsoft.com/office/drawing/2010/main">
+                <a:solidFill>
+                  <a:srgbClr val="FFFFFF"/>
+                </a:solidFill>
+              </a14:hiddenFill>
+            </a:ext>
+          </a:extLst>
+        </p:spPr>
+        <p:txBody>
+          <a:bodyPr vert="horz" wrap="square" lIns="91440" tIns="45720" rIns="91440" bIns="45720" numCol="1" anchor="t" anchorCtr="0" compatLnSpc="1">
+            <a:prstTxWarp prst="textNoShape">
+              <a:avLst/>
+            </a:prstTxWarp>
+          </a:bodyPr>
+          <a:lstStyle/>
+          <a:p>
+            <a:endParaRPr lang="en-US"/>
+          </a:p>
+        </p:txBody>
+      </p:sp>
+      <p:pic>
+        <p:nvPicPr>
+          <p:cNvPr id="6" name="Picture 5" descr="A close up of a logo&#10;&#10;Description automatically generated">
+            <a:extLst>
+              <a:ext uri="{FF2B5EF4-FFF2-40B4-BE49-F238E27FC236}">
+                <a16:creationId xmlns:a16="http://schemas.microsoft.com/office/drawing/2014/main" id="{D1B8D0F8-2289-461F-B086-6B0B8907A580}"/>
+              </a:ext>
+            </a:extLst>
+          </p:cNvPr>
+          <p:cNvPicPr>
+            <a:picLocks noChangeAspect="1"/>
+          </p:cNvPicPr>
+          <p:nvPr/>
+        </p:nvPicPr>
+        <p:blipFill>
+          <a:blip r:embed="rId2"/>
+          <a:stretch>
+            <a:fillRect/>
+          </a:stretch>
+        </p:blipFill>
+        <p:spPr>
+          <a:xfrm>
+            <a:off x="1758315" y="260544"/>
+            <a:ext cx="8460105" cy="6336912"/>
+          </a:xfrm>
+          <a:prstGeom prst="rect">
+            <a:avLst/>
+          </a:prstGeom>
+        </p:spPr>
+      </p:pic>
+    </p:spTree>
+    <p:extLst>
+      <p:ext uri="{BB962C8B-B14F-4D97-AF65-F5344CB8AC3E}">
+        <p14:creationId xmlns:p14="http://schemas.microsoft.com/office/powerpoint/2010/main" val="384211917"/>
+      </p:ext>
+    </p:extLst>
+  </p:cSld>
+  <p:clrMapOvr>
+    <a:masterClrMapping/>
+  </p:clrMapOvr>
+</p:sld>
+</file>
+
+<file path=ppt/slides/slide15.xml><?xml version="1.0" encoding="utf-8"?>
+<p:sld xmlns:a="http://schemas.openxmlformats.org/drawingml/2006/main" xmlns:r="http://schemas.openxmlformats.org/officeDocument/2006/relationships" xmlns:p="http://schemas.openxmlformats.org/presentationml/2006/main">
+  <p:cSld>
+    <p:bg>
+      <p:bgPr>
+        <a:gradFill rotWithShape="1">
+          <a:gsLst>
+            <a:gs pos="10000">
+              <a:schemeClr val="bg2">
+                <a:tint val="97000"/>
+                <a:hueMod val="92000"/>
+                <a:satMod val="169000"/>
+                <a:lumMod val="164000"/>
+              </a:schemeClr>
+            </a:gs>
+            <a:gs pos="100000">
+              <a:schemeClr val="bg2">
+                <a:shade val="96000"/>
+                <a:satMod val="120000"/>
+                <a:lumMod val="90000"/>
+              </a:schemeClr>
+            </a:gs>
+          </a:gsLst>
+          <a:lin ang="6120000" scaled="1"/>
+        </a:gradFill>
+        <a:effectLst/>
+      </p:bgPr>
+    </p:bg>
+    <p:spTree>
+      <p:nvGrpSpPr>
+        <p:cNvPr id="1" name=""/>
+        <p:cNvGrpSpPr/>
+        <p:nvPr/>
+      </p:nvGrpSpPr>
+      <p:grpSpPr>
+        <a:xfrm>
+          <a:off x="0" y="0"/>
+          <a:ext cx="0" cy="0"/>
+          <a:chOff x="0" y="0"/>
+          <a:chExt cx="0" cy="0"/>
+        </a:xfrm>
+      </p:grpSpPr>
+      <p:sp useBgFill="1">
+        <p:nvSpPr>
+          <p:cNvPr id="8" name="Rectangle 7">
+            <a:extLst>
+              <a:ext uri="{FF2B5EF4-FFF2-40B4-BE49-F238E27FC236}">
+                <a16:creationId xmlns:a16="http://schemas.microsoft.com/office/drawing/2014/main" id="{9A212F8F-D812-4A16-BE82-F3500DE32174}"/>
+              </a:ext>
+              <a:ext uri="{C183D7F6-B498-43B3-948B-1728B52AA6E4}">
+                <adec:decorative xmlns:adec="http://schemas.microsoft.com/office/drawing/2017/decorative" val="1"/>
+              </a:ext>
+            </a:extLst>
+          </p:cNvPr>
+          <p:cNvSpPr>
+            <a:spLocks noGrp="1" noRot="1" noChangeAspect="1" noMove="1" noResize="1" noEditPoints="1" noAdjustHandles="1" noChangeArrowheads="1" noChangeShapeType="1" noTextEdit="1"/>
+          </p:cNvSpPr>
+          <p:nvPr>
+            <p:extLst>
+              <p:ext uri="{386F3935-93C4-4BCD-93E2-E3B085C9AB24}">
+                <p16:designElem xmlns:p16="http://schemas.microsoft.com/office/powerpoint/2015/main" val="1"/>
+              </p:ext>
+            </p:extLst>
+          </p:nvPr>
+        </p:nvSpPr>
+        <p:spPr>
+          <a:xfrm>
+            <a:off x="0" y="0"/>
+            <a:ext cx="12192000" cy="6858000"/>
+          </a:xfrm>
+          <a:prstGeom prst="rect">
+            <a:avLst/>
+          </a:prstGeom>
+          <a:ln>
+            <a:noFill/>
+          </a:ln>
+        </p:spPr>
+        <p:style>
+          <a:lnRef idx="2">
+            <a:schemeClr val="accent1">
+              <a:shade val="50000"/>
+            </a:schemeClr>
+          </a:lnRef>
+          <a:fillRef idx="1">
+            <a:schemeClr val="accent1"/>
+          </a:fillRef>
+          <a:effectRef idx="0">
+            <a:schemeClr val="accent1"/>
+          </a:effectRef>
+          <a:fontRef idx="minor">
+            <a:schemeClr val="lt1"/>
+          </a:fontRef>
+        </p:style>
+        <p:txBody>
+          <a:bodyPr rtlCol="0" anchor="ctr"/>
+          <a:lstStyle/>
+          <a:p>
+            <a:pPr algn="ctr"/>
+            <a:endParaRPr lang="en-US"/>
+          </a:p>
+        </p:txBody>
+      </p:sp>
+      <p:sp>
+        <p:nvSpPr>
+          <p:cNvPr id="10" name="Snip Diagonal Corner Rectangle 24">
+            <a:extLst>
+              <a:ext uri="{FF2B5EF4-FFF2-40B4-BE49-F238E27FC236}">
+                <a16:creationId xmlns:a16="http://schemas.microsoft.com/office/drawing/2014/main" id="{D2CF1D1B-04ED-443D-A9FE-68BF8859BDD6}"/>
+              </a:ext>
+              <a:ext uri="{C183D7F6-B498-43B3-948B-1728B52AA6E4}">
+                <adec:decorative xmlns:adec="http://schemas.microsoft.com/office/drawing/2017/decorative" val="1"/>
+              </a:ext>
+            </a:extLst>
+          </p:cNvPr>
+          <p:cNvSpPr>
+            <a:spLocks noGrp="1" noRot="1" noChangeAspect="1" noMove="1" noResize="1" noEditPoints="1" noAdjustHandles="1" noChangeArrowheads="1" noChangeShapeType="1" noTextEdit="1"/>
+          </p:cNvSpPr>
+          <p:nvPr>
+            <p:extLst>
+              <p:ext uri="{386F3935-93C4-4BCD-93E2-E3B085C9AB24}">
+                <p16:designElem xmlns:p16="http://schemas.microsoft.com/office/powerpoint/2015/main" val="1"/>
+              </p:ext>
+            </p:extLst>
+          </p:nvPr>
+        </p:nvSpPr>
+        <p:spPr>
+          <a:xfrm>
+            <a:off x="628229" y="620722"/>
+            <a:ext cx="10935543" cy="5286838"/>
+          </a:xfrm>
+          <a:prstGeom prst="snip2DiagRect">
+            <a:avLst>
+              <a:gd name="adj1" fmla="val 10787"/>
+              <a:gd name="adj2" fmla="val 0"/>
+            </a:avLst>
+          </a:prstGeom>
+          <a:solidFill>
+            <a:schemeClr val="tx1"/>
+          </a:solidFill>
+          <a:ln>
+            <a:noFill/>
+          </a:ln>
+          <a:effectLst>
+            <a:innerShdw blurRad="57150" dist="38100" dir="14460000">
+              <a:prstClr val="black">
+                <a:alpha val="70000"/>
+              </a:prstClr>
+            </a:innerShdw>
+          </a:effectLst>
+        </p:spPr>
+        <p:style>
+          <a:lnRef idx="2">
+            <a:schemeClr val="accent1">
+              <a:shade val="50000"/>
+            </a:schemeClr>
+          </a:lnRef>
+          <a:fillRef idx="1">
+            <a:schemeClr val="accent1"/>
+          </a:fillRef>
+          <a:effectRef idx="0">
+            <a:schemeClr val="accent1"/>
+          </a:effectRef>
+          <a:fontRef idx="minor">
+            <a:schemeClr val="lt1"/>
+          </a:fontRef>
+        </p:style>
+        <p:txBody>
+          <a:bodyPr rtlCol="0" anchor="ctr"/>
+          <a:lstStyle/>
+          <a:p>
+            <a:pPr algn="ctr"/>
+            <a:endParaRPr lang="en-US"/>
+          </a:p>
+        </p:txBody>
+      </p:sp>
+      <p:pic>
+        <p:nvPicPr>
+          <p:cNvPr id="3" name="Picture 2" descr="A picture containing screenshot&#10;&#10;Description automatically generated">
+            <a:extLst>
+              <a:ext uri="{FF2B5EF4-FFF2-40B4-BE49-F238E27FC236}">
+                <a16:creationId xmlns:a16="http://schemas.microsoft.com/office/drawing/2014/main" id="{968ACF23-9F79-4099-BD21-4CCECBC8921E}"/>
+              </a:ext>
+            </a:extLst>
+          </p:cNvPr>
+          <p:cNvPicPr>
+            <a:picLocks noChangeAspect="1"/>
+          </p:cNvPicPr>
+          <p:nvPr/>
+        </p:nvPicPr>
+        <p:blipFill>
+          <a:blip r:embed="rId2"/>
+          <a:stretch>
+            <a:fillRect/>
+          </a:stretch>
+        </p:blipFill>
+        <p:spPr>
+          <a:xfrm>
+            <a:off x="3480743" y="786117"/>
+            <a:ext cx="5230513" cy="4956048"/>
+          </a:xfrm>
+          <a:custGeom>
+            <a:avLst/>
+            <a:gdLst/>
+            <a:ahLst/>
+            <a:cxnLst/>
+            <a:rect l="l" t="t" r="r" b="b"/>
+            <a:pathLst>
+              <a:path w="10607040" h="4956048">
+                <a:moveTo>
+                  <a:pt x="497480" y="0"/>
+                </a:moveTo>
+                <a:lnTo>
+                  <a:pt x="10607040" y="0"/>
+                </a:lnTo>
+                <a:lnTo>
+                  <a:pt x="10607040" y="4485407"/>
+                </a:lnTo>
+                <a:lnTo>
+                  <a:pt x="10131692" y="4956048"/>
+                </a:lnTo>
+                <a:lnTo>
+                  <a:pt x="0" y="4956048"/>
+                </a:lnTo>
+                <a:lnTo>
+                  <a:pt x="0" y="492554"/>
+                </a:lnTo>
+                <a:close/>
+              </a:path>
+            </a:pathLst>
+          </a:custGeom>
+        </p:spPr>
+      </p:pic>
+    </p:spTree>
+    <p:extLst>
+      <p:ext uri="{BB962C8B-B14F-4D97-AF65-F5344CB8AC3E}">
+        <p14:creationId xmlns:p14="http://schemas.microsoft.com/office/powerpoint/2010/main" val="354653436"/>
+      </p:ext>
+    </p:extLst>
+  </p:cSld>
+  <p:clrMapOvr>
+    <a:masterClrMapping/>
+  </p:clrMapOvr>
+</p:sld>
+</file>
+
+<file path=ppt/slides/slide16.xml><?xml version="1.0" encoding="utf-8"?>
+<p:sld xmlns:a="http://schemas.openxmlformats.org/drawingml/2006/main" xmlns:r="http://schemas.openxmlformats.org/officeDocument/2006/relationships" xmlns:p="http://schemas.openxmlformats.org/presentationml/2006/main">
+  <p:cSld>
+    <p:bg>
+      <p:bgPr>
+        <a:gradFill rotWithShape="1">
+          <a:gsLst>
+            <a:gs pos="10000">
+              <a:schemeClr val="bg2">
+                <a:tint val="97000"/>
+                <a:hueMod val="92000"/>
+                <a:satMod val="169000"/>
+                <a:lumMod val="164000"/>
+              </a:schemeClr>
+            </a:gs>
+            <a:gs pos="100000">
+              <a:schemeClr val="bg2">
+                <a:shade val="96000"/>
+                <a:satMod val="120000"/>
+                <a:lumMod val="90000"/>
+              </a:schemeClr>
+            </a:gs>
+          </a:gsLst>
+          <a:lin ang="6120000" scaled="1"/>
+        </a:gradFill>
+        <a:effectLst/>
+      </p:bgPr>
+    </p:bg>
+    <p:spTree>
+      <p:nvGrpSpPr>
+        <p:cNvPr id="1" name=""/>
+        <p:cNvGrpSpPr/>
+        <p:nvPr/>
+      </p:nvGrpSpPr>
+      <p:grpSpPr>
+        <a:xfrm>
+          <a:off x="0" y="0"/>
+          <a:ext cx="0" cy="0"/>
+          <a:chOff x="0" y="0"/>
+          <a:chExt cx="0" cy="0"/>
+        </a:xfrm>
+      </p:grpSpPr>
+      <p:sp useBgFill="1">
+        <p:nvSpPr>
+          <p:cNvPr id="8" name="Rectangle 7">
+            <a:extLst>
+              <a:ext uri="{FF2B5EF4-FFF2-40B4-BE49-F238E27FC236}">
+                <a16:creationId xmlns:a16="http://schemas.microsoft.com/office/drawing/2014/main" id="{43F8250A-B5BC-48E8-9E34-320C6AB61351}"/>
+              </a:ext>
+              <a:ext uri="{C183D7F6-B498-43B3-948B-1728B52AA6E4}">
+                <adec:decorative xmlns:adec="http://schemas.microsoft.com/office/drawing/2017/decorative" val="1"/>
+              </a:ext>
+            </a:extLst>
+          </p:cNvPr>
+          <p:cNvSpPr>
+            <a:spLocks noGrp="1" noRot="1" noChangeAspect="1" noMove="1" noResize="1" noEditPoints="1" noAdjustHandles="1" noChangeArrowheads="1" noChangeShapeType="1" noTextEdit="1"/>
+          </p:cNvSpPr>
+          <p:nvPr>
+            <p:extLst>
+              <p:ext uri="{386F3935-93C4-4BCD-93E2-E3B085C9AB24}">
+                <p16:designElem xmlns:p16="http://schemas.microsoft.com/office/powerpoint/2015/main" val="1"/>
+              </p:ext>
+            </p:extLst>
+          </p:nvPr>
+        </p:nvSpPr>
+        <p:spPr>
+          <a:xfrm>
+            <a:off x="0" y="0"/>
+            <a:ext cx="12192000" cy="6858000"/>
+          </a:xfrm>
+          <a:prstGeom prst="rect">
+            <a:avLst/>
+          </a:prstGeom>
+          <a:ln>
+            <a:noFill/>
+          </a:ln>
+        </p:spPr>
+        <p:style>
+          <a:lnRef idx="2">
+            <a:schemeClr val="accent1">
+              <a:shade val="50000"/>
+            </a:schemeClr>
+          </a:lnRef>
+          <a:fillRef idx="1">
+            <a:schemeClr val="accent1"/>
+          </a:fillRef>
+          <a:effectRef idx="0">
+            <a:schemeClr val="accent1"/>
+          </a:effectRef>
+          <a:fontRef idx="minor">
+            <a:schemeClr val="lt1"/>
+          </a:fontRef>
+        </p:style>
+        <p:txBody>
+          <a:bodyPr rtlCol="0" anchor="ctr"/>
+          <a:lstStyle/>
+          <a:p>
+            <a:pPr algn="ctr"/>
+            <a:endParaRPr lang="en-US"/>
+          </a:p>
+        </p:txBody>
+      </p:sp>
+      <p:sp>
+        <p:nvSpPr>
+          <p:cNvPr id="10" name="Snip Diagonal Corner Rectangle 24">
+            <a:extLst>
+              <a:ext uri="{FF2B5EF4-FFF2-40B4-BE49-F238E27FC236}">
+                <a16:creationId xmlns:a16="http://schemas.microsoft.com/office/drawing/2014/main" id="{A2829537-8D6E-4F27-8454-8F19BEA8C11F}"/>
+              </a:ext>
+              <a:ext uri="{C183D7F6-B498-43B3-948B-1728B52AA6E4}">
+                <adec:decorative xmlns:adec="http://schemas.microsoft.com/office/drawing/2017/decorative" val="1"/>
+              </a:ext>
+            </a:extLst>
+          </p:cNvPr>
+          <p:cNvSpPr>
+            <a:spLocks noGrp="1" noRot="1" noChangeAspect="1" noMove="1" noResize="1" noEditPoints="1" noAdjustHandles="1" noChangeArrowheads="1" noChangeShapeType="1" noTextEdit="1"/>
+          </p:cNvSpPr>
+          <p:nvPr>
+            <p:extLst>
+              <p:ext uri="{386F3935-93C4-4BCD-93E2-E3B085C9AB24}">
+                <p16:designElem xmlns:p16="http://schemas.microsoft.com/office/powerpoint/2015/main" val="1"/>
+              </p:ext>
+            </p:extLst>
+          </p:nvPr>
+        </p:nvSpPr>
+        <p:spPr>
+          <a:xfrm>
+            <a:off x="628229" y="620722"/>
+            <a:ext cx="10935543" cy="5286838"/>
+          </a:xfrm>
+          <a:prstGeom prst="snip2DiagRect">
+            <a:avLst>
+              <a:gd name="adj1" fmla="val 10787"/>
+              <a:gd name="adj2" fmla="val 0"/>
+            </a:avLst>
+          </a:prstGeom>
+          <a:solidFill>
+            <a:schemeClr val="tx1"/>
+          </a:solidFill>
+          <a:ln>
+            <a:noFill/>
+          </a:ln>
+          <a:effectLst>
+            <a:innerShdw blurRad="57150" dist="38100" dir="14460000">
+              <a:prstClr val="black">
+                <a:alpha val="70000"/>
+              </a:prstClr>
+            </a:innerShdw>
+          </a:effectLst>
+        </p:spPr>
+        <p:style>
+          <a:lnRef idx="2">
+            <a:schemeClr val="accent1">
+              <a:shade val="50000"/>
+            </a:schemeClr>
+          </a:lnRef>
+          <a:fillRef idx="1">
+            <a:schemeClr val="accent1"/>
+          </a:fillRef>
+          <a:effectRef idx="0">
+            <a:schemeClr val="accent1"/>
+          </a:effectRef>
+          <a:fontRef idx="minor">
+            <a:schemeClr val="lt1"/>
+          </a:fontRef>
+        </p:style>
+        <p:txBody>
+          <a:bodyPr rtlCol="0" anchor="ctr"/>
+          <a:lstStyle/>
+          <a:p>
+            <a:pPr algn="ctr"/>
+            <a:endParaRPr lang="en-US"/>
+          </a:p>
+        </p:txBody>
+      </p:sp>
+      <p:pic>
+        <p:nvPicPr>
+          <p:cNvPr id="3" name="Picture 2" descr="A screenshot of a cell phone&#10;&#10;Description automatically generated">
+            <a:extLst>
+              <a:ext uri="{FF2B5EF4-FFF2-40B4-BE49-F238E27FC236}">
+                <a16:creationId xmlns:a16="http://schemas.microsoft.com/office/drawing/2014/main" id="{70894484-0B24-45C3-B12D-F8A0EFD7BDE7}"/>
+              </a:ext>
+            </a:extLst>
+          </p:cNvPr>
+          <p:cNvPicPr>
+            <a:picLocks noChangeAspect="1"/>
+          </p:cNvPicPr>
+          <p:nvPr/>
+        </p:nvPicPr>
+        <p:blipFill rotWithShape="1">
+          <a:blip r:embed="rId2"/>
+          <a:srcRect t="6697" r="1" b="23053"/>
+          <a:stretch/>
+        </p:blipFill>
+        <p:spPr>
+          <a:xfrm>
+            <a:off x="792480" y="786117"/>
+            <a:ext cx="10607040" cy="4956048"/>
+          </a:xfrm>
+          <a:custGeom>
+            <a:avLst/>
+            <a:gdLst/>
+            <a:ahLst/>
+            <a:cxnLst/>
+            <a:rect l="l" t="t" r="r" b="b"/>
+            <a:pathLst>
+              <a:path w="10607040" h="4956048">
+                <a:moveTo>
+                  <a:pt x="497480" y="0"/>
+                </a:moveTo>
+                <a:lnTo>
+                  <a:pt x="10607040" y="0"/>
+                </a:lnTo>
+                <a:lnTo>
+                  <a:pt x="10607040" y="4485407"/>
+                </a:lnTo>
+                <a:lnTo>
+                  <a:pt x="10131692" y="4956048"/>
+                </a:lnTo>
+                <a:lnTo>
+                  <a:pt x="0" y="4956048"/>
+                </a:lnTo>
+                <a:lnTo>
+                  <a:pt x="0" y="492554"/>
+                </a:lnTo>
+                <a:close/>
+              </a:path>
+            </a:pathLst>
+          </a:custGeom>
+        </p:spPr>
+      </p:pic>
+    </p:spTree>
+    <p:extLst>
+      <p:ext uri="{BB962C8B-B14F-4D97-AF65-F5344CB8AC3E}">
+        <p14:creationId xmlns:p14="http://schemas.microsoft.com/office/powerpoint/2010/main" val="3580067603"/>
+      </p:ext>
+    </p:extLst>
+  </p:cSld>
+  <p:clrMapOvr>
+    <a:masterClrMapping/>
+  </p:clrMapOvr>
+</p:sld>
+</file>
+
+<file path=ppt/slides/slide17.xml><?xml version="1.0" encoding="utf-8"?>
+<p:sld xmlns:a="http://schemas.openxmlformats.org/drawingml/2006/main" xmlns:r="http://schemas.openxmlformats.org/officeDocument/2006/relationships" xmlns:p="http://schemas.openxmlformats.org/presentationml/2006/main">
+  <p:cSld>
+    <p:spTree>
+      <p:nvGrpSpPr>
+        <p:cNvPr id="1" name=""/>
+        <p:cNvGrpSpPr/>
+        <p:nvPr/>
+      </p:nvGrpSpPr>
+      <p:grpSpPr>
+        <a:xfrm>
+          <a:off x="0" y="0"/>
+          <a:ext cx="0" cy="0"/>
+          <a:chOff x="0" y="0"/>
+          <a:chExt cx="0" cy="0"/>
+        </a:xfrm>
+      </p:grpSpPr>
+      <p:pic>
+        <p:nvPicPr>
+          <p:cNvPr id="3" name="Picture 2" descr="A screenshot of a cell phone&#10;&#10;Description automatically generated">
+            <a:extLst>
+              <a:ext uri="{FF2B5EF4-FFF2-40B4-BE49-F238E27FC236}">
+                <a16:creationId xmlns:a16="http://schemas.microsoft.com/office/drawing/2014/main" id="{5CD4D0B1-1323-4452-BCDE-8DC0C3E71CD1}"/>
+              </a:ext>
+            </a:extLst>
+          </p:cNvPr>
+          <p:cNvPicPr>
+            <a:picLocks noChangeAspect="1"/>
+          </p:cNvPicPr>
+          <p:nvPr/>
+        </p:nvPicPr>
+        <p:blipFill>
+          <a:blip r:embed="rId2"/>
+          <a:stretch>
+            <a:fillRect/>
+          </a:stretch>
+        </p:blipFill>
+        <p:spPr>
+          <a:xfrm>
+            <a:off x="406756" y="595745"/>
+            <a:ext cx="11550455" cy="5583381"/>
+          </a:xfrm>
+          <a:prstGeom prst="rect">
+            <a:avLst/>
+          </a:prstGeom>
+        </p:spPr>
+      </p:pic>
+    </p:spTree>
+    <p:extLst>
+      <p:ext uri="{BB962C8B-B14F-4D97-AF65-F5344CB8AC3E}">
+        <p14:creationId xmlns:p14="http://schemas.microsoft.com/office/powerpoint/2010/main" val="163832794"/>
+      </p:ext>
+    </p:extLst>
+  </p:cSld>
+  <p:clrMapOvr>
+    <a:masterClrMapping/>
+  </p:clrMapOvr>
+</p:sld>
+</file>
+
+<file path=ppt/slides/slide18.xml><?xml version="1.0" encoding="utf-8"?>
+<p:sld xmlns:a="http://schemas.openxmlformats.org/drawingml/2006/main" xmlns:r="http://schemas.openxmlformats.org/officeDocument/2006/relationships" xmlns:p="http://schemas.openxmlformats.org/presentationml/2006/main">
+  <p:cSld>
+    <p:spTree>
+      <p:nvGrpSpPr>
+        <p:cNvPr id="1" name=""/>
+        <p:cNvGrpSpPr/>
+        <p:nvPr/>
+      </p:nvGrpSpPr>
+      <p:grpSpPr>
+        <a:xfrm>
+          <a:off x="0" y="0"/>
+          <a:ext cx="0" cy="0"/>
+          <a:chOff x="0" y="0"/>
+          <a:chExt cx="0" cy="0"/>
+        </a:xfrm>
+      </p:grpSpPr>
+      <p:pic>
+        <p:nvPicPr>
+          <p:cNvPr id="3" name="Picture 2" descr="A picture containing indoor, kitchen, table, counter&#10;&#10;Description automatically generated">
+            <a:extLst>
+              <a:ext uri="{FF2B5EF4-FFF2-40B4-BE49-F238E27FC236}">
+                <a16:creationId xmlns:a16="http://schemas.microsoft.com/office/drawing/2014/main" id="{88310E2A-9831-4A69-9A33-87825015B054}"/>
+              </a:ext>
+            </a:extLst>
+          </p:cNvPr>
+          <p:cNvPicPr>
+            <a:picLocks noChangeAspect="1"/>
+          </p:cNvPicPr>
+          <p:nvPr/>
+        </p:nvPicPr>
+        <p:blipFill>
+          <a:blip r:embed="rId2"/>
+          <a:stretch>
+            <a:fillRect/>
+          </a:stretch>
+        </p:blipFill>
+        <p:spPr>
+          <a:xfrm>
+            <a:off x="1468581" y="837645"/>
+            <a:ext cx="9414659" cy="5272209"/>
+          </a:xfrm>
+          <a:prstGeom prst="rect">
+            <a:avLst/>
+          </a:prstGeom>
+        </p:spPr>
+      </p:pic>
+    </p:spTree>
+    <p:extLst>
+      <p:ext uri="{BB962C8B-B14F-4D97-AF65-F5344CB8AC3E}">
+        <p14:creationId xmlns:p14="http://schemas.microsoft.com/office/powerpoint/2010/main" val="2691363759"/>
+      </p:ext>
+    </p:extLst>
+  </p:cSld>
+  <p:clrMapOvr>
+    <a:masterClrMapping/>
+  </p:clrMapOvr>
+</p:sld>
+</file>
+
+<file path=ppt/slides/slide19.xml><?xml version="1.0" encoding="utf-8"?>
+<p:sld xmlns:a="http://schemas.openxmlformats.org/drawingml/2006/main" xmlns:r="http://schemas.openxmlformats.org/officeDocument/2006/relationships" xmlns:p="http://schemas.openxmlformats.org/presentationml/2006/main">
+  <p:cSld>
+    <p:spTree>
+      <p:nvGrpSpPr>
+        <p:cNvPr id="1" name=""/>
+        <p:cNvGrpSpPr/>
+        <p:nvPr/>
+      </p:nvGrpSpPr>
+      <p:grpSpPr>
+        <a:xfrm>
+          <a:off x="0" y="0"/>
+          <a:ext cx="0" cy="0"/>
+          <a:chOff x="0" y="0"/>
+          <a:chExt cx="0" cy="0"/>
+        </a:xfrm>
+      </p:grpSpPr>
+      <p:sp>
+        <p:nvSpPr>
+          <p:cNvPr id="4" name="Title 3">
+            <a:extLst>
+              <a:ext uri="{FF2B5EF4-FFF2-40B4-BE49-F238E27FC236}">
+                <a16:creationId xmlns:a16="http://schemas.microsoft.com/office/drawing/2014/main" id="{82BAC18C-02BF-470B-9089-2051A514ABB2}"/>
               </a:ext>
             </a:extLst>
           </p:cNvPr>
@@ -8428,32 +8777,10 @@
           <a:bodyPr/>
           <a:lstStyle/>
           <a:p>
-            <a:endParaRPr lang="en-US"/>
-          </a:p>
-        </p:txBody>
-      </p:sp>
-      <p:sp>
-        <p:nvSpPr>
-          <p:cNvPr id="3" name="Content Placeholder 2">
-            <a:extLst>
-              <a:ext uri="{FF2B5EF4-FFF2-40B4-BE49-F238E27FC236}">
-                <a16:creationId xmlns:a16="http://schemas.microsoft.com/office/drawing/2014/main" id="{7C88273B-638F-49ED-969D-F262D8F76D17}"/>
-              </a:ext>
-            </a:extLst>
-          </p:cNvPr>
-          <p:cNvSpPr>
-            <a:spLocks noGrp="1"/>
-          </p:cNvSpPr>
-          <p:nvPr>
-            <p:ph idx="1"/>
-          </p:nvPr>
-        </p:nvSpPr>
-        <p:spPr/>
-        <p:txBody>
-          <a:bodyPr/>
-          <a:lstStyle/>
-          <a:p>
-            <a:endParaRPr lang="en-US"/>
+            <a:r>
+              <a:rPr lang="en-US" dirty="0"/>
+              <a:t>Backup</a:t>
+            </a:r>
           </a:p>
         </p:txBody>
       </p:sp>
@@ -8501,7 +8828,7 @@
         </p:nvSpPr>
         <p:spPr>
           <a:xfrm>
-            <a:off x="864524" y="714895"/>
+            <a:off x="817418" y="634885"/>
             <a:ext cx="10557163" cy="4893647"/>
           </a:xfrm>
           <a:prstGeom prst="rect">
@@ -8609,6 +8936,251 @@
     <p:extLst>
       <p:ext uri="{BB962C8B-B14F-4D97-AF65-F5344CB8AC3E}">
         <p14:creationId xmlns:p14="http://schemas.microsoft.com/office/powerpoint/2010/main" val="2855459419"/>
+      </p:ext>
+    </p:extLst>
+  </p:cSld>
+  <p:clrMapOvr>
+    <a:masterClrMapping/>
+  </p:clrMapOvr>
+</p:sld>
+</file>
+
+<file path=ppt/slides/slide20.xml><?xml version="1.0" encoding="utf-8"?>
+<p:sld xmlns:a="http://schemas.openxmlformats.org/drawingml/2006/main" xmlns:r="http://schemas.openxmlformats.org/officeDocument/2006/relationships" xmlns:p="http://schemas.openxmlformats.org/presentationml/2006/main">
+  <p:cSld>
+    <p:bg>
+      <p:bgPr>
+        <a:gradFill rotWithShape="1">
+          <a:gsLst>
+            <a:gs pos="10000">
+              <a:schemeClr val="bg2">
+                <a:tint val="97000"/>
+                <a:hueMod val="92000"/>
+                <a:satMod val="169000"/>
+                <a:lumMod val="164000"/>
+              </a:schemeClr>
+            </a:gs>
+            <a:gs pos="100000">
+              <a:schemeClr val="bg2">
+                <a:shade val="96000"/>
+                <a:satMod val="120000"/>
+                <a:lumMod val="90000"/>
+              </a:schemeClr>
+            </a:gs>
+          </a:gsLst>
+          <a:lin ang="6120000" scaled="1"/>
+        </a:gradFill>
+        <a:effectLst/>
+      </p:bgPr>
+    </p:bg>
+    <p:spTree>
+      <p:nvGrpSpPr>
+        <p:cNvPr id="1" name=""/>
+        <p:cNvGrpSpPr/>
+        <p:nvPr/>
+      </p:nvGrpSpPr>
+      <p:grpSpPr>
+        <a:xfrm>
+          <a:off x="0" y="0"/>
+          <a:ext cx="0" cy="0"/>
+          <a:chOff x="0" y="0"/>
+          <a:chExt cx="0" cy="0"/>
+        </a:xfrm>
+      </p:grpSpPr>
+      <p:sp useBgFill="1">
+        <p:nvSpPr>
+          <p:cNvPr id="7" name="Rectangle 6">
+            <a:extLst>
+              <a:ext uri="{FF2B5EF4-FFF2-40B4-BE49-F238E27FC236}">
+                <a16:creationId xmlns:a16="http://schemas.microsoft.com/office/drawing/2014/main" id="{9A212F8F-D812-4A16-BE82-F3500DE32174}"/>
+              </a:ext>
+              <a:ext uri="{C183D7F6-B498-43B3-948B-1728B52AA6E4}">
+                <adec:decorative xmlns:adec="http://schemas.microsoft.com/office/drawing/2017/decorative" val="1"/>
+              </a:ext>
+            </a:extLst>
+          </p:cNvPr>
+          <p:cNvSpPr>
+            <a:spLocks noGrp="1" noRot="1" noChangeAspect="1" noMove="1" noResize="1" noEditPoints="1" noAdjustHandles="1" noChangeArrowheads="1" noChangeShapeType="1" noTextEdit="1"/>
+          </p:cNvSpPr>
+          <p:nvPr>
+            <p:extLst>
+              <p:ext uri="{386F3935-93C4-4BCD-93E2-E3B085C9AB24}">
+                <p16:designElem xmlns:p16="http://schemas.microsoft.com/office/powerpoint/2015/main" val="1"/>
+              </p:ext>
+            </p:extLst>
+          </p:nvPr>
+        </p:nvSpPr>
+        <p:spPr>
+          <a:xfrm>
+            <a:off x="0" y="0"/>
+            <a:ext cx="12192000" cy="6858000"/>
+          </a:xfrm>
+          <a:prstGeom prst="rect">
+            <a:avLst/>
+          </a:prstGeom>
+          <a:ln>
+            <a:noFill/>
+          </a:ln>
+        </p:spPr>
+        <p:style>
+          <a:lnRef idx="2">
+            <a:schemeClr val="accent1">
+              <a:shade val="50000"/>
+            </a:schemeClr>
+          </a:lnRef>
+          <a:fillRef idx="1">
+            <a:schemeClr val="accent1"/>
+          </a:fillRef>
+          <a:effectRef idx="0">
+            <a:schemeClr val="accent1"/>
+          </a:effectRef>
+          <a:fontRef idx="minor">
+            <a:schemeClr val="lt1"/>
+          </a:fontRef>
+        </p:style>
+        <p:txBody>
+          <a:bodyPr rtlCol="0" anchor="ctr"/>
+          <a:lstStyle/>
+          <a:p>
+            <a:pPr algn="ctr"/>
+            <a:endParaRPr lang="en-US"/>
+          </a:p>
+        </p:txBody>
+      </p:sp>
+      <p:sp>
+        <p:nvSpPr>
+          <p:cNvPr id="9" name="Snip Diagonal Corner Rectangle 24">
+            <a:extLst>
+              <a:ext uri="{FF2B5EF4-FFF2-40B4-BE49-F238E27FC236}">
+                <a16:creationId xmlns:a16="http://schemas.microsoft.com/office/drawing/2014/main" id="{D2CF1D1B-04ED-443D-A9FE-68BF8859BDD6}"/>
+              </a:ext>
+              <a:ext uri="{C183D7F6-B498-43B3-948B-1728B52AA6E4}">
+                <adec:decorative xmlns:adec="http://schemas.microsoft.com/office/drawing/2017/decorative" val="1"/>
+              </a:ext>
+            </a:extLst>
+          </p:cNvPr>
+          <p:cNvSpPr>
+            <a:spLocks noGrp="1" noRot="1" noChangeAspect="1" noMove="1" noResize="1" noEditPoints="1" noAdjustHandles="1" noChangeArrowheads="1" noChangeShapeType="1" noTextEdit="1"/>
+          </p:cNvSpPr>
+          <p:nvPr>
+            <p:extLst>
+              <p:ext uri="{386F3935-93C4-4BCD-93E2-E3B085C9AB24}">
+                <p16:designElem xmlns:p16="http://schemas.microsoft.com/office/powerpoint/2015/main" val="1"/>
+              </p:ext>
+            </p:extLst>
+          </p:nvPr>
+        </p:nvSpPr>
+        <p:spPr>
+          <a:xfrm>
+            <a:off x="628229" y="620722"/>
+            <a:ext cx="10935543" cy="5286838"/>
+          </a:xfrm>
+          <a:prstGeom prst="snip2DiagRect">
+            <a:avLst>
+              <a:gd name="adj1" fmla="val 10787"/>
+              <a:gd name="adj2" fmla="val 0"/>
+            </a:avLst>
+          </a:prstGeom>
+          <a:solidFill>
+            <a:schemeClr val="tx1"/>
+          </a:solidFill>
+          <a:ln>
+            <a:noFill/>
+          </a:ln>
+          <a:effectLst>
+            <a:innerShdw blurRad="57150" dist="38100" dir="14460000">
+              <a:prstClr val="black">
+                <a:alpha val="70000"/>
+              </a:prstClr>
+            </a:innerShdw>
+          </a:effectLst>
+        </p:spPr>
+        <p:style>
+          <a:lnRef idx="2">
+            <a:schemeClr val="accent1">
+              <a:shade val="50000"/>
+            </a:schemeClr>
+          </a:lnRef>
+          <a:fillRef idx="1">
+            <a:schemeClr val="accent1"/>
+          </a:fillRef>
+          <a:effectRef idx="0">
+            <a:schemeClr val="accent1"/>
+          </a:effectRef>
+          <a:fontRef idx="minor">
+            <a:schemeClr val="lt1"/>
+          </a:fontRef>
+        </p:style>
+        <p:txBody>
+          <a:bodyPr rtlCol="0" anchor="ctr"/>
+          <a:lstStyle/>
+          <a:p>
+            <a:pPr algn="ctr"/>
+            <a:endParaRPr lang="en-US"/>
+          </a:p>
+        </p:txBody>
+      </p:sp>
+      <p:pic>
+        <p:nvPicPr>
+          <p:cNvPr id="2" name="Picture 1">
+            <a:extLst>
+              <a:ext uri="{FF2B5EF4-FFF2-40B4-BE49-F238E27FC236}">
+                <a16:creationId xmlns:a16="http://schemas.microsoft.com/office/drawing/2014/main" id="{7456C9BC-A645-43EE-A941-4B39091DC11C}"/>
+              </a:ext>
+            </a:extLst>
+          </p:cNvPr>
+          <p:cNvPicPr>
+            <a:picLocks noChangeAspect="1"/>
+          </p:cNvPicPr>
+          <p:nvPr/>
+        </p:nvPicPr>
+        <p:blipFill>
+          <a:blip r:embed="rId2"/>
+          <a:stretch>
+            <a:fillRect/>
+          </a:stretch>
+        </p:blipFill>
+        <p:spPr>
+          <a:xfrm>
+            <a:off x="3128306" y="786117"/>
+            <a:ext cx="5935387" cy="4956048"/>
+          </a:xfrm>
+          <a:custGeom>
+            <a:avLst/>
+            <a:gdLst/>
+            <a:ahLst/>
+            <a:cxnLst/>
+            <a:rect l="l" t="t" r="r" b="b"/>
+            <a:pathLst>
+              <a:path w="10607040" h="4956048">
+                <a:moveTo>
+                  <a:pt x="497480" y="0"/>
+                </a:moveTo>
+                <a:lnTo>
+                  <a:pt x="10607040" y="0"/>
+                </a:lnTo>
+                <a:lnTo>
+                  <a:pt x="10607040" y="4485407"/>
+                </a:lnTo>
+                <a:lnTo>
+                  <a:pt x="10131692" y="4956048"/>
+                </a:lnTo>
+                <a:lnTo>
+                  <a:pt x="0" y="4956048"/>
+                </a:lnTo>
+                <a:lnTo>
+                  <a:pt x="0" y="492554"/>
+                </a:lnTo>
+                <a:close/>
+              </a:path>
+            </a:pathLst>
+          </a:custGeom>
+        </p:spPr>
+      </p:pic>
+    </p:spTree>
+    <p:extLst>
+      <p:ext uri="{BB962C8B-B14F-4D97-AF65-F5344CB8AC3E}">
+        <p14:creationId xmlns:p14="http://schemas.microsoft.com/office/powerpoint/2010/main" val="1310880547"/>
       </p:ext>
     </p:extLst>
   </p:cSld>
@@ -8826,13 +9398,22 @@
         </p:nvSpPr>
         <p:spPr>
           <a:xfrm>
-            <a:off x="955427" y="1695795"/>
+            <a:off x="8816549" y="5307675"/>
             <a:ext cx="1870900" cy="369332"/>
           </a:xfrm>
           <a:prstGeom prst="rect">
             <a:avLst/>
           </a:prstGeom>
-          <a:noFill/>
+          <a:solidFill>
+            <a:schemeClr val="tx1"/>
+          </a:solidFill>
+          <a:ln>
+            <a:solidFill>
+              <a:schemeClr val="tx2">
+                <a:lumMod val="50000"/>
+              </a:schemeClr>
+            </a:solidFill>
+          </a:ln>
         </p:spPr>
         <p:txBody>
           <a:bodyPr wrap="square" rtlCol="0">
@@ -8846,8 +9427,652 @@
                   <a:schemeClr val="bg2"/>
                 </a:solidFill>
               </a:rPr>
-              <a:t>23550 songs</a:t>
-            </a:r>
+              <a:t>23,550 songs</a:t>
+            </a:r>
+          </a:p>
+        </p:txBody>
+      </p:sp>
+      <p:sp>
+        <p:nvSpPr>
+          <p:cNvPr id="2" name="Rectangle 1">
+            <a:extLst>
+              <a:ext uri="{FF2B5EF4-FFF2-40B4-BE49-F238E27FC236}">
+                <a16:creationId xmlns:a16="http://schemas.microsoft.com/office/drawing/2014/main" id="{F52348AF-A5E5-4730-A31A-5A4F2D71F664}"/>
+              </a:ext>
+            </a:extLst>
+          </p:cNvPr>
+          <p:cNvSpPr/>
+          <p:nvPr/>
+        </p:nvSpPr>
+        <p:spPr>
+          <a:xfrm>
+            <a:off x="968884" y="1179104"/>
+            <a:ext cx="2406569" cy="5148141"/>
+          </a:xfrm>
+          <a:prstGeom prst="rect">
+            <a:avLst/>
+          </a:prstGeom>
+          <a:solidFill>
+            <a:schemeClr val="tx1"/>
+          </a:solidFill>
+          <a:ln>
+            <a:solidFill>
+              <a:schemeClr val="bg2"/>
+            </a:solidFill>
+          </a:ln>
+        </p:spPr>
+        <p:txBody>
+          <a:bodyPr wrap="square">
+            <a:spAutoFit/>
+          </a:bodyPr>
+          <a:lstStyle/>
+          <a:p>
+            <a:pPr>
+              <a:lnSpc>
+                <a:spcPct val="107000"/>
+              </a:lnSpc>
+            </a:pPr>
+            <a:r>
+              <a:rPr lang="en-US" sz="1400" b="1" dirty="0" err="1">
+                <a:solidFill>
+                  <a:srgbClr val="0070C0"/>
+                </a:solidFill>
+                <a:highlight>
+                  <a:srgbClr val="00FF00"/>
+                </a:highlight>
+                <a:latin typeface="Times New Roman" panose="02020603050405020304" pitchFamily="18" charset="0"/>
+                <a:ea typeface="Times New Roman" panose="02020603050405020304" pitchFamily="18" charset="0"/>
+                <a:cs typeface="Times New Roman" panose="02020603050405020304" pitchFamily="18" charset="0"/>
+              </a:rPr>
+              <a:t>songid</a:t>
+            </a:r>
+            <a:endParaRPr lang="en-US" sz="1200" dirty="0">
+              <a:solidFill>
+                <a:srgbClr val="0070C0"/>
+              </a:solidFill>
+              <a:latin typeface="Times New Roman" panose="02020603050405020304" pitchFamily="18" charset="0"/>
+              <a:ea typeface="Calibri" panose="020F0502020204030204" pitchFamily="34" charset="0"/>
+              <a:cs typeface="Times New Roman" panose="02020603050405020304" pitchFamily="18" charset="0"/>
+            </a:endParaRPr>
+          </a:p>
+          <a:p>
+            <a:pPr>
+              <a:lnSpc>
+                <a:spcPct val="107000"/>
+              </a:lnSpc>
+            </a:pPr>
+            <a:r>
+              <a:rPr lang="en-US" sz="1400" b="1" dirty="0">
+                <a:solidFill>
+                  <a:srgbClr val="0070C0"/>
+                </a:solidFill>
+                <a:latin typeface="Times New Roman" panose="02020603050405020304" pitchFamily="18" charset="0"/>
+                <a:ea typeface="Times New Roman" panose="02020603050405020304" pitchFamily="18" charset="0"/>
+                <a:cs typeface="Times New Roman" panose="02020603050405020304" pitchFamily="18" charset="0"/>
+              </a:rPr>
+              <a:t>performer</a:t>
+            </a:r>
+            <a:endParaRPr lang="en-US" sz="1200" dirty="0">
+              <a:solidFill>
+                <a:srgbClr val="0070C0"/>
+              </a:solidFill>
+              <a:latin typeface="Times New Roman" panose="02020603050405020304" pitchFamily="18" charset="0"/>
+              <a:ea typeface="Calibri" panose="020F0502020204030204" pitchFamily="34" charset="0"/>
+              <a:cs typeface="Times New Roman" panose="02020603050405020304" pitchFamily="18" charset="0"/>
+            </a:endParaRPr>
+          </a:p>
+          <a:p>
+            <a:pPr>
+              <a:lnSpc>
+                <a:spcPct val="107000"/>
+              </a:lnSpc>
+            </a:pPr>
+            <a:r>
+              <a:rPr lang="en-US" sz="1400" b="1" dirty="0">
+                <a:solidFill>
+                  <a:srgbClr val="0070C0"/>
+                </a:solidFill>
+                <a:latin typeface="Times New Roman" panose="02020603050405020304" pitchFamily="18" charset="0"/>
+                <a:ea typeface="Times New Roman" panose="02020603050405020304" pitchFamily="18" charset="0"/>
+                <a:cs typeface="Times New Roman" panose="02020603050405020304" pitchFamily="18" charset="0"/>
+              </a:rPr>
+              <a:t>song</a:t>
+            </a:r>
+            <a:endParaRPr lang="en-US" sz="1200" dirty="0">
+              <a:solidFill>
+                <a:srgbClr val="0070C0"/>
+              </a:solidFill>
+              <a:latin typeface="Times New Roman" panose="02020603050405020304" pitchFamily="18" charset="0"/>
+              <a:ea typeface="Calibri" panose="020F0502020204030204" pitchFamily="34" charset="0"/>
+              <a:cs typeface="Times New Roman" panose="02020603050405020304" pitchFamily="18" charset="0"/>
+            </a:endParaRPr>
+          </a:p>
+          <a:p>
+            <a:pPr>
+              <a:lnSpc>
+                <a:spcPct val="107000"/>
+              </a:lnSpc>
+            </a:pPr>
+            <a:r>
+              <a:rPr lang="en-US" sz="1400" b="1" dirty="0" err="1">
+                <a:solidFill>
+                  <a:srgbClr val="0070C0"/>
+                </a:solidFill>
+                <a:highlight>
+                  <a:srgbClr val="FFFF00"/>
+                </a:highlight>
+                <a:latin typeface="Times New Roman" panose="02020603050405020304" pitchFamily="18" charset="0"/>
+                <a:ea typeface="Times New Roman" panose="02020603050405020304" pitchFamily="18" charset="0"/>
+                <a:cs typeface="Times New Roman" panose="02020603050405020304" pitchFamily="18" charset="0"/>
+              </a:rPr>
+              <a:t>spotify_genre</a:t>
+            </a:r>
+            <a:endParaRPr lang="en-US" sz="1200" dirty="0">
+              <a:solidFill>
+                <a:srgbClr val="0070C0"/>
+              </a:solidFill>
+              <a:latin typeface="Times New Roman" panose="02020603050405020304" pitchFamily="18" charset="0"/>
+              <a:ea typeface="Calibri" panose="020F0502020204030204" pitchFamily="34" charset="0"/>
+              <a:cs typeface="Times New Roman" panose="02020603050405020304" pitchFamily="18" charset="0"/>
+            </a:endParaRPr>
+          </a:p>
+          <a:p>
+            <a:pPr>
+              <a:lnSpc>
+                <a:spcPct val="107000"/>
+              </a:lnSpc>
+            </a:pPr>
+            <a:r>
+              <a:rPr lang="en-US" sz="1400" b="1" dirty="0" err="1">
+                <a:solidFill>
+                  <a:srgbClr val="0070C0"/>
+                </a:solidFill>
+                <a:latin typeface="Times New Roman" panose="02020603050405020304" pitchFamily="18" charset="0"/>
+                <a:ea typeface="Times New Roman" panose="02020603050405020304" pitchFamily="18" charset="0"/>
+                <a:cs typeface="Times New Roman" panose="02020603050405020304" pitchFamily="18" charset="0"/>
+              </a:rPr>
+              <a:t>spotify_track_id</a:t>
+            </a:r>
+            <a:endParaRPr lang="en-US" sz="1200" dirty="0">
+              <a:solidFill>
+                <a:srgbClr val="0070C0"/>
+              </a:solidFill>
+              <a:latin typeface="Times New Roman" panose="02020603050405020304" pitchFamily="18" charset="0"/>
+              <a:ea typeface="Calibri" panose="020F0502020204030204" pitchFamily="34" charset="0"/>
+              <a:cs typeface="Times New Roman" panose="02020603050405020304" pitchFamily="18" charset="0"/>
+            </a:endParaRPr>
+          </a:p>
+          <a:p>
+            <a:pPr>
+              <a:lnSpc>
+                <a:spcPct val="107000"/>
+              </a:lnSpc>
+            </a:pPr>
+            <a:r>
+              <a:rPr lang="en-US" sz="1400" b="1" dirty="0" err="1">
+                <a:solidFill>
+                  <a:srgbClr val="0070C0"/>
+                </a:solidFill>
+                <a:latin typeface="Times New Roman" panose="02020603050405020304" pitchFamily="18" charset="0"/>
+                <a:ea typeface="Times New Roman" panose="02020603050405020304" pitchFamily="18" charset="0"/>
+                <a:cs typeface="Times New Roman" panose="02020603050405020304" pitchFamily="18" charset="0"/>
+              </a:rPr>
+              <a:t>spotify_track_preview_url</a:t>
+            </a:r>
+            <a:endParaRPr lang="en-US" sz="1200" dirty="0">
+              <a:solidFill>
+                <a:srgbClr val="0070C0"/>
+              </a:solidFill>
+              <a:latin typeface="Times New Roman" panose="02020603050405020304" pitchFamily="18" charset="0"/>
+              <a:ea typeface="Calibri" panose="020F0502020204030204" pitchFamily="34" charset="0"/>
+              <a:cs typeface="Times New Roman" panose="02020603050405020304" pitchFamily="18" charset="0"/>
+            </a:endParaRPr>
+          </a:p>
+          <a:p>
+            <a:pPr>
+              <a:lnSpc>
+                <a:spcPct val="107000"/>
+              </a:lnSpc>
+            </a:pPr>
+            <a:r>
+              <a:rPr lang="en-US" sz="1400" b="1" dirty="0" err="1">
+                <a:solidFill>
+                  <a:srgbClr val="0070C0"/>
+                </a:solidFill>
+                <a:latin typeface="Times New Roman" panose="02020603050405020304" pitchFamily="18" charset="0"/>
+                <a:ea typeface="Times New Roman" panose="02020603050405020304" pitchFamily="18" charset="0"/>
+                <a:cs typeface="Times New Roman" panose="02020603050405020304" pitchFamily="18" charset="0"/>
+              </a:rPr>
+              <a:t>spotify_track_album</a:t>
+            </a:r>
+            <a:endParaRPr lang="en-US" sz="1200" dirty="0">
+              <a:solidFill>
+                <a:srgbClr val="0070C0"/>
+              </a:solidFill>
+              <a:latin typeface="Times New Roman" panose="02020603050405020304" pitchFamily="18" charset="0"/>
+              <a:ea typeface="Calibri" panose="020F0502020204030204" pitchFamily="34" charset="0"/>
+              <a:cs typeface="Times New Roman" panose="02020603050405020304" pitchFamily="18" charset="0"/>
+            </a:endParaRPr>
+          </a:p>
+          <a:p>
+            <a:pPr>
+              <a:lnSpc>
+                <a:spcPct val="107000"/>
+              </a:lnSpc>
+            </a:pPr>
+            <a:r>
+              <a:rPr lang="en-US" sz="1400" b="1" dirty="0" err="1">
+                <a:solidFill>
+                  <a:srgbClr val="0070C0"/>
+                </a:solidFill>
+                <a:latin typeface="Times New Roman" panose="02020603050405020304" pitchFamily="18" charset="0"/>
+                <a:ea typeface="Times New Roman" panose="02020603050405020304" pitchFamily="18" charset="0"/>
+                <a:cs typeface="Times New Roman" panose="02020603050405020304" pitchFamily="18" charset="0"/>
+              </a:rPr>
+              <a:t>spotify_track_explicit</a:t>
+            </a:r>
+            <a:endParaRPr lang="en-US" sz="1200" dirty="0">
+              <a:solidFill>
+                <a:srgbClr val="0070C0"/>
+              </a:solidFill>
+              <a:latin typeface="Times New Roman" panose="02020603050405020304" pitchFamily="18" charset="0"/>
+              <a:ea typeface="Calibri" panose="020F0502020204030204" pitchFamily="34" charset="0"/>
+              <a:cs typeface="Times New Roman" panose="02020603050405020304" pitchFamily="18" charset="0"/>
+            </a:endParaRPr>
+          </a:p>
+          <a:p>
+            <a:pPr>
+              <a:lnSpc>
+                <a:spcPct val="107000"/>
+              </a:lnSpc>
+            </a:pPr>
+            <a:r>
+              <a:rPr lang="en-US" sz="1400" b="1" dirty="0" err="1">
+                <a:solidFill>
+                  <a:srgbClr val="0070C0"/>
+                </a:solidFill>
+                <a:latin typeface="Times New Roman" panose="02020603050405020304" pitchFamily="18" charset="0"/>
+                <a:ea typeface="Times New Roman" panose="02020603050405020304" pitchFamily="18" charset="0"/>
+                <a:cs typeface="Times New Roman" panose="02020603050405020304" pitchFamily="18" charset="0"/>
+              </a:rPr>
+              <a:t>spotify_track_duration_ms</a:t>
+            </a:r>
+            <a:endParaRPr lang="en-US" sz="1200" dirty="0">
+              <a:solidFill>
+                <a:srgbClr val="0070C0"/>
+              </a:solidFill>
+              <a:latin typeface="Times New Roman" panose="02020603050405020304" pitchFamily="18" charset="0"/>
+              <a:ea typeface="Calibri" panose="020F0502020204030204" pitchFamily="34" charset="0"/>
+              <a:cs typeface="Times New Roman" panose="02020603050405020304" pitchFamily="18" charset="0"/>
+            </a:endParaRPr>
+          </a:p>
+          <a:p>
+            <a:pPr>
+              <a:lnSpc>
+                <a:spcPct val="107000"/>
+              </a:lnSpc>
+            </a:pPr>
+            <a:r>
+              <a:rPr lang="en-US" sz="1400" b="1" dirty="0" err="1">
+                <a:solidFill>
+                  <a:srgbClr val="0070C0"/>
+                </a:solidFill>
+                <a:highlight>
+                  <a:srgbClr val="FFFF00"/>
+                </a:highlight>
+                <a:latin typeface="Times New Roman" panose="02020603050405020304" pitchFamily="18" charset="0"/>
+                <a:ea typeface="Times New Roman" panose="02020603050405020304" pitchFamily="18" charset="0"/>
+                <a:cs typeface="Times New Roman" panose="02020603050405020304" pitchFamily="18" charset="0"/>
+              </a:rPr>
+              <a:t>spotify_track_popularity</a:t>
+            </a:r>
+            <a:endParaRPr lang="en-US" sz="1200" dirty="0">
+              <a:solidFill>
+                <a:srgbClr val="0070C0"/>
+              </a:solidFill>
+              <a:latin typeface="Times New Roman" panose="02020603050405020304" pitchFamily="18" charset="0"/>
+              <a:ea typeface="Calibri" panose="020F0502020204030204" pitchFamily="34" charset="0"/>
+              <a:cs typeface="Times New Roman" panose="02020603050405020304" pitchFamily="18" charset="0"/>
+            </a:endParaRPr>
+          </a:p>
+          <a:p>
+            <a:pPr>
+              <a:lnSpc>
+                <a:spcPct val="107000"/>
+              </a:lnSpc>
+            </a:pPr>
+            <a:r>
+              <a:rPr lang="en-US" sz="1400" b="1" dirty="0">
+                <a:solidFill>
+                  <a:srgbClr val="0070C0"/>
+                </a:solidFill>
+                <a:highlight>
+                  <a:srgbClr val="FFFF00"/>
+                </a:highlight>
+                <a:latin typeface="Times New Roman" panose="02020603050405020304" pitchFamily="18" charset="0"/>
+                <a:ea typeface="Times New Roman" panose="02020603050405020304" pitchFamily="18" charset="0"/>
+                <a:cs typeface="Times New Roman" panose="02020603050405020304" pitchFamily="18" charset="0"/>
+              </a:rPr>
+              <a:t>danceability</a:t>
+            </a:r>
+            <a:endParaRPr lang="en-US" sz="1200" dirty="0">
+              <a:solidFill>
+                <a:srgbClr val="0070C0"/>
+              </a:solidFill>
+              <a:latin typeface="Times New Roman" panose="02020603050405020304" pitchFamily="18" charset="0"/>
+              <a:ea typeface="Calibri" panose="020F0502020204030204" pitchFamily="34" charset="0"/>
+              <a:cs typeface="Times New Roman" panose="02020603050405020304" pitchFamily="18" charset="0"/>
+            </a:endParaRPr>
+          </a:p>
+          <a:p>
+            <a:pPr>
+              <a:lnSpc>
+                <a:spcPct val="107000"/>
+              </a:lnSpc>
+            </a:pPr>
+            <a:r>
+              <a:rPr lang="en-US" sz="1400" b="1" dirty="0">
+                <a:solidFill>
+                  <a:srgbClr val="0070C0"/>
+                </a:solidFill>
+                <a:highlight>
+                  <a:srgbClr val="FFFF00"/>
+                </a:highlight>
+                <a:latin typeface="Times New Roman" panose="02020603050405020304" pitchFamily="18" charset="0"/>
+                <a:ea typeface="Times New Roman" panose="02020603050405020304" pitchFamily="18" charset="0"/>
+                <a:cs typeface="Times New Roman" panose="02020603050405020304" pitchFamily="18" charset="0"/>
+              </a:rPr>
+              <a:t>energy</a:t>
+            </a:r>
+            <a:endParaRPr lang="en-US" sz="1200" dirty="0">
+              <a:solidFill>
+                <a:srgbClr val="0070C0"/>
+              </a:solidFill>
+              <a:latin typeface="Times New Roman" panose="02020603050405020304" pitchFamily="18" charset="0"/>
+              <a:ea typeface="Calibri" panose="020F0502020204030204" pitchFamily="34" charset="0"/>
+              <a:cs typeface="Times New Roman" panose="02020603050405020304" pitchFamily="18" charset="0"/>
+            </a:endParaRPr>
+          </a:p>
+          <a:p>
+            <a:pPr>
+              <a:lnSpc>
+                <a:spcPct val="107000"/>
+              </a:lnSpc>
+            </a:pPr>
+            <a:r>
+              <a:rPr lang="en-US" sz="1400" b="1" dirty="0">
+                <a:solidFill>
+                  <a:srgbClr val="0070C0"/>
+                </a:solidFill>
+                <a:latin typeface="Times New Roman" panose="02020603050405020304" pitchFamily="18" charset="0"/>
+                <a:ea typeface="Times New Roman" panose="02020603050405020304" pitchFamily="18" charset="0"/>
+                <a:cs typeface="Times New Roman" panose="02020603050405020304" pitchFamily="18" charset="0"/>
+              </a:rPr>
+              <a:t>key</a:t>
+            </a:r>
+            <a:endParaRPr lang="en-US" sz="1200" dirty="0">
+              <a:solidFill>
+                <a:srgbClr val="0070C0"/>
+              </a:solidFill>
+              <a:latin typeface="Times New Roman" panose="02020603050405020304" pitchFamily="18" charset="0"/>
+              <a:ea typeface="Calibri" panose="020F0502020204030204" pitchFamily="34" charset="0"/>
+              <a:cs typeface="Times New Roman" panose="02020603050405020304" pitchFamily="18" charset="0"/>
+            </a:endParaRPr>
+          </a:p>
+          <a:p>
+            <a:pPr>
+              <a:lnSpc>
+                <a:spcPct val="107000"/>
+              </a:lnSpc>
+            </a:pPr>
+            <a:r>
+              <a:rPr lang="en-US" sz="1400" b="1" dirty="0">
+                <a:solidFill>
+                  <a:srgbClr val="0070C0"/>
+                </a:solidFill>
+                <a:highlight>
+                  <a:srgbClr val="FFFF00"/>
+                </a:highlight>
+                <a:latin typeface="Times New Roman" panose="02020603050405020304" pitchFamily="18" charset="0"/>
+                <a:ea typeface="Times New Roman" panose="02020603050405020304" pitchFamily="18" charset="0"/>
+                <a:cs typeface="Times New Roman" panose="02020603050405020304" pitchFamily="18" charset="0"/>
+              </a:rPr>
+              <a:t>loudness</a:t>
+            </a:r>
+            <a:endParaRPr lang="en-US" sz="1200" dirty="0">
+              <a:solidFill>
+                <a:srgbClr val="0070C0"/>
+              </a:solidFill>
+              <a:latin typeface="Times New Roman" panose="02020603050405020304" pitchFamily="18" charset="0"/>
+              <a:ea typeface="Calibri" panose="020F0502020204030204" pitchFamily="34" charset="0"/>
+              <a:cs typeface="Times New Roman" panose="02020603050405020304" pitchFamily="18" charset="0"/>
+            </a:endParaRPr>
+          </a:p>
+          <a:p>
+            <a:pPr>
+              <a:lnSpc>
+                <a:spcPct val="107000"/>
+              </a:lnSpc>
+            </a:pPr>
+            <a:r>
+              <a:rPr lang="en-US" sz="1400" b="1" dirty="0">
+                <a:solidFill>
+                  <a:srgbClr val="0070C0"/>
+                </a:solidFill>
+                <a:latin typeface="Times New Roman" panose="02020603050405020304" pitchFamily="18" charset="0"/>
+                <a:ea typeface="Times New Roman" panose="02020603050405020304" pitchFamily="18" charset="0"/>
+                <a:cs typeface="Times New Roman" panose="02020603050405020304" pitchFamily="18" charset="0"/>
+              </a:rPr>
+              <a:t>mode</a:t>
+            </a:r>
+            <a:endParaRPr lang="en-US" sz="1200" dirty="0">
+              <a:solidFill>
+                <a:srgbClr val="0070C0"/>
+              </a:solidFill>
+              <a:latin typeface="Times New Roman" panose="02020603050405020304" pitchFamily="18" charset="0"/>
+              <a:ea typeface="Calibri" panose="020F0502020204030204" pitchFamily="34" charset="0"/>
+              <a:cs typeface="Times New Roman" panose="02020603050405020304" pitchFamily="18" charset="0"/>
+            </a:endParaRPr>
+          </a:p>
+          <a:p>
+            <a:pPr>
+              <a:lnSpc>
+                <a:spcPct val="107000"/>
+              </a:lnSpc>
+            </a:pPr>
+            <a:r>
+              <a:rPr lang="en-US" sz="1400" b="1" dirty="0" err="1">
+                <a:solidFill>
+                  <a:srgbClr val="0070C0"/>
+                </a:solidFill>
+                <a:highlight>
+                  <a:srgbClr val="FFFF00"/>
+                </a:highlight>
+                <a:latin typeface="Times New Roman" panose="02020603050405020304" pitchFamily="18" charset="0"/>
+                <a:ea typeface="Times New Roman" panose="02020603050405020304" pitchFamily="18" charset="0"/>
+                <a:cs typeface="Times New Roman" panose="02020603050405020304" pitchFamily="18" charset="0"/>
+              </a:rPr>
+              <a:t>speechiness</a:t>
+            </a:r>
+            <a:endParaRPr lang="en-US" sz="1200" dirty="0">
+              <a:solidFill>
+                <a:srgbClr val="0070C0"/>
+              </a:solidFill>
+              <a:latin typeface="Times New Roman" panose="02020603050405020304" pitchFamily="18" charset="0"/>
+              <a:ea typeface="Calibri" panose="020F0502020204030204" pitchFamily="34" charset="0"/>
+              <a:cs typeface="Times New Roman" panose="02020603050405020304" pitchFamily="18" charset="0"/>
+            </a:endParaRPr>
+          </a:p>
+          <a:p>
+            <a:pPr>
+              <a:lnSpc>
+                <a:spcPct val="107000"/>
+              </a:lnSpc>
+            </a:pPr>
+            <a:r>
+              <a:rPr lang="en-US" sz="1400" b="1" dirty="0" err="1">
+                <a:solidFill>
+                  <a:srgbClr val="0070C0"/>
+                </a:solidFill>
+                <a:highlight>
+                  <a:srgbClr val="FFFF00"/>
+                </a:highlight>
+                <a:latin typeface="Times New Roman" panose="02020603050405020304" pitchFamily="18" charset="0"/>
+                <a:ea typeface="Times New Roman" panose="02020603050405020304" pitchFamily="18" charset="0"/>
+                <a:cs typeface="Times New Roman" panose="02020603050405020304" pitchFamily="18" charset="0"/>
+              </a:rPr>
+              <a:t>acousticness</a:t>
+            </a:r>
+            <a:endParaRPr lang="en-US" sz="1200" dirty="0">
+              <a:solidFill>
+                <a:srgbClr val="0070C0"/>
+              </a:solidFill>
+              <a:latin typeface="Times New Roman" panose="02020603050405020304" pitchFamily="18" charset="0"/>
+              <a:ea typeface="Calibri" panose="020F0502020204030204" pitchFamily="34" charset="0"/>
+              <a:cs typeface="Times New Roman" panose="02020603050405020304" pitchFamily="18" charset="0"/>
+            </a:endParaRPr>
+          </a:p>
+          <a:p>
+            <a:pPr>
+              <a:lnSpc>
+                <a:spcPct val="107000"/>
+              </a:lnSpc>
+            </a:pPr>
+            <a:r>
+              <a:rPr lang="en-US" sz="1400" b="1" dirty="0" err="1">
+                <a:solidFill>
+                  <a:srgbClr val="0070C0"/>
+                </a:solidFill>
+                <a:highlight>
+                  <a:srgbClr val="FFFF00"/>
+                </a:highlight>
+                <a:latin typeface="Times New Roman" panose="02020603050405020304" pitchFamily="18" charset="0"/>
+                <a:ea typeface="Times New Roman" panose="02020603050405020304" pitchFamily="18" charset="0"/>
+                <a:cs typeface="Times New Roman" panose="02020603050405020304" pitchFamily="18" charset="0"/>
+              </a:rPr>
+              <a:t>instrumentalness</a:t>
+            </a:r>
+            <a:endParaRPr lang="en-US" sz="1200" dirty="0">
+              <a:solidFill>
+                <a:srgbClr val="0070C0"/>
+              </a:solidFill>
+              <a:latin typeface="Times New Roman" panose="02020603050405020304" pitchFamily="18" charset="0"/>
+              <a:ea typeface="Calibri" panose="020F0502020204030204" pitchFamily="34" charset="0"/>
+              <a:cs typeface="Times New Roman" panose="02020603050405020304" pitchFamily="18" charset="0"/>
+            </a:endParaRPr>
+          </a:p>
+          <a:p>
+            <a:pPr>
+              <a:lnSpc>
+                <a:spcPct val="107000"/>
+              </a:lnSpc>
+            </a:pPr>
+            <a:r>
+              <a:rPr lang="en-US" sz="1400" b="1" dirty="0">
+                <a:solidFill>
+                  <a:srgbClr val="0070C0"/>
+                </a:solidFill>
+                <a:highlight>
+                  <a:srgbClr val="FFFF00"/>
+                </a:highlight>
+                <a:latin typeface="Times New Roman" panose="02020603050405020304" pitchFamily="18" charset="0"/>
+                <a:ea typeface="Times New Roman" panose="02020603050405020304" pitchFamily="18" charset="0"/>
+                <a:cs typeface="Times New Roman" panose="02020603050405020304" pitchFamily="18" charset="0"/>
+              </a:rPr>
+              <a:t>liveness</a:t>
+            </a:r>
+            <a:endParaRPr lang="en-US" sz="1200" dirty="0">
+              <a:solidFill>
+                <a:srgbClr val="0070C0"/>
+              </a:solidFill>
+              <a:latin typeface="Times New Roman" panose="02020603050405020304" pitchFamily="18" charset="0"/>
+              <a:ea typeface="Calibri" panose="020F0502020204030204" pitchFamily="34" charset="0"/>
+              <a:cs typeface="Times New Roman" panose="02020603050405020304" pitchFamily="18" charset="0"/>
+            </a:endParaRPr>
+          </a:p>
+          <a:p>
+            <a:pPr>
+              <a:lnSpc>
+                <a:spcPct val="107000"/>
+              </a:lnSpc>
+            </a:pPr>
+            <a:r>
+              <a:rPr lang="en-US" sz="1400" b="1" dirty="0">
+                <a:solidFill>
+                  <a:srgbClr val="0070C0"/>
+                </a:solidFill>
+                <a:highlight>
+                  <a:srgbClr val="FFFF00"/>
+                </a:highlight>
+                <a:latin typeface="Times New Roman" panose="02020603050405020304" pitchFamily="18" charset="0"/>
+                <a:ea typeface="Times New Roman" panose="02020603050405020304" pitchFamily="18" charset="0"/>
+                <a:cs typeface="Times New Roman" panose="02020603050405020304" pitchFamily="18" charset="0"/>
+              </a:rPr>
+              <a:t>valence</a:t>
+            </a:r>
+            <a:endParaRPr lang="en-US" sz="1200" dirty="0">
+              <a:solidFill>
+                <a:srgbClr val="0070C0"/>
+              </a:solidFill>
+              <a:latin typeface="Times New Roman" panose="02020603050405020304" pitchFamily="18" charset="0"/>
+              <a:ea typeface="Calibri" panose="020F0502020204030204" pitchFamily="34" charset="0"/>
+              <a:cs typeface="Times New Roman" panose="02020603050405020304" pitchFamily="18" charset="0"/>
+            </a:endParaRPr>
+          </a:p>
+          <a:p>
+            <a:pPr>
+              <a:lnSpc>
+                <a:spcPct val="107000"/>
+              </a:lnSpc>
+            </a:pPr>
+            <a:r>
+              <a:rPr lang="en-US" sz="1400" b="1" dirty="0">
+                <a:solidFill>
+                  <a:srgbClr val="0070C0"/>
+                </a:solidFill>
+                <a:highlight>
+                  <a:srgbClr val="FFFF00"/>
+                </a:highlight>
+                <a:latin typeface="Times New Roman" panose="02020603050405020304" pitchFamily="18" charset="0"/>
+                <a:ea typeface="Times New Roman" panose="02020603050405020304" pitchFamily="18" charset="0"/>
+                <a:cs typeface="Times New Roman" panose="02020603050405020304" pitchFamily="18" charset="0"/>
+              </a:rPr>
+              <a:t>tempo</a:t>
+            </a:r>
+            <a:endParaRPr lang="en-US" sz="1200" dirty="0">
+              <a:solidFill>
+                <a:srgbClr val="0070C0"/>
+              </a:solidFill>
+              <a:latin typeface="Times New Roman" panose="02020603050405020304" pitchFamily="18" charset="0"/>
+              <a:ea typeface="Calibri" panose="020F0502020204030204" pitchFamily="34" charset="0"/>
+              <a:cs typeface="Times New Roman" panose="02020603050405020304" pitchFamily="18" charset="0"/>
+            </a:endParaRPr>
+          </a:p>
+          <a:p>
+            <a:pPr>
+              <a:lnSpc>
+                <a:spcPct val="107000"/>
+              </a:lnSpc>
+            </a:pPr>
+            <a:r>
+              <a:rPr lang="en-US" sz="1400" b="1" dirty="0" err="1">
+                <a:solidFill>
+                  <a:srgbClr val="0070C0"/>
+                </a:solidFill>
+                <a:latin typeface="Times New Roman" panose="02020603050405020304" pitchFamily="18" charset="0"/>
+                <a:ea typeface="Times New Roman" panose="02020603050405020304" pitchFamily="18" charset="0"/>
+                <a:cs typeface="Times New Roman" panose="02020603050405020304" pitchFamily="18" charset="0"/>
+              </a:rPr>
+              <a:t>time_signature</a:t>
+            </a:r>
+            <a:endParaRPr lang="en-US" sz="1200" dirty="0">
+              <a:solidFill>
+                <a:srgbClr val="0070C0"/>
+              </a:solidFill>
+              <a:latin typeface="Times New Roman" panose="02020603050405020304" pitchFamily="18" charset="0"/>
+              <a:ea typeface="Calibri" panose="020F0502020204030204" pitchFamily="34" charset="0"/>
+              <a:cs typeface="Times New Roman" panose="02020603050405020304" pitchFamily="18" charset="0"/>
+            </a:endParaRPr>
           </a:p>
         </p:txBody>
       </p:sp>
@@ -8903,7 +10128,7 @@
         </p:blipFill>
         <p:spPr>
           <a:xfrm>
-            <a:off x="772547" y="0"/>
+            <a:off x="692537" y="0"/>
             <a:ext cx="10646906" cy="6858000"/>
           </a:xfrm>
           <a:prstGeom prst="rect">
@@ -8925,13 +10150,20 @@
         </p:nvSpPr>
         <p:spPr>
           <a:xfrm>
-            <a:off x="988678" y="2111432"/>
-            <a:ext cx="1621518" cy="646331"/>
+            <a:off x="6623668" y="4808912"/>
+            <a:ext cx="2314592" cy="400110"/>
           </a:xfrm>
           <a:prstGeom prst="rect">
             <a:avLst/>
           </a:prstGeom>
-          <a:noFill/>
+          <a:solidFill>
+            <a:schemeClr val="tx1"/>
+          </a:solidFill>
+          <a:ln>
+            <a:solidFill>
+              <a:srgbClr val="0070C0"/>
+            </a:solidFill>
+          </a:ln>
         </p:spPr>
         <p:txBody>
           <a:bodyPr wrap="square" rtlCol="0">
@@ -8940,13 +10172,341 @@
           <a:lstStyle/>
           <a:p>
             <a:r>
-              <a:rPr lang="en-US" dirty="0">
+              <a:rPr lang="en-US" sz="2000" dirty="0">
                 <a:solidFill>
                   <a:schemeClr val="bg2"/>
                 </a:solidFill>
+                <a:latin typeface="Times New Roman" panose="02020603050405020304" pitchFamily="18" charset="0"/>
+                <a:cs typeface="Times New Roman" panose="02020603050405020304" pitchFamily="18" charset="0"/>
               </a:rPr>
               <a:t>Over 320,000 rows</a:t>
             </a:r>
+          </a:p>
+        </p:txBody>
+      </p:sp>
+      <p:sp>
+        <p:nvSpPr>
+          <p:cNvPr id="6" name="Rectangle 5">
+            <a:extLst>
+              <a:ext uri="{FF2B5EF4-FFF2-40B4-BE49-F238E27FC236}">
+                <a16:creationId xmlns:a16="http://schemas.microsoft.com/office/drawing/2014/main" id="{5F763FEC-3D70-4AA5-9231-EE462E824765}"/>
+              </a:ext>
+            </a:extLst>
+          </p:cNvPr>
+          <p:cNvSpPr/>
+          <p:nvPr/>
+        </p:nvSpPr>
+        <p:spPr>
+          <a:xfrm>
+            <a:off x="852557" y="2826343"/>
+            <a:ext cx="2314592" cy="3005631"/>
+          </a:xfrm>
+          <a:prstGeom prst="rect">
+            <a:avLst/>
+          </a:prstGeom>
+          <a:solidFill>
+            <a:schemeClr val="tx1"/>
+          </a:solidFill>
+          <a:ln>
+            <a:solidFill>
+              <a:srgbClr val="0070C0"/>
+            </a:solidFill>
+          </a:ln>
+        </p:spPr>
+        <p:txBody>
+          <a:bodyPr wrap="square">
+            <a:spAutoFit/>
+          </a:bodyPr>
+          <a:lstStyle/>
+          <a:p>
+            <a:pPr>
+              <a:lnSpc>
+                <a:spcPct val="107000"/>
+              </a:lnSpc>
+            </a:pPr>
+            <a:r>
+              <a:rPr lang="en-US" b="1" u="sng" dirty="0">
+                <a:solidFill>
+                  <a:srgbClr val="0070C0"/>
+                </a:solidFill>
+                <a:latin typeface="Times New Roman" panose="02020603050405020304" pitchFamily="18" charset="0"/>
+                <a:ea typeface="Times New Roman" panose="02020603050405020304" pitchFamily="18" charset="0"/>
+                <a:cs typeface="Times New Roman" panose="02020603050405020304" pitchFamily="18" charset="0"/>
+              </a:rPr>
+              <a:t>Fields</a:t>
+            </a:r>
+          </a:p>
+          <a:p>
+            <a:pPr>
+              <a:lnSpc>
+                <a:spcPct val="107000"/>
+              </a:lnSpc>
+            </a:pPr>
+            <a:r>
+              <a:rPr lang="en-US" sz="1600" b="1" dirty="0" err="1">
+                <a:solidFill>
+                  <a:srgbClr val="0070C0"/>
+                </a:solidFill>
+                <a:latin typeface="Times New Roman" panose="02020603050405020304" pitchFamily="18" charset="0"/>
+                <a:ea typeface="Times New Roman" panose="02020603050405020304" pitchFamily="18" charset="0"/>
+                <a:cs typeface="Times New Roman" panose="02020603050405020304" pitchFamily="18" charset="0"/>
+              </a:rPr>
+              <a:t>url</a:t>
+            </a:r>
+            <a:endParaRPr lang="en-US" sz="1400" dirty="0">
+              <a:solidFill>
+                <a:srgbClr val="0070C0"/>
+              </a:solidFill>
+              <a:latin typeface="Times New Roman" panose="02020603050405020304" pitchFamily="18" charset="0"/>
+              <a:ea typeface="Calibri" panose="020F0502020204030204" pitchFamily="34" charset="0"/>
+              <a:cs typeface="Times New Roman" panose="02020603050405020304" pitchFamily="18" charset="0"/>
+            </a:endParaRPr>
+          </a:p>
+          <a:p>
+            <a:pPr>
+              <a:lnSpc>
+                <a:spcPct val="107000"/>
+              </a:lnSpc>
+            </a:pPr>
+            <a:r>
+              <a:rPr lang="en-US" sz="1600" b="1" dirty="0" err="1">
+                <a:solidFill>
+                  <a:srgbClr val="0070C0"/>
+                </a:solidFill>
+                <a:highlight>
+                  <a:srgbClr val="FFFF00"/>
+                </a:highlight>
+                <a:latin typeface="Times New Roman" panose="02020603050405020304" pitchFamily="18" charset="0"/>
+                <a:ea typeface="Times New Roman" panose="02020603050405020304" pitchFamily="18" charset="0"/>
+                <a:cs typeface="Times New Roman" panose="02020603050405020304" pitchFamily="18" charset="0"/>
+              </a:rPr>
+              <a:t>weekid</a:t>
+            </a:r>
+            <a:endParaRPr lang="en-US" sz="1400" dirty="0">
+              <a:solidFill>
+                <a:srgbClr val="0070C0"/>
+              </a:solidFill>
+              <a:highlight>
+                <a:srgbClr val="FFFF00"/>
+              </a:highlight>
+              <a:latin typeface="Times New Roman" panose="02020603050405020304" pitchFamily="18" charset="0"/>
+              <a:ea typeface="Calibri" panose="020F0502020204030204" pitchFamily="34" charset="0"/>
+              <a:cs typeface="Times New Roman" panose="02020603050405020304" pitchFamily="18" charset="0"/>
+            </a:endParaRPr>
+          </a:p>
+          <a:p>
+            <a:pPr>
+              <a:lnSpc>
+                <a:spcPct val="107000"/>
+              </a:lnSpc>
+            </a:pPr>
+            <a:r>
+              <a:rPr lang="en-US" sz="1600" b="1" dirty="0" err="1">
+                <a:solidFill>
+                  <a:srgbClr val="0070C0"/>
+                </a:solidFill>
+                <a:latin typeface="Times New Roman" panose="02020603050405020304" pitchFamily="18" charset="0"/>
+                <a:ea typeface="Times New Roman" panose="02020603050405020304" pitchFamily="18" charset="0"/>
+                <a:cs typeface="Times New Roman" panose="02020603050405020304" pitchFamily="18" charset="0"/>
+              </a:rPr>
+              <a:t>week_position</a:t>
+            </a:r>
+            <a:endParaRPr lang="en-US" sz="1400" dirty="0">
+              <a:solidFill>
+                <a:srgbClr val="0070C0"/>
+              </a:solidFill>
+              <a:latin typeface="Times New Roman" panose="02020603050405020304" pitchFamily="18" charset="0"/>
+              <a:ea typeface="Calibri" panose="020F0502020204030204" pitchFamily="34" charset="0"/>
+              <a:cs typeface="Times New Roman" panose="02020603050405020304" pitchFamily="18" charset="0"/>
+            </a:endParaRPr>
+          </a:p>
+          <a:p>
+            <a:pPr>
+              <a:lnSpc>
+                <a:spcPct val="107000"/>
+              </a:lnSpc>
+            </a:pPr>
+            <a:r>
+              <a:rPr lang="en-US" sz="1600" b="1" dirty="0">
+                <a:solidFill>
+                  <a:srgbClr val="0070C0"/>
+                </a:solidFill>
+                <a:latin typeface="Times New Roman" panose="02020603050405020304" pitchFamily="18" charset="0"/>
+                <a:ea typeface="Times New Roman" panose="02020603050405020304" pitchFamily="18" charset="0"/>
+                <a:cs typeface="Times New Roman" panose="02020603050405020304" pitchFamily="18" charset="0"/>
+              </a:rPr>
+              <a:t>song</a:t>
+            </a:r>
+            <a:endParaRPr lang="en-US" sz="1400" dirty="0">
+              <a:solidFill>
+                <a:srgbClr val="0070C0"/>
+              </a:solidFill>
+              <a:latin typeface="Times New Roman" panose="02020603050405020304" pitchFamily="18" charset="0"/>
+              <a:ea typeface="Calibri" panose="020F0502020204030204" pitchFamily="34" charset="0"/>
+              <a:cs typeface="Times New Roman" panose="02020603050405020304" pitchFamily="18" charset="0"/>
+            </a:endParaRPr>
+          </a:p>
+          <a:p>
+            <a:pPr>
+              <a:lnSpc>
+                <a:spcPct val="107000"/>
+              </a:lnSpc>
+            </a:pPr>
+            <a:r>
+              <a:rPr lang="en-US" sz="1600" b="1" dirty="0">
+                <a:solidFill>
+                  <a:srgbClr val="0070C0"/>
+                </a:solidFill>
+                <a:latin typeface="Times New Roman" panose="02020603050405020304" pitchFamily="18" charset="0"/>
+                <a:ea typeface="Times New Roman" panose="02020603050405020304" pitchFamily="18" charset="0"/>
+                <a:cs typeface="Times New Roman" panose="02020603050405020304" pitchFamily="18" charset="0"/>
+              </a:rPr>
+              <a:t>performer</a:t>
+            </a:r>
+            <a:endParaRPr lang="en-US" sz="1400" dirty="0">
+              <a:solidFill>
+                <a:srgbClr val="0070C0"/>
+              </a:solidFill>
+              <a:latin typeface="Times New Roman" panose="02020603050405020304" pitchFamily="18" charset="0"/>
+              <a:ea typeface="Calibri" panose="020F0502020204030204" pitchFamily="34" charset="0"/>
+              <a:cs typeface="Times New Roman" panose="02020603050405020304" pitchFamily="18" charset="0"/>
+            </a:endParaRPr>
+          </a:p>
+          <a:p>
+            <a:pPr>
+              <a:lnSpc>
+                <a:spcPct val="107000"/>
+              </a:lnSpc>
+            </a:pPr>
+            <a:r>
+              <a:rPr lang="en-US" sz="1600" b="1" dirty="0" err="1">
+                <a:solidFill>
+                  <a:srgbClr val="0070C0"/>
+                </a:solidFill>
+                <a:highlight>
+                  <a:srgbClr val="00FF00"/>
+                </a:highlight>
+                <a:latin typeface="Times New Roman" panose="02020603050405020304" pitchFamily="18" charset="0"/>
+                <a:ea typeface="Times New Roman" panose="02020603050405020304" pitchFamily="18" charset="0"/>
+                <a:cs typeface="Times New Roman" panose="02020603050405020304" pitchFamily="18" charset="0"/>
+              </a:rPr>
+              <a:t>songid</a:t>
+            </a:r>
+            <a:endParaRPr lang="en-US" sz="1400" dirty="0">
+              <a:solidFill>
+                <a:srgbClr val="0070C0"/>
+              </a:solidFill>
+              <a:latin typeface="Times New Roman" panose="02020603050405020304" pitchFamily="18" charset="0"/>
+              <a:ea typeface="Calibri" panose="020F0502020204030204" pitchFamily="34" charset="0"/>
+              <a:cs typeface="Times New Roman" panose="02020603050405020304" pitchFamily="18" charset="0"/>
+            </a:endParaRPr>
+          </a:p>
+          <a:p>
+            <a:pPr>
+              <a:lnSpc>
+                <a:spcPct val="107000"/>
+              </a:lnSpc>
+            </a:pPr>
+            <a:r>
+              <a:rPr lang="en-US" sz="1600" b="1" dirty="0">
+                <a:solidFill>
+                  <a:srgbClr val="0070C0"/>
+                </a:solidFill>
+                <a:latin typeface="Times New Roman" panose="02020603050405020304" pitchFamily="18" charset="0"/>
+                <a:ea typeface="Times New Roman" panose="02020603050405020304" pitchFamily="18" charset="0"/>
+                <a:cs typeface="Times New Roman" panose="02020603050405020304" pitchFamily="18" charset="0"/>
+              </a:rPr>
+              <a:t>instance</a:t>
+            </a:r>
+            <a:endParaRPr lang="en-US" sz="1400" dirty="0">
+              <a:solidFill>
+                <a:srgbClr val="0070C0"/>
+              </a:solidFill>
+              <a:latin typeface="Times New Roman" panose="02020603050405020304" pitchFamily="18" charset="0"/>
+              <a:ea typeface="Calibri" panose="020F0502020204030204" pitchFamily="34" charset="0"/>
+              <a:cs typeface="Times New Roman" panose="02020603050405020304" pitchFamily="18" charset="0"/>
+            </a:endParaRPr>
+          </a:p>
+          <a:p>
+            <a:pPr>
+              <a:lnSpc>
+                <a:spcPct val="107000"/>
+              </a:lnSpc>
+            </a:pPr>
+            <a:r>
+              <a:rPr lang="en-US" sz="1600" b="1" dirty="0" err="1">
+                <a:solidFill>
+                  <a:srgbClr val="0070C0"/>
+                </a:solidFill>
+                <a:latin typeface="Times New Roman" panose="02020603050405020304" pitchFamily="18" charset="0"/>
+                <a:ea typeface="Times New Roman" panose="02020603050405020304" pitchFamily="18" charset="0"/>
+                <a:cs typeface="Times New Roman" panose="02020603050405020304" pitchFamily="18" charset="0"/>
+              </a:rPr>
+              <a:t>previous_week_position</a:t>
+            </a:r>
+            <a:endParaRPr lang="en-US" sz="1400" dirty="0">
+              <a:solidFill>
+                <a:srgbClr val="0070C0"/>
+              </a:solidFill>
+              <a:latin typeface="Times New Roman" panose="02020603050405020304" pitchFamily="18" charset="0"/>
+              <a:ea typeface="Calibri" panose="020F0502020204030204" pitchFamily="34" charset="0"/>
+              <a:cs typeface="Times New Roman" panose="02020603050405020304" pitchFamily="18" charset="0"/>
+            </a:endParaRPr>
+          </a:p>
+          <a:p>
+            <a:pPr>
+              <a:lnSpc>
+                <a:spcPct val="107000"/>
+              </a:lnSpc>
+            </a:pPr>
+            <a:r>
+              <a:rPr lang="en-US" sz="1600" b="1" dirty="0" err="1">
+                <a:solidFill>
+                  <a:srgbClr val="0070C0"/>
+                </a:solidFill>
+                <a:highlight>
+                  <a:srgbClr val="FFFF00"/>
+                </a:highlight>
+                <a:latin typeface="Times New Roman" panose="02020603050405020304" pitchFamily="18" charset="0"/>
+                <a:ea typeface="Times New Roman" panose="02020603050405020304" pitchFamily="18" charset="0"/>
+                <a:cs typeface="Times New Roman" panose="02020603050405020304" pitchFamily="18" charset="0"/>
+              </a:rPr>
+              <a:t>peak_position</a:t>
+            </a:r>
+            <a:endParaRPr lang="en-US" sz="1400" dirty="0">
+              <a:solidFill>
+                <a:srgbClr val="0070C0"/>
+              </a:solidFill>
+              <a:latin typeface="Times New Roman" panose="02020603050405020304" pitchFamily="18" charset="0"/>
+              <a:ea typeface="Calibri" panose="020F0502020204030204" pitchFamily="34" charset="0"/>
+              <a:cs typeface="Times New Roman" panose="02020603050405020304" pitchFamily="18" charset="0"/>
+            </a:endParaRPr>
+          </a:p>
+          <a:p>
+            <a:pPr>
+              <a:lnSpc>
+                <a:spcPct val="107000"/>
+              </a:lnSpc>
+            </a:pPr>
+            <a:r>
+              <a:rPr lang="en-US" sz="1600" b="1" dirty="0" err="1">
+                <a:solidFill>
+                  <a:srgbClr val="0070C0"/>
+                </a:solidFill>
+                <a:latin typeface="Times New Roman" panose="02020603050405020304" pitchFamily="18" charset="0"/>
+                <a:ea typeface="Times New Roman" panose="02020603050405020304" pitchFamily="18" charset="0"/>
+                <a:cs typeface="Times New Roman" panose="02020603050405020304" pitchFamily="18" charset="0"/>
+              </a:rPr>
+              <a:t>weeks_on_chart</a:t>
+            </a:r>
+            <a:endParaRPr lang="en-US" sz="1400" dirty="0">
+              <a:solidFill>
+                <a:srgbClr val="0070C0"/>
+              </a:solidFill>
+              <a:latin typeface="Times New Roman" panose="02020603050405020304" pitchFamily="18" charset="0"/>
+              <a:ea typeface="Calibri" panose="020F0502020204030204" pitchFamily="34" charset="0"/>
+              <a:cs typeface="Times New Roman" panose="02020603050405020304" pitchFamily="18" charset="0"/>
+            </a:endParaRPr>
           </a:p>
         </p:txBody>
       </p:sp>
@@ -8964,251 +10524,6 @@
 </file>
 
 <file path=ppt/slides/slide6.xml><?xml version="1.0" encoding="utf-8"?>
-<p:sld xmlns:a="http://schemas.openxmlformats.org/drawingml/2006/main" xmlns:r="http://schemas.openxmlformats.org/officeDocument/2006/relationships" xmlns:p="http://schemas.openxmlformats.org/presentationml/2006/main">
-  <p:cSld>
-    <p:bg>
-      <p:bgPr>
-        <a:gradFill rotWithShape="1">
-          <a:gsLst>
-            <a:gs pos="10000">
-              <a:schemeClr val="bg2">
-                <a:tint val="97000"/>
-                <a:hueMod val="92000"/>
-                <a:satMod val="169000"/>
-                <a:lumMod val="164000"/>
-              </a:schemeClr>
-            </a:gs>
-            <a:gs pos="100000">
-              <a:schemeClr val="bg2">
-                <a:shade val="96000"/>
-                <a:satMod val="120000"/>
-                <a:lumMod val="90000"/>
-              </a:schemeClr>
-            </a:gs>
-          </a:gsLst>
-          <a:lin ang="6120000" scaled="1"/>
-        </a:gradFill>
-        <a:effectLst/>
-      </p:bgPr>
-    </p:bg>
-    <p:spTree>
-      <p:nvGrpSpPr>
-        <p:cNvPr id="1" name=""/>
-        <p:cNvGrpSpPr/>
-        <p:nvPr/>
-      </p:nvGrpSpPr>
-      <p:grpSpPr>
-        <a:xfrm>
-          <a:off x="0" y="0"/>
-          <a:ext cx="0" cy="0"/>
-          <a:chOff x="0" y="0"/>
-          <a:chExt cx="0" cy="0"/>
-        </a:xfrm>
-      </p:grpSpPr>
-      <p:sp useBgFill="1">
-        <p:nvSpPr>
-          <p:cNvPr id="7" name="Rectangle 6">
-            <a:extLst>
-              <a:ext uri="{FF2B5EF4-FFF2-40B4-BE49-F238E27FC236}">
-                <a16:creationId xmlns:a16="http://schemas.microsoft.com/office/drawing/2014/main" id="{9A212F8F-D812-4A16-BE82-F3500DE32174}"/>
-              </a:ext>
-              <a:ext uri="{C183D7F6-B498-43B3-948B-1728B52AA6E4}">
-                <adec:decorative xmlns:adec="http://schemas.microsoft.com/office/drawing/2017/decorative" val="1"/>
-              </a:ext>
-            </a:extLst>
-          </p:cNvPr>
-          <p:cNvSpPr>
-            <a:spLocks noGrp="1" noRot="1" noChangeAspect="1" noMove="1" noResize="1" noEditPoints="1" noAdjustHandles="1" noChangeArrowheads="1" noChangeShapeType="1" noTextEdit="1"/>
-          </p:cNvSpPr>
-          <p:nvPr>
-            <p:extLst>
-              <p:ext uri="{386F3935-93C4-4BCD-93E2-E3B085C9AB24}">
-                <p16:designElem xmlns:p16="http://schemas.microsoft.com/office/powerpoint/2015/main" val="1"/>
-              </p:ext>
-            </p:extLst>
-          </p:nvPr>
-        </p:nvSpPr>
-        <p:spPr>
-          <a:xfrm>
-            <a:off x="0" y="0"/>
-            <a:ext cx="12192000" cy="6858000"/>
-          </a:xfrm>
-          <a:prstGeom prst="rect">
-            <a:avLst/>
-          </a:prstGeom>
-          <a:ln>
-            <a:noFill/>
-          </a:ln>
-        </p:spPr>
-        <p:style>
-          <a:lnRef idx="2">
-            <a:schemeClr val="accent1">
-              <a:shade val="50000"/>
-            </a:schemeClr>
-          </a:lnRef>
-          <a:fillRef idx="1">
-            <a:schemeClr val="accent1"/>
-          </a:fillRef>
-          <a:effectRef idx="0">
-            <a:schemeClr val="accent1"/>
-          </a:effectRef>
-          <a:fontRef idx="minor">
-            <a:schemeClr val="lt1"/>
-          </a:fontRef>
-        </p:style>
-        <p:txBody>
-          <a:bodyPr rtlCol="0" anchor="ctr"/>
-          <a:lstStyle/>
-          <a:p>
-            <a:pPr algn="ctr"/>
-            <a:endParaRPr lang="en-US"/>
-          </a:p>
-        </p:txBody>
-      </p:sp>
-      <p:sp>
-        <p:nvSpPr>
-          <p:cNvPr id="9" name="Snip Diagonal Corner Rectangle 24">
-            <a:extLst>
-              <a:ext uri="{FF2B5EF4-FFF2-40B4-BE49-F238E27FC236}">
-                <a16:creationId xmlns:a16="http://schemas.microsoft.com/office/drawing/2014/main" id="{D2CF1D1B-04ED-443D-A9FE-68BF8859BDD6}"/>
-              </a:ext>
-              <a:ext uri="{C183D7F6-B498-43B3-948B-1728B52AA6E4}">
-                <adec:decorative xmlns:adec="http://schemas.microsoft.com/office/drawing/2017/decorative" val="1"/>
-              </a:ext>
-            </a:extLst>
-          </p:cNvPr>
-          <p:cNvSpPr>
-            <a:spLocks noGrp="1" noRot="1" noChangeAspect="1" noMove="1" noResize="1" noEditPoints="1" noAdjustHandles="1" noChangeArrowheads="1" noChangeShapeType="1" noTextEdit="1"/>
-          </p:cNvSpPr>
-          <p:nvPr>
-            <p:extLst>
-              <p:ext uri="{386F3935-93C4-4BCD-93E2-E3B085C9AB24}">
-                <p16:designElem xmlns:p16="http://schemas.microsoft.com/office/powerpoint/2015/main" val="1"/>
-              </p:ext>
-            </p:extLst>
-          </p:nvPr>
-        </p:nvSpPr>
-        <p:spPr>
-          <a:xfrm>
-            <a:off x="628229" y="620722"/>
-            <a:ext cx="10935543" cy="5286838"/>
-          </a:xfrm>
-          <a:prstGeom prst="snip2DiagRect">
-            <a:avLst>
-              <a:gd name="adj1" fmla="val 10787"/>
-              <a:gd name="adj2" fmla="val 0"/>
-            </a:avLst>
-          </a:prstGeom>
-          <a:solidFill>
-            <a:schemeClr val="tx1"/>
-          </a:solidFill>
-          <a:ln>
-            <a:noFill/>
-          </a:ln>
-          <a:effectLst>
-            <a:innerShdw blurRad="57150" dist="38100" dir="14460000">
-              <a:prstClr val="black">
-                <a:alpha val="70000"/>
-              </a:prstClr>
-            </a:innerShdw>
-          </a:effectLst>
-        </p:spPr>
-        <p:style>
-          <a:lnRef idx="2">
-            <a:schemeClr val="accent1">
-              <a:shade val="50000"/>
-            </a:schemeClr>
-          </a:lnRef>
-          <a:fillRef idx="1">
-            <a:schemeClr val="accent1"/>
-          </a:fillRef>
-          <a:effectRef idx="0">
-            <a:schemeClr val="accent1"/>
-          </a:effectRef>
-          <a:fontRef idx="minor">
-            <a:schemeClr val="lt1"/>
-          </a:fontRef>
-        </p:style>
-        <p:txBody>
-          <a:bodyPr rtlCol="0" anchor="ctr"/>
-          <a:lstStyle/>
-          <a:p>
-            <a:pPr algn="ctr"/>
-            <a:endParaRPr lang="en-US"/>
-          </a:p>
-        </p:txBody>
-      </p:sp>
-      <p:pic>
-        <p:nvPicPr>
-          <p:cNvPr id="2" name="Picture 1">
-            <a:extLst>
-              <a:ext uri="{FF2B5EF4-FFF2-40B4-BE49-F238E27FC236}">
-                <a16:creationId xmlns:a16="http://schemas.microsoft.com/office/drawing/2014/main" id="{7456C9BC-A645-43EE-A941-4B39091DC11C}"/>
-              </a:ext>
-            </a:extLst>
-          </p:cNvPr>
-          <p:cNvPicPr>
-            <a:picLocks noChangeAspect="1"/>
-          </p:cNvPicPr>
-          <p:nvPr/>
-        </p:nvPicPr>
-        <p:blipFill>
-          <a:blip r:embed="rId2"/>
-          <a:stretch>
-            <a:fillRect/>
-          </a:stretch>
-        </p:blipFill>
-        <p:spPr>
-          <a:xfrm>
-            <a:off x="3128306" y="786117"/>
-            <a:ext cx="5935387" cy="4956048"/>
-          </a:xfrm>
-          <a:custGeom>
-            <a:avLst/>
-            <a:gdLst/>
-            <a:ahLst/>
-            <a:cxnLst/>
-            <a:rect l="l" t="t" r="r" b="b"/>
-            <a:pathLst>
-              <a:path w="10607040" h="4956048">
-                <a:moveTo>
-                  <a:pt x="497480" y="0"/>
-                </a:moveTo>
-                <a:lnTo>
-                  <a:pt x="10607040" y="0"/>
-                </a:lnTo>
-                <a:lnTo>
-                  <a:pt x="10607040" y="4485407"/>
-                </a:lnTo>
-                <a:lnTo>
-                  <a:pt x="10131692" y="4956048"/>
-                </a:lnTo>
-                <a:lnTo>
-                  <a:pt x="0" y="4956048"/>
-                </a:lnTo>
-                <a:lnTo>
-                  <a:pt x="0" y="492554"/>
-                </a:lnTo>
-                <a:close/>
-              </a:path>
-            </a:pathLst>
-          </a:custGeom>
-        </p:spPr>
-      </p:pic>
-    </p:spTree>
-    <p:extLst>
-      <p:ext uri="{BB962C8B-B14F-4D97-AF65-F5344CB8AC3E}">
-        <p14:creationId xmlns:p14="http://schemas.microsoft.com/office/powerpoint/2010/main" val="1310880547"/>
-      </p:ext>
-    </p:extLst>
-  </p:cSld>
-  <p:clrMapOvr>
-    <a:masterClrMapping/>
-  </p:clrMapOvr>
-</p:sld>
-</file>
-
-<file path=ppt/slides/slide7.xml><?xml version="1.0" encoding="utf-8"?>
 <p:sld xmlns:a="http://schemas.openxmlformats.org/drawingml/2006/main" xmlns:r="http://schemas.openxmlformats.org/officeDocument/2006/relationships" xmlns:p="http://schemas.openxmlformats.org/presentationml/2006/main">
   <p:cSld>
     <p:spTree>
@@ -9247,20 +10562,322 @@
         </p:blipFill>
         <p:spPr>
           <a:xfrm>
-            <a:off x="297249" y="419377"/>
-            <a:ext cx="5487650" cy="3658433"/>
+            <a:off x="3657600" y="1205541"/>
+            <a:ext cx="8237152" cy="5491434"/>
           </a:xfrm>
           <a:prstGeom prst="rect">
             <a:avLst/>
           </a:prstGeom>
         </p:spPr>
       </p:pic>
+      <p:sp>
+        <p:nvSpPr>
+          <p:cNvPr id="7" name="TextBox 6">
+            <a:extLst>
+              <a:ext uri="{FF2B5EF4-FFF2-40B4-BE49-F238E27FC236}">
+                <a16:creationId xmlns:a16="http://schemas.microsoft.com/office/drawing/2014/main" id="{79A064E4-72F1-41DD-96D9-986D8C1D7D49}"/>
+              </a:ext>
+            </a:extLst>
+          </p:cNvPr>
+          <p:cNvSpPr txBox="1"/>
+          <p:nvPr/>
+        </p:nvSpPr>
+        <p:spPr>
+          <a:xfrm>
+            <a:off x="117138" y="1839884"/>
+            <a:ext cx="3272050" cy="1384995"/>
+          </a:xfrm>
+          <a:prstGeom prst="rect">
+            <a:avLst/>
+          </a:prstGeom>
+          <a:noFill/>
+        </p:spPr>
+        <p:txBody>
+          <a:bodyPr wrap="none" rtlCol="0">
+            <a:spAutoFit/>
+          </a:bodyPr>
+          <a:lstStyle/>
+          <a:p>
+            <a:pPr lvl="0" defTabSz="914400" eaLnBrk="0" fontAlgn="base" hangingPunct="0">
+              <a:spcBef>
+                <a:spcPct val="0"/>
+              </a:spcBef>
+              <a:spcAft>
+                <a:spcPct val="0"/>
+              </a:spcAft>
+            </a:pPr>
+            <a:r>
+              <a:rPr lang="en-US" altLang="en-US" b="1" u="sng" dirty="0"/>
+              <a:t>Popularity:</a:t>
+            </a:r>
+          </a:p>
+          <a:p>
+            <a:pPr lvl="0" defTabSz="914400" eaLnBrk="0" fontAlgn="base" hangingPunct="0">
+              <a:spcBef>
+                <a:spcPct val="0"/>
+              </a:spcBef>
+              <a:spcAft>
+                <a:spcPct val="0"/>
+              </a:spcAft>
+            </a:pPr>
+            <a:r>
+              <a:rPr lang="en-US" altLang="en-US" sz="1600" dirty="0"/>
+              <a:t>-The correlation between both </a:t>
+            </a:r>
+          </a:p>
+          <a:p>
+            <a:pPr lvl="0" defTabSz="914400" eaLnBrk="0" fontAlgn="base" hangingPunct="0">
+              <a:spcBef>
+                <a:spcPct val="0"/>
+              </a:spcBef>
+              <a:spcAft>
+                <a:spcPct val="0"/>
+              </a:spcAft>
+            </a:pPr>
+            <a:r>
+              <a:rPr lang="en-US" altLang="en-US" sz="1600" dirty="0"/>
+              <a:t>factors is -0.33 </a:t>
+            </a:r>
+          </a:p>
+          <a:p>
+            <a:pPr lvl="0" defTabSz="914400" eaLnBrk="0" fontAlgn="base" hangingPunct="0">
+              <a:spcBef>
+                <a:spcPct val="0"/>
+              </a:spcBef>
+              <a:spcAft>
+                <a:spcPct val="0"/>
+              </a:spcAft>
+            </a:pPr>
+            <a:r>
+              <a:rPr lang="en-US" altLang="en-US" sz="1600" dirty="0"/>
+              <a:t>-The p-value is 0.0 </a:t>
+            </a:r>
+          </a:p>
+          <a:p>
+            <a:endParaRPr lang="en-US" dirty="0"/>
+          </a:p>
+        </p:txBody>
+      </p:sp>
+      <p:sp>
+        <p:nvSpPr>
+          <p:cNvPr id="6" name="TextBox 5">
+            <a:extLst>
+              <a:ext uri="{FF2B5EF4-FFF2-40B4-BE49-F238E27FC236}">
+                <a16:creationId xmlns:a16="http://schemas.microsoft.com/office/drawing/2014/main" id="{8FE9A7BD-1EA3-4D7D-9D1C-FE95959C8F20}"/>
+              </a:ext>
+            </a:extLst>
+          </p:cNvPr>
+          <p:cNvSpPr txBox="1"/>
+          <p:nvPr/>
+        </p:nvSpPr>
+        <p:spPr>
+          <a:xfrm>
+            <a:off x="1163782" y="275600"/>
+            <a:ext cx="10912240" cy="523220"/>
+          </a:xfrm>
+          <a:prstGeom prst="rect">
+            <a:avLst/>
+          </a:prstGeom>
+          <a:noFill/>
+          <a:ln w="19050">
+            <a:solidFill>
+              <a:srgbClr val="0070C0"/>
+            </a:solidFill>
+          </a:ln>
+        </p:spPr>
+        <p:txBody>
+          <a:bodyPr wrap="square" rtlCol="0">
+            <a:spAutoFit/>
+          </a:bodyPr>
+          <a:lstStyle/>
+          <a:p>
+            <a:r>
+              <a:rPr lang="en-US" sz="2800" b="1" dirty="0">
+                <a:solidFill>
+                  <a:schemeClr val="bg2">
+                    <a:lumMod val="75000"/>
+                  </a:schemeClr>
+                </a:solidFill>
+              </a:rPr>
+              <a:t>Correlation amongst the popularity Spotify attributes</a:t>
+            </a:r>
+            <a:endParaRPr lang="en-US" b="1" dirty="0">
+              <a:solidFill>
+                <a:schemeClr val="bg2">
+                  <a:lumMod val="75000"/>
+                </a:schemeClr>
+              </a:solidFill>
+            </a:endParaRPr>
+          </a:p>
+        </p:txBody>
+      </p:sp>
+    </p:spTree>
+    <p:extLst>
+      <p:ext uri="{BB962C8B-B14F-4D97-AF65-F5344CB8AC3E}">
+        <p14:creationId xmlns:p14="http://schemas.microsoft.com/office/powerpoint/2010/main" val="805630845"/>
+      </p:ext>
+    </p:extLst>
+  </p:cSld>
+  <p:clrMapOvr>
+    <a:masterClrMapping/>
+  </p:clrMapOvr>
+</p:sld>
+</file>
+
+<file path=ppt/slides/slide7.xml><?xml version="1.0" encoding="utf-8"?>
+<p:sld xmlns:a="http://schemas.openxmlformats.org/drawingml/2006/main" xmlns:r="http://schemas.openxmlformats.org/officeDocument/2006/relationships" xmlns:p="http://schemas.openxmlformats.org/presentationml/2006/main">
+  <p:cSld>
+    <p:spTree>
+      <p:nvGrpSpPr>
+        <p:cNvPr id="1" name=""/>
+        <p:cNvGrpSpPr/>
+        <p:nvPr/>
+      </p:nvGrpSpPr>
+      <p:grpSpPr>
+        <a:xfrm>
+          <a:off x="0" y="0"/>
+          <a:ext cx="0" cy="0"/>
+          <a:chOff x="0" y="0"/>
+          <a:chExt cx="0" cy="0"/>
+        </a:xfrm>
+      </p:grpSpPr>
       <p:pic>
         <p:nvPicPr>
-          <p:cNvPr id="5" name="Picture 4" descr="A screenshot of a cell phone&#10;&#10;Description automatically generated">
+          <p:cNvPr id="2" name="Picture 1" descr="A screenshot of a cell phone&#10;&#10;Description automatically generated">
             <a:extLst>
               <a:ext uri="{FF2B5EF4-FFF2-40B4-BE49-F238E27FC236}">
-                <a16:creationId xmlns:a16="http://schemas.microsoft.com/office/drawing/2014/main" id="{6BBDB76B-334D-4A5E-A496-54F5AD81EC81}"/>
+                <a16:creationId xmlns:a16="http://schemas.microsoft.com/office/drawing/2014/main" id="{1D043B19-414A-4F6D-8B2F-5871F608D7FB}"/>
+              </a:ext>
+            </a:extLst>
+          </p:cNvPr>
+          <p:cNvPicPr>
+            <a:picLocks noChangeAspect="1"/>
+          </p:cNvPicPr>
+          <p:nvPr/>
+        </p:nvPicPr>
+        <p:blipFill>
+          <a:blip r:embed="rId2"/>
+          <a:stretch>
+            <a:fillRect/>
+          </a:stretch>
+        </p:blipFill>
+        <p:spPr>
+          <a:xfrm>
+            <a:off x="6359236" y="3368408"/>
+            <a:ext cx="4650108" cy="3100072"/>
+          </a:xfrm>
+          <a:prstGeom prst="rect">
+            <a:avLst/>
+          </a:prstGeom>
+        </p:spPr>
+      </p:pic>
+      <p:sp>
+        <p:nvSpPr>
+          <p:cNvPr id="3" name="TextBox 2">
+            <a:extLst>
+              <a:ext uri="{FF2B5EF4-FFF2-40B4-BE49-F238E27FC236}">
+                <a16:creationId xmlns:a16="http://schemas.microsoft.com/office/drawing/2014/main" id="{83578F5B-6C91-49C1-BE40-3948FA0C1054}"/>
+              </a:ext>
+            </a:extLst>
+          </p:cNvPr>
+          <p:cNvSpPr txBox="1"/>
+          <p:nvPr/>
+        </p:nvSpPr>
+        <p:spPr>
+          <a:xfrm>
+            <a:off x="5436984" y="743111"/>
+            <a:ext cx="6494612" cy="1354217"/>
+          </a:xfrm>
+          <a:prstGeom prst="rect">
+            <a:avLst/>
+          </a:prstGeom>
+          <a:noFill/>
+        </p:spPr>
+        <p:txBody>
+          <a:bodyPr wrap="square" rtlCol="0">
+            <a:spAutoFit/>
+          </a:bodyPr>
+          <a:lstStyle/>
+          <a:p>
+            <a:pPr lvl="0" defTabSz="914400" eaLnBrk="0" fontAlgn="base" hangingPunct="0">
+              <a:spcBef>
+                <a:spcPct val="0"/>
+              </a:spcBef>
+              <a:spcAft>
+                <a:spcPct val="0"/>
+              </a:spcAft>
+            </a:pPr>
+            <a:r>
+              <a:rPr lang="en-US" altLang="en-US" sz="2400" dirty="0">
+                <a:latin typeface="Times New Roman" panose="02020603050405020304" pitchFamily="18" charset="0"/>
+                <a:cs typeface="Times New Roman" panose="02020603050405020304" pitchFamily="18" charset="0"/>
+              </a:rPr>
+              <a:t>Danceability, </a:t>
+            </a:r>
+            <a:r>
+              <a:rPr lang="en-US" altLang="en-US" sz="2400" dirty="0" err="1">
+                <a:latin typeface="Times New Roman" panose="02020603050405020304" pitchFamily="18" charset="0"/>
+                <a:cs typeface="Times New Roman" panose="02020603050405020304" pitchFamily="18" charset="0"/>
+              </a:rPr>
+              <a:t>Speechiness</a:t>
+            </a:r>
+            <a:r>
+              <a:rPr lang="en-US" altLang="en-US" sz="2400" dirty="0">
+                <a:latin typeface="Times New Roman" panose="02020603050405020304" pitchFamily="18" charset="0"/>
+                <a:cs typeface="Times New Roman" panose="02020603050405020304" pitchFamily="18" charset="0"/>
+              </a:rPr>
+              <a:t>, and Valence</a:t>
+            </a:r>
+          </a:p>
+          <a:p>
+            <a:pPr lvl="0" defTabSz="914400" eaLnBrk="0" fontAlgn="base" hangingPunct="0">
+              <a:spcBef>
+                <a:spcPct val="0"/>
+              </a:spcBef>
+              <a:spcAft>
+                <a:spcPct val="0"/>
+              </a:spcAft>
+            </a:pPr>
+            <a:r>
+              <a:rPr lang="en-US" altLang="en-US" sz="2000" dirty="0">
+                <a:latin typeface="Times New Roman" panose="02020603050405020304" pitchFamily="18" charset="0"/>
+                <a:cs typeface="Times New Roman" panose="02020603050405020304" pitchFamily="18" charset="0"/>
+              </a:rPr>
+              <a:t>- The correlation between both factors is -0.05 </a:t>
+            </a:r>
+          </a:p>
+          <a:p>
+            <a:pPr lvl="0" defTabSz="914400" eaLnBrk="0" fontAlgn="base" hangingPunct="0">
+              <a:spcBef>
+                <a:spcPct val="0"/>
+              </a:spcBef>
+              <a:spcAft>
+                <a:spcPct val="0"/>
+              </a:spcAft>
+            </a:pPr>
+            <a:r>
+              <a:rPr lang="en-US" altLang="en-US" sz="2000" dirty="0">
+                <a:latin typeface="Times New Roman" panose="02020603050405020304" pitchFamily="18" charset="0"/>
+                <a:cs typeface="Times New Roman" panose="02020603050405020304" pitchFamily="18" charset="0"/>
+              </a:rPr>
+              <a:t>- The p-value is 0.0 </a:t>
+            </a:r>
+            <a:endParaRPr lang="en-US" altLang="en-US" sz="4400" dirty="0">
+              <a:latin typeface="Times New Roman" panose="02020603050405020304" pitchFamily="18" charset="0"/>
+              <a:cs typeface="Times New Roman" panose="02020603050405020304" pitchFamily="18" charset="0"/>
+            </a:endParaRPr>
+          </a:p>
+          <a:p>
+            <a:endParaRPr lang="en-US" dirty="0"/>
+          </a:p>
+        </p:txBody>
+      </p:sp>
+      <p:pic>
+        <p:nvPicPr>
+          <p:cNvPr id="4" name="Picture 3" descr="A screenshot of a cell phone&#10;&#10;Description automatically generated">
+            <a:extLst>
+              <a:ext uri="{FF2B5EF4-FFF2-40B4-BE49-F238E27FC236}">
+                <a16:creationId xmlns:a16="http://schemas.microsoft.com/office/drawing/2014/main" id="{4CB2CED7-BB50-4D3D-AB9B-3CB428036DA0}"/>
               </a:ext>
             </a:extLst>
           </p:cNvPr>
@@ -9277,177 +10894,48 @@
         </p:blipFill>
         <p:spPr>
           <a:xfrm>
-            <a:off x="6407102" y="2825910"/>
-            <a:ext cx="5487650" cy="3658433"/>
+            <a:off x="379088" y="3394657"/>
+            <a:ext cx="4631076" cy="3087384"/>
           </a:xfrm>
           <a:prstGeom prst="rect">
             <a:avLst/>
           </a:prstGeom>
         </p:spPr>
       </p:pic>
-      <p:sp>
-        <p:nvSpPr>
-          <p:cNvPr id="7" name="TextBox 6">
+      <p:pic>
+        <p:nvPicPr>
+          <p:cNvPr id="6" name="Picture 5" descr="A screenshot of a cell phone&#10;&#10;Description automatically generated">
             <a:extLst>
               <a:ext uri="{FF2B5EF4-FFF2-40B4-BE49-F238E27FC236}">
-                <a16:creationId xmlns:a16="http://schemas.microsoft.com/office/drawing/2014/main" id="{79A064E4-72F1-41DD-96D9-986D8C1D7D49}"/>
+                <a16:creationId xmlns:a16="http://schemas.microsoft.com/office/drawing/2014/main" id="{14562FD9-74DC-49F3-A93B-058AB29E615C}"/>
               </a:ext>
             </a:extLst>
           </p:cNvPr>
-          <p:cNvSpPr txBox="1"/>
+          <p:cNvPicPr>
+            <a:picLocks noChangeAspect="1"/>
+          </p:cNvPicPr>
           <p:nvPr/>
-        </p:nvSpPr>
+        </p:nvPicPr>
+        <p:blipFill>
+          <a:blip r:embed="rId4"/>
+          <a:stretch>
+            <a:fillRect/>
+          </a:stretch>
+        </p:blipFill>
         <p:spPr>
           <a:xfrm>
-            <a:off x="297248" y="4222866"/>
-            <a:ext cx="5208477" cy="1200329"/>
+            <a:off x="379088" y="168559"/>
+            <a:ext cx="4631076" cy="3087384"/>
           </a:xfrm>
           <a:prstGeom prst="rect">
             <a:avLst/>
           </a:prstGeom>
-          <a:noFill/>
-        </p:spPr>
-        <p:txBody>
-          <a:bodyPr wrap="none" rtlCol="0">
-            <a:spAutoFit/>
-          </a:bodyPr>
-          <a:lstStyle/>
-          <a:p>
-            <a:pPr lvl="0" defTabSz="914400" eaLnBrk="0" fontAlgn="base" hangingPunct="0">
-              <a:spcBef>
-                <a:spcPct val="0"/>
-              </a:spcBef>
-              <a:spcAft>
-                <a:spcPct val="0"/>
-              </a:spcAft>
-            </a:pPr>
-            <a:r>
-              <a:rPr lang="en-US" altLang="en-US" dirty="0"/>
-              <a:t>Popularity:</a:t>
-            </a:r>
-          </a:p>
-          <a:p>
-            <a:pPr lvl="0" defTabSz="914400" eaLnBrk="0" fontAlgn="base" hangingPunct="0">
-              <a:spcBef>
-                <a:spcPct val="0"/>
-              </a:spcBef>
-              <a:spcAft>
-                <a:spcPct val="0"/>
-              </a:spcAft>
-            </a:pPr>
-            <a:r>
-              <a:rPr lang="en-US" altLang="en-US" dirty="0"/>
-              <a:t>The correlation between both factors is -0.33 </a:t>
-            </a:r>
-          </a:p>
-          <a:p>
-            <a:pPr lvl="0" defTabSz="914400" eaLnBrk="0" fontAlgn="base" hangingPunct="0">
-              <a:spcBef>
-                <a:spcPct val="0"/>
-              </a:spcBef>
-              <a:spcAft>
-                <a:spcPct val="0"/>
-              </a:spcAft>
-            </a:pPr>
-            <a:r>
-              <a:rPr lang="en-US" altLang="en-US" dirty="0"/>
-              <a:t>The p-value is 0.0 </a:t>
-            </a:r>
-          </a:p>
-          <a:p>
-            <a:endParaRPr lang="en-US" dirty="0"/>
-          </a:p>
-        </p:txBody>
-      </p:sp>
-      <p:sp>
-        <p:nvSpPr>
-          <p:cNvPr id="24" name="TextBox 23">
-            <a:extLst>
-              <a:ext uri="{FF2B5EF4-FFF2-40B4-BE49-F238E27FC236}">
-                <a16:creationId xmlns:a16="http://schemas.microsoft.com/office/drawing/2014/main" id="{FBEBEA46-7B7B-405B-8E7A-F85F0BD03E5C}"/>
-              </a:ext>
-            </a:extLst>
-          </p:cNvPr>
-          <p:cNvSpPr txBox="1"/>
-          <p:nvPr/>
-        </p:nvSpPr>
-        <p:spPr>
-          <a:xfrm>
-            <a:off x="6096000" y="1814420"/>
-            <a:ext cx="6526146" cy="1200329"/>
-          </a:xfrm>
-          <a:prstGeom prst="rect">
-            <a:avLst/>
-          </a:prstGeom>
-          <a:noFill/>
-        </p:spPr>
-        <p:txBody>
-          <a:bodyPr wrap="none" rtlCol="0">
-            <a:spAutoFit/>
-          </a:bodyPr>
-          <a:lstStyle/>
-          <a:p>
-            <a:pPr lvl="0" defTabSz="914400" eaLnBrk="0" fontAlgn="base" hangingPunct="0">
-              <a:spcBef>
-                <a:spcPct val="0"/>
-              </a:spcBef>
-              <a:spcAft>
-                <a:spcPct val="0"/>
-              </a:spcAft>
-            </a:pPr>
-            <a:r>
-              <a:rPr lang="en-US" altLang="en-US" dirty="0"/>
-              <a:t>Valence:</a:t>
-            </a:r>
-          </a:p>
-          <a:p>
-            <a:pPr lvl="0" defTabSz="914400" eaLnBrk="0" fontAlgn="base" hangingPunct="0">
-              <a:spcBef>
-                <a:spcPct val="0"/>
-              </a:spcBef>
-              <a:spcAft>
-                <a:spcPct val="0"/>
-              </a:spcAft>
-            </a:pPr>
-            <a:r>
-              <a:rPr lang="en-US" altLang="en-US" dirty="0">
-                <a:latin typeface="Courier New" panose="02070309020205020404" pitchFamily="49" charset="0"/>
-              </a:rPr>
-              <a:t>The correlation between both factors is -0.05 </a:t>
-            </a:r>
-          </a:p>
-          <a:p>
-            <a:pPr lvl="0" defTabSz="914400" eaLnBrk="0" fontAlgn="base" hangingPunct="0">
-              <a:spcBef>
-                <a:spcPct val="0"/>
-              </a:spcBef>
-              <a:spcAft>
-                <a:spcPct val="0"/>
-              </a:spcAft>
-            </a:pPr>
-            <a:r>
-              <a:rPr lang="en-US" altLang="en-US" dirty="0">
-                <a:latin typeface="Courier New" panose="02070309020205020404" pitchFamily="49" charset="0"/>
-              </a:rPr>
-              <a:t>The p-value is 0.0</a:t>
-            </a:r>
-            <a:r>
-              <a:rPr lang="en-US" altLang="en-US" dirty="0"/>
-              <a:t> </a:t>
-            </a:r>
-            <a:endParaRPr lang="en-US" altLang="en-US" sz="4000" dirty="0">
-              <a:latin typeface="Arial" panose="020B0604020202020204" pitchFamily="34" charset="0"/>
-            </a:endParaRPr>
-          </a:p>
-          <a:p>
-            <a:endParaRPr lang="en-US" dirty="0"/>
-          </a:p>
-        </p:txBody>
-      </p:sp>
+        </p:spPr>
+      </p:pic>
     </p:spTree>
     <p:extLst>
       <p:ext uri="{BB962C8B-B14F-4D97-AF65-F5344CB8AC3E}">
-        <p14:creationId xmlns:p14="http://schemas.microsoft.com/office/powerpoint/2010/main" val="805630845"/>
+        <p14:creationId xmlns:p14="http://schemas.microsoft.com/office/powerpoint/2010/main" val="2399995972"/>
       </p:ext>
     </p:extLst>
   </p:cSld>
@@ -9496,68 +10984,8 @@
         </p:blipFill>
         <p:spPr>
           <a:xfrm>
-            <a:off x="6527637" y="153368"/>
-            <a:ext cx="5487650" cy="3658433"/>
-          </a:xfrm>
-          <a:prstGeom prst="rect">
-            <a:avLst/>
-          </a:prstGeom>
-        </p:spPr>
-      </p:pic>
-      <p:pic>
-        <p:nvPicPr>
-          <p:cNvPr id="5" name="Picture 4" descr="A screenshot of a cell phone&#10;&#10;Description automatically generated">
-            <a:extLst>
-              <a:ext uri="{FF2B5EF4-FFF2-40B4-BE49-F238E27FC236}">
-                <a16:creationId xmlns:a16="http://schemas.microsoft.com/office/drawing/2014/main" id="{3D14ADF0-6F9A-4794-BC6D-97FAD271F7E6}"/>
-              </a:ext>
-            </a:extLst>
-          </p:cNvPr>
-          <p:cNvPicPr>
-            <a:picLocks noChangeAspect="1"/>
-          </p:cNvPicPr>
-          <p:nvPr/>
-        </p:nvPicPr>
-        <p:blipFill>
-          <a:blip r:embed="rId3"/>
-          <a:stretch>
-            <a:fillRect/>
-          </a:stretch>
-        </p:blipFill>
-        <p:spPr>
-          <a:xfrm>
-            <a:off x="176713" y="0"/>
-            <a:ext cx="5487650" cy="3658433"/>
-          </a:xfrm>
-          <a:prstGeom prst="rect">
-            <a:avLst/>
-          </a:prstGeom>
-        </p:spPr>
-      </p:pic>
-      <p:pic>
-        <p:nvPicPr>
-          <p:cNvPr id="7" name="Picture 6" descr="A screenshot of a cell phone&#10;&#10;Description automatically generated">
-            <a:extLst>
-              <a:ext uri="{FF2B5EF4-FFF2-40B4-BE49-F238E27FC236}">
-                <a16:creationId xmlns:a16="http://schemas.microsoft.com/office/drawing/2014/main" id="{878D9016-C8FE-4771-9089-F28E377A0CD5}"/>
-              </a:ext>
-            </a:extLst>
-          </p:cNvPr>
-          <p:cNvPicPr>
-            <a:picLocks noChangeAspect="1"/>
-          </p:cNvPicPr>
-          <p:nvPr/>
-        </p:nvPicPr>
-        <p:blipFill>
-          <a:blip r:embed="rId4"/>
-          <a:stretch>
-            <a:fillRect/>
-          </a:stretch>
-        </p:blipFill>
-        <p:spPr>
-          <a:xfrm>
-            <a:off x="176714" y="3199567"/>
-            <a:ext cx="5487650" cy="3658433"/>
+            <a:off x="8370477" y="286112"/>
+            <a:ext cx="3538265" cy="2358843"/>
           </a:xfrm>
           <a:prstGeom prst="rect">
             <a:avLst/>
@@ -9579,6 +11007,119 @@
           <p:nvPr/>
         </p:nvPicPr>
         <p:blipFill>
+          <a:blip r:embed="rId3"/>
+          <a:stretch>
+            <a:fillRect/>
+          </a:stretch>
+        </p:blipFill>
+        <p:spPr>
+          <a:xfrm>
+            <a:off x="8370477" y="3801373"/>
+            <a:ext cx="3538267" cy="2358844"/>
+          </a:xfrm>
+          <a:prstGeom prst="rect">
+            <a:avLst/>
+          </a:prstGeom>
+        </p:spPr>
+      </p:pic>
+      <p:sp>
+        <p:nvSpPr>
+          <p:cNvPr id="2" name="TextBox 1">
+            <a:extLst>
+              <a:ext uri="{FF2B5EF4-FFF2-40B4-BE49-F238E27FC236}">
+                <a16:creationId xmlns:a16="http://schemas.microsoft.com/office/drawing/2014/main" id="{0A6E1AEC-7108-43F7-90D9-DCD651D1AF45}"/>
+              </a:ext>
+            </a:extLst>
+          </p:cNvPr>
+          <p:cNvSpPr txBox="1"/>
+          <p:nvPr/>
+        </p:nvSpPr>
+        <p:spPr>
+          <a:xfrm>
+            <a:off x="1662735" y="2942472"/>
+            <a:ext cx="8866530" cy="523220"/>
+          </a:xfrm>
+          <a:prstGeom prst="rect">
+            <a:avLst/>
+          </a:prstGeom>
+          <a:noFill/>
+          <a:ln w="19050">
+            <a:solidFill>
+              <a:srgbClr val="0070C0"/>
+            </a:solidFill>
+          </a:ln>
+        </p:spPr>
+        <p:txBody>
+          <a:bodyPr wrap="none" rtlCol="0">
+            <a:spAutoFit/>
+          </a:bodyPr>
+          <a:lstStyle/>
+          <a:p>
+            <a:r>
+              <a:rPr lang="en-US" sz="2800" b="1" dirty="0">
+                <a:solidFill>
+                  <a:schemeClr val="bg2">
+                    <a:lumMod val="75000"/>
+                  </a:schemeClr>
+                </a:solidFill>
+              </a:rPr>
+              <a:t>No correlation amongst the other Spotify attributes</a:t>
+            </a:r>
+            <a:endParaRPr lang="en-US" b="1" dirty="0">
+              <a:solidFill>
+                <a:schemeClr val="bg2">
+                  <a:lumMod val="75000"/>
+                </a:schemeClr>
+              </a:solidFill>
+            </a:endParaRPr>
+          </a:p>
+        </p:txBody>
+      </p:sp>
+      <p:pic>
+        <p:nvPicPr>
+          <p:cNvPr id="6" name="Picture 5" descr="A screenshot of a cell phone&#10;&#10;Description automatically generated">
+            <a:extLst>
+              <a:ext uri="{FF2B5EF4-FFF2-40B4-BE49-F238E27FC236}">
+                <a16:creationId xmlns:a16="http://schemas.microsoft.com/office/drawing/2014/main" id="{4AB9E55E-9EE2-4F89-A00E-3452D5A5736E}"/>
+              </a:ext>
+            </a:extLst>
+          </p:cNvPr>
+          <p:cNvPicPr>
+            <a:picLocks noChangeAspect="1"/>
+          </p:cNvPicPr>
+          <p:nvPr/>
+        </p:nvPicPr>
+        <p:blipFill>
+          <a:blip r:embed="rId4"/>
+          <a:stretch>
+            <a:fillRect/>
+          </a:stretch>
+        </p:blipFill>
+        <p:spPr>
+          <a:xfrm>
+            <a:off x="543345" y="286112"/>
+            <a:ext cx="3538266" cy="2358844"/>
+          </a:xfrm>
+          <a:prstGeom prst="rect">
+            <a:avLst/>
+          </a:prstGeom>
+        </p:spPr>
+      </p:pic>
+      <p:pic>
+        <p:nvPicPr>
+          <p:cNvPr id="10" name="Picture 9" descr="A screenshot of a computer&#10;&#10;Description automatically generated">
+            <a:extLst>
+              <a:ext uri="{FF2B5EF4-FFF2-40B4-BE49-F238E27FC236}">
+                <a16:creationId xmlns:a16="http://schemas.microsoft.com/office/drawing/2014/main" id="{19A09598-CF51-49C7-834D-37295E31F3A5}"/>
+              </a:ext>
+            </a:extLst>
+          </p:cNvPr>
+          <p:cNvPicPr>
+            <a:picLocks noChangeAspect="1"/>
+          </p:cNvPicPr>
+          <p:nvPr/>
+        </p:nvPicPr>
+        <p:blipFill>
           <a:blip r:embed="rId5"/>
           <a:stretch>
             <a:fillRect/>
@@ -9586,8 +11127,68 @@
         </p:blipFill>
         <p:spPr>
           <a:xfrm>
-            <a:off x="6704350" y="3199566"/>
-            <a:ext cx="5487650" cy="3658433"/>
+            <a:off x="543345" y="3801373"/>
+            <a:ext cx="3538266" cy="2358844"/>
+          </a:xfrm>
+          <a:prstGeom prst="rect">
+            <a:avLst/>
+          </a:prstGeom>
+        </p:spPr>
+      </p:pic>
+      <p:pic>
+        <p:nvPicPr>
+          <p:cNvPr id="12" name="Picture 11" descr="A screenshot of a cell phone&#10;&#10;Description automatically generated">
+            <a:extLst>
+              <a:ext uri="{FF2B5EF4-FFF2-40B4-BE49-F238E27FC236}">
+                <a16:creationId xmlns:a16="http://schemas.microsoft.com/office/drawing/2014/main" id="{61A9CC4F-9675-4DB0-8A6C-31571A40ACD8}"/>
+              </a:ext>
+            </a:extLst>
+          </p:cNvPr>
+          <p:cNvPicPr>
+            <a:picLocks noChangeAspect="1"/>
+          </p:cNvPicPr>
+          <p:nvPr/>
+        </p:nvPicPr>
+        <p:blipFill>
+          <a:blip r:embed="rId6"/>
+          <a:stretch>
+            <a:fillRect/>
+          </a:stretch>
+        </p:blipFill>
+        <p:spPr>
+          <a:xfrm>
+            <a:off x="4456911" y="293001"/>
+            <a:ext cx="3538266" cy="2358843"/>
+          </a:xfrm>
+          <a:prstGeom prst="rect">
+            <a:avLst/>
+          </a:prstGeom>
+        </p:spPr>
+      </p:pic>
+      <p:pic>
+        <p:nvPicPr>
+          <p:cNvPr id="14" name="Picture 13" descr="A screenshot of a cell phone&#10;&#10;Description automatically generated">
+            <a:extLst>
+              <a:ext uri="{FF2B5EF4-FFF2-40B4-BE49-F238E27FC236}">
+                <a16:creationId xmlns:a16="http://schemas.microsoft.com/office/drawing/2014/main" id="{1555724E-D527-4BF5-B174-C0085791B2EE}"/>
+              </a:ext>
+            </a:extLst>
+          </p:cNvPr>
+          <p:cNvPicPr>
+            <a:picLocks noChangeAspect="1"/>
+          </p:cNvPicPr>
+          <p:nvPr/>
+        </p:nvPicPr>
+        <p:blipFill>
+          <a:blip r:embed="rId7"/>
+          <a:stretch>
+            <a:fillRect/>
+          </a:stretch>
+        </p:blipFill>
+        <p:spPr>
+          <a:xfrm>
+            <a:off x="4456911" y="3787042"/>
+            <a:ext cx="3538266" cy="2358844"/>
           </a:xfrm>
           <a:prstGeom prst="rect">
             <a:avLst/>

</xml_diff>

<commit_message>
presentation clean up and git problems
</commit_message>
<xml_diff>
--- a/Presentation.pptx
+++ b/Presentation.pptx
@@ -17,7 +17,7 @@
     <p:sldId id="270" r:id="rId11"/>
     <p:sldId id="261" r:id="rId12"/>
     <p:sldId id="268" r:id="rId13"/>
-    <p:sldId id="271" r:id="rId14"/>
+    <p:sldId id="278" r:id="rId14"/>
     <p:sldId id="275" r:id="rId15"/>
     <p:sldId id="272" r:id="rId16"/>
     <p:sldId id="273" r:id="rId17"/>
@@ -323,7 +323,7 @@
             <a:fld id="{B61BEF0D-F0BB-DE4B-95CE-6DB70DBA9567}" type="datetimeFigureOut">
               <a:rPr lang="en-US" dirty="0"/>
               <a:pPr/>
-              <a:t>7/21/2020</a:t>
+              <a:t>7/22/2020</a:t>
             </a:fld>
             <a:endParaRPr lang="en-US" dirty="0"/>
           </a:p>
@@ -756,7 +756,7 @@
             <a:fld id="{B61BEF0D-F0BB-DE4B-95CE-6DB70DBA9567}" type="datetimeFigureOut">
               <a:rPr lang="en-US" dirty="0"/>
               <a:pPr/>
-              <a:t>7/21/2020</a:t>
+              <a:t>7/22/2020</a:t>
             </a:fld>
             <a:endParaRPr lang="en-US" dirty="0"/>
           </a:p>
@@ -1003,7 +1003,7 @@
             <a:fld id="{B61BEF0D-F0BB-DE4B-95CE-6DB70DBA9567}" type="datetimeFigureOut">
               <a:rPr lang="en-US" dirty="0"/>
               <a:pPr/>
-              <a:t>7/21/2020</a:t>
+              <a:t>7/22/2020</a:t>
             </a:fld>
             <a:endParaRPr lang="en-US" dirty="0"/>
           </a:p>
@@ -1308,7 +1308,7 @@
             <a:fld id="{B61BEF0D-F0BB-DE4B-95CE-6DB70DBA9567}" type="datetimeFigureOut">
               <a:rPr lang="en-US" dirty="0"/>
               <a:pPr/>
-              <a:t>7/21/2020</a:t>
+              <a:t>7/22/2020</a:t>
             </a:fld>
             <a:endParaRPr lang="en-US" dirty="0"/>
           </a:p>
@@ -1623,7 +1623,7 @@
             <a:fld id="{B61BEF0D-F0BB-DE4B-95CE-6DB70DBA9567}" type="datetimeFigureOut">
               <a:rPr lang="en-US" dirty="0"/>
               <a:pPr/>
-              <a:t>7/21/2020</a:t>
+              <a:t>7/22/2020</a:t>
             </a:fld>
             <a:endParaRPr lang="en-US" dirty="0"/>
           </a:p>
@@ -1922,7 +1922,7 @@
             <a:fld id="{B61BEF0D-F0BB-DE4B-95CE-6DB70DBA9567}" type="datetimeFigureOut">
               <a:rPr lang="en-US" dirty="0"/>
               <a:pPr/>
-              <a:t>7/21/2020</a:t>
+              <a:t>7/22/2020</a:t>
             </a:fld>
             <a:endParaRPr lang="en-US" dirty="0"/>
           </a:p>
@@ -2286,7 +2286,7 @@
             <a:fld id="{B61BEF0D-F0BB-DE4B-95CE-6DB70DBA9567}" type="datetimeFigureOut">
               <a:rPr lang="en-US" dirty="0"/>
               <a:pPr/>
-              <a:t>7/21/2020</a:t>
+              <a:t>7/22/2020</a:t>
             </a:fld>
             <a:endParaRPr lang="en-US" dirty="0"/>
           </a:p>
@@ -2457,7 +2457,7 @@
             <a:fld id="{B61BEF0D-F0BB-DE4B-95CE-6DB70DBA9567}" type="datetimeFigureOut">
               <a:rPr lang="en-US" dirty="0"/>
               <a:pPr/>
-              <a:t>7/21/2020</a:t>
+              <a:t>7/22/2020</a:t>
             </a:fld>
             <a:endParaRPr lang="en-US" dirty="0"/>
           </a:p>
@@ -2634,7 +2634,7 @@
             <a:fld id="{B61BEF0D-F0BB-DE4B-95CE-6DB70DBA9567}" type="datetimeFigureOut">
               <a:rPr lang="en-US" dirty="0"/>
               <a:pPr/>
-              <a:t>7/21/2020</a:t>
+              <a:t>7/22/2020</a:t>
             </a:fld>
             <a:endParaRPr lang="en-US" dirty="0"/>
           </a:p>
@@ -2801,7 +2801,7 @@
             <a:fld id="{B61BEF0D-F0BB-DE4B-95CE-6DB70DBA9567}" type="datetimeFigureOut">
               <a:rPr lang="en-US" dirty="0"/>
               <a:pPr/>
-              <a:t>7/21/2020</a:t>
+              <a:t>7/22/2020</a:t>
             </a:fld>
             <a:endParaRPr lang="en-US" dirty="0"/>
           </a:p>
@@ -3048,7 +3048,7 @@
             <a:fld id="{B61BEF0D-F0BB-DE4B-95CE-6DB70DBA9567}" type="datetimeFigureOut">
               <a:rPr lang="en-US" dirty="0"/>
               <a:pPr/>
-              <a:t>7/21/2020</a:t>
+              <a:t>7/22/2020</a:t>
             </a:fld>
             <a:endParaRPr lang="en-US" dirty="0"/>
           </a:p>
@@ -3281,7 +3281,7 @@
             <a:fld id="{B61BEF0D-F0BB-DE4B-95CE-6DB70DBA9567}" type="datetimeFigureOut">
               <a:rPr lang="en-US" dirty="0"/>
               <a:pPr/>
-              <a:t>7/21/2020</a:t>
+              <a:t>7/22/2020</a:t>
             </a:fld>
             <a:endParaRPr lang="en-US" dirty="0"/>
           </a:p>
@@ -3660,7 +3660,7 @@
             <a:fld id="{B61BEF0D-F0BB-DE4B-95CE-6DB70DBA9567}" type="datetimeFigureOut">
               <a:rPr lang="en-US" dirty="0"/>
               <a:pPr/>
-              <a:t>7/21/2020</a:t>
+              <a:t>7/22/2020</a:t>
             </a:fld>
             <a:endParaRPr lang="en-US" dirty="0"/>
           </a:p>
@@ -3775,7 +3775,7 @@
             <a:fld id="{B61BEF0D-F0BB-DE4B-95CE-6DB70DBA9567}" type="datetimeFigureOut">
               <a:rPr lang="en-US" dirty="0"/>
               <a:pPr/>
-              <a:t>7/21/2020</a:t>
+              <a:t>7/22/2020</a:t>
             </a:fld>
             <a:endParaRPr lang="en-US" dirty="0"/>
           </a:p>
@@ -3867,7 +3867,7 @@
             <a:fld id="{B61BEF0D-F0BB-DE4B-95CE-6DB70DBA9567}" type="datetimeFigureOut">
               <a:rPr lang="en-US" dirty="0"/>
               <a:pPr/>
-              <a:t>7/21/2020</a:t>
+              <a:t>7/22/2020</a:t>
             </a:fld>
             <a:endParaRPr lang="en-US" dirty="0"/>
           </a:p>
@@ -4119,7 +4119,7 @@
             <a:fld id="{B61BEF0D-F0BB-DE4B-95CE-6DB70DBA9567}" type="datetimeFigureOut">
               <a:rPr lang="en-US" dirty="0"/>
               <a:pPr/>
-              <a:t>7/21/2020</a:t>
+              <a:t>7/22/2020</a:t>
             </a:fld>
             <a:endParaRPr lang="en-US" dirty="0"/>
           </a:p>
@@ -4399,7 +4399,7 @@
             <a:fld id="{B61BEF0D-F0BB-DE4B-95CE-6DB70DBA9567}" type="datetimeFigureOut">
               <a:rPr lang="en-US" dirty="0"/>
               <a:pPr/>
-              <a:t>7/21/2020</a:t>
+              <a:t>7/22/2020</a:t>
             </a:fld>
             <a:endParaRPr lang="en-US" dirty="0"/>
           </a:p>
@@ -4802,7 +4802,7 @@
             <a:fld id="{B61BEF0D-F0BB-DE4B-95CE-6DB70DBA9567}" type="datetimeFigureOut">
               <a:rPr lang="en-US" dirty="0"/>
               <a:pPr/>
-              <a:t>7/21/2020</a:t>
+              <a:t>7/22/2020</a:t>
             </a:fld>
             <a:endParaRPr lang="en-US" dirty="0"/>
           </a:p>
@@ -6075,12 +6075,89 @@
           <a:chExt cx="0" cy="0"/>
         </a:xfrm>
       </p:grpSpPr>
+      <p:sp>
+        <p:nvSpPr>
+          <p:cNvPr id="14" name="TextBox 13">
+            <a:extLst>
+              <a:ext uri="{FF2B5EF4-FFF2-40B4-BE49-F238E27FC236}">
+                <a16:creationId xmlns:a16="http://schemas.microsoft.com/office/drawing/2014/main" id="{CA622B4C-828C-46E8-BB1F-20268530DD90}"/>
+              </a:ext>
+            </a:extLst>
+          </p:cNvPr>
+          <p:cNvSpPr txBox="1"/>
+          <p:nvPr/>
+        </p:nvSpPr>
+        <p:spPr>
+          <a:xfrm>
+            <a:off x="2673927" y="338096"/>
+            <a:ext cx="6844145" cy="461665"/>
+          </a:xfrm>
+          <a:prstGeom prst="rect">
+            <a:avLst/>
+          </a:prstGeom>
+          <a:noFill/>
+        </p:spPr>
+        <p:txBody>
+          <a:bodyPr wrap="square" rtlCol="0">
+            <a:spAutoFit/>
+          </a:bodyPr>
+          <a:lstStyle/>
+          <a:p>
+            <a:pPr algn="ctr"/>
+            <a:r>
+              <a:rPr lang="en-US" sz="2400" b="1" dirty="0"/>
+              <a:t>Loudness trends over the last 60+ years</a:t>
+            </a:r>
+          </a:p>
+        </p:txBody>
+      </p:sp>
+      <p:sp>
+        <p:nvSpPr>
+          <p:cNvPr id="6" name="TextBox 5">
+            <a:extLst>
+              <a:ext uri="{FF2B5EF4-FFF2-40B4-BE49-F238E27FC236}">
+                <a16:creationId xmlns:a16="http://schemas.microsoft.com/office/drawing/2014/main" id="{988C996B-EC3A-4D76-A2FA-8A5D9A0CFAAD}"/>
+              </a:ext>
+            </a:extLst>
+          </p:cNvPr>
+          <p:cNvSpPr txBox="1"/>
+          <p:nvPr/>
+        </p:nvSpPr>
+        <p:spPr>
+          <a:xfrm>
+            <a:off x="2493818" y="5333395"/>
+            <a:ext cx="7992094" cy="461665"/>
+          </a:xfrm>
+          <a:prstGeom prst="rect">
+            <a:avLst/>
+          </a:prstGeom>
+          <a:noFill/>
+        </p:spPr>
+        <p:txBody>
+          <a:bodyPr wrap="square" rtlCol="0">
+            <a:spAutoFit/>
+          </a:bodyPr>
+          <a:lstStyle/>
+          <a:p>
+            <a:r>
+              <a:rPr lang="en-US" sz="2400" b="1" dirty="0">
+                <a:solidFill>
+                  <a:schemeClr val="tx2">
+                    <a:lumMod val="75000"/>
+                  </a:schemeClr>
+                </a:solidFill>
+              </a:rPr>
+              <a:t>Music has increased in loudness over the years</a:t>
+            </a:r>
+          </a:p>
+        </p:txBody>
+      </p:sp>
       <p:pic>
         <p:nvPicPr>
-          <p:cNvPr id="13" name="Picture 12" descr="A screenshot of a cell phone&#10;&#10;Description automatically generated">
+          <p:cNvPr id="4" name="Picture 3" descr="A close up of text on a white background&#10;&#10;Description automatically generated">
             <a:extLst>
               <a:ext uri="{FF2B5EF4-FFF2-40B4-BE49-F238E27FC236}">
-                <a16:creationId xmlns:a16="http://schemas.microsoft.com/office/drawing/2014/main" id="{83276B53-52F3-4C33-BED9-AE521BF9FBC0}"/>
+                <a16:creationId xmlns:a16="http://schemas.microsoft.com/office/drawing/2014/main" id="{205C3197-AEDD-4BFA-9660-12B2627D95B0}"/>
               </a:ext>
             </a:extLst>
           </p:cNvPr>
@@ -6097,7 +6174,7 @@
         </p:blipFill>
         <p:spPr>
           <a:xfrm>
-            <a:off x="276466" y="1329203"/>
+            <a:off x="276466" y="1349985"/>
             <a:ext cx="5487650" cy="3658433"/>
           </a:xfrm>
           <a:prstGeom prst="rect">
@@ -6107,10 +6184,10 @@
       </p:pic>
       <p:pic>
         <p:nvPicPr>
-          <p:cNvPr id="9" name="Picture 8" descr="A close up of a map&#10;&#10;Description automatically generated">
+          <p:cNvPr id="7" name="Picture 6" descr="A close up of a map&#10;&#10;Description automatically generated">
             <a:extLst>
               <a:ext uri="{FF2B5EF4-FFF2-40B4-BE49-F238E27FC236}">
-                <a16:creationId xmlns:a16="http://schemas.microsoft.com/office/drawing/2014/main" id="{48664D19-810B-45A5-9459-4412ACE5FD39}"/>
+                <a16:creationId xmlns:a16="http://schemas.microsoft.com/office/drawing/2014/main" id="{325124A6-A57B-47FC-A3D8-485F68FFF50C}"/>
               </a:ext>
             </a:extLst>
           </p:cNvPr>
@@ -6127,7 +6204,7 @@
         </p:blipFill>
         <p:spPr>
           <a:xfrm>
-            <a:off x="3684059" y="1329203"/>
+            <a:off x="3352174" y="1349984"/>
             <a:ext cx="5487650" cy="3658433"/>
           </a:xfrm>
           <a:prstGeom prst="rect">
@@ -6137,10 +6214,10 @@
       </p:pic>
       <p:pic>
         <p:nvPicPr>
-          <p:cNvPr id="3" name="Picture 2" descr="A screenshot of a cell phone&#10;&#10;Description automatically generated">
+          <p:cNvPr id="10" name="Picture 9" descr="A screenshot of a cell phone&#10;&#10;Description automatically generated">
             <a:extLst>
               <a:ext uri="{FF2B5EF4-FFF2-40B4-BE49-F238E27FC236}">
-                <a16:creationId xmlns:a16="http://schemas.microsoft.com/office/drawing/2014/main" id="{A0B18999-C05A-4ACE-AE72-12D1BE033E62}"/>
+                <a16:creationId xmlns:a16="http://schemas.microsoft.com/office/drawing/2014/main" id="{77B8690B-4DF2-4F6C-B2BC-3D9E0322B92B}"/>
               </a:ext>
             </a:extLst>
           </p:cNvPr>
@@ -6157,7 +6234,7 @@
         </p:blipFill>
         <p:spPr>
           <a:xfrm>
-            <a:off x="7091652" y="1349985"/>
+            <a:off x="6489865" y="1349984"/>
             <a:ext cx="5487650" cy="3658433"/>
           </a:xfrm>
           <a:prstGeom prst="rect">
@@ -6165,83 +6242,6 @@
           </a:prstGeom>
         </p:spPr>
       </p:pic>
-      <p:sp>
-        <p:nvSpPr>
-          <p:cNvPr id="14" name="TextBox 13">
-            <a:extLst>
-              <a:ext uri="{FF2B5EF4-FFF2-40B4-BE49-F238E27FC236}">
-                <a16:creationId xmlns:a16="http://schemas.microsoft.com/office/drawing/2014/main" id="{CA622B4C-828C-46E8-BB1F-20268530DD90}"/>
-              </a:ext>
-            </a:extLst>
-          </p:cNvPr>
-          <p:cNvSpPr txBox="1"/>
-          <p:nvPr/>
-        </p:nvSpPr>
-        <p:spPr>
-          <a:xfrm>
-            <a:off x="2673927" y="338096"/>
-            <a:ext cx="6844145" cy="461665"/>
-          </a:xfrm>
-          <a:prstGeom prst="rect">
-            <a:avLst/>
-          </a:prstGeom>
-          <a:noFill/>
-        </p:spPr>
-        <p:txBody>
-          <a:bodyPr wrap="square" rtlCol="0">
-            <a:spAutoFit/>
-          </a:bodyPr>
-          <a:lstStyle/>
-          <a:p>
-            <a:pPr algn="ctr"/>
-            <a:r>
-              <a:rPr lang="en-US" sz="2400" b="1" dirty="0"/>
-              <a:t>Loudness trends over the last 60+ years</a:t>
-            </a:r>
-          </a:p>
-        </p:txBody>
-      </p:sp>
-      <p:sp>
-        <p:nvSpPr>
-          <p:cNvPr id="6" name="TextBox 5">
-            <a:extLst>
-              <a:ext uri="{FF2B5EF4-FFF2-40B4-BE49-F238E27FC236}">
-                <a16:creationId xmlns:a16="http://schemas.microsoft.com/office/drawing/2014/main" id="{988C996B-EC3A-4D76-A2FA-8A5D9A0CFAAD}"/>
-              </a:ext>
-            </a:extLst>
-          </p:cNvPr>
-          <p:cNvSpPr txBox="1"/>
-          <p:nvPr/>
-        </p:nvSpPr>
-        <p:spPr>
-          <a:xfrm>
-            <a:off x="2493818" y="5333395"/>
-            <a:ext cx="7992094" cy="461665"/>
-          </a:xfrm>
-          <a:prstGeom prst="rect">
-            <a:avLst/>
-          </a:prstGeom>
-          <a:noFill/>
-        </p:spPr>
-        <p:txBody>
-          <a:bodyPr wrap="square" rtlCol="0">
-            <a:spAutoFit/>
-          </a:bodyPr>
-          <a:lstStyle/>
-          <a:p>
-            <a:r>
-              <a:rPr lang="en-US" sz="2400" b="1" dirty="0">
-                <a:solidFill>
-                  <a:schemeClr val="tx2">
-                    <a:lumMod val="75000"/>
-                  </a:schemeClr>
-                </a:solidFill>
-              </a:rPr>
-              <a:t>Music has increased in loudness over the years</a:t>
-            </a:r>
-          </a:p>
-        </p:txBody>
-      </p:sp>
     </p:spTree>
     <p:extLst>
       <p:ext uri="{BB962C8B-B14F-4D97-AF65-F5344CB8AC3E}">
@@ -7131,66 +7131,6 @@
           </a:p>
         </p:txBody>
       </p:sp>
-      <p:pic>
-        <p:nvPicPr>
-          <p:cNvPr id="9" name="Picture 8" descr="A screenshot of a cell phone&#10;&#10;Description automatically generated">
-            <a:extLst>
-              <a:ext uri="{FF2B5EF4-FFF2-40B4-BE49-F238E27FC236}">
-                <a16:creationId xmlns:a16="http://schemas.microsoft.com/office/drawing/2014/main" id="{5B270D12-AB07-4636-A3F5-01E47FC9FB7B}"/>
-              </a:ext>
-            </a:extLst>
-          </p:cNvPr>
-          <p:cNvPicPr>
-            <a:picLocks noChangeAspect="1"/>
-          </p:cNvPicPr>
-          <p:nvPr/>
-        </p:nvPicPr>
-        <p:blipFill>
-          <a:blip r:embed="rId2"/>
-          <a:stretch>
-            <a:fillRect/>
-          </a:stretch>
-        </p:blipFill>
-        <p:spPr>
-          <a:xfrm>
-            <a:off x="5679795" y="378015"/>
-            <a:ext cx="1776057" cy="1184038"/>
-          </a:xfrm>
-          <a:prstGeom prst="rect">
-            <a:avLst/>
-          </a:prstGeom>
-        </p:spPr>
-      </p:pic>
-      <p:pic>
-        <p:nvPicPr>
-          <p:cNvPr id="3" name="Picture 2" descr="A screenshot of a cell phone&#10;&#10;Description automatically generated">
-            <a:extLst>
-              <a:ext uri="{FF2B5EF4-FFF2-40B4-BE49-F238E27FC236}">
-                <a16:creationId xmlns:a16="http://schemas.microsoft.com/office/drawing/2014/main" id="{4F58C5EC-264F-4BD1-8973-54422986624E}"/>
-              </a:ext>
-            </a:extLst>
-          </p:cNvPr>
-          <p:cNvPicPr>
-            <a:picLocks noChangeAspect="1"/>
-          </p:cNvPicPr>
-          <p:nvPr/>
-        </p:nvPicPr>
-        <p:blipFill>
-          <a:blip r:embed="rId3"/>
-          <a:stretch>
-            <a:fillRect/>
-          </a:stretch>
-        </p:blipFill>
-        <p:spPr>
-          <a:xfrm>
-            <a:off x="4919683" y="3521274"/>
-            <a:ext cx="2069129" cy="1379419"/>
-          </a:xfrm>
-          <a:prstGeom prst="rect">
-            <a:avLst/>
-          </a:prstGeom>
-        </p:spPr>
-      </p:pic>
       <p:sp>
         <p:nvSpPr>
           <p:cNvPr id="30" name="Freeform: Shape 29">
@@ -7457,10 +7397,70 @@
       </p:sp>
       <p:pic>
         <p:nvPicPr>
-          <p:cNvPr id="11" name="Picture 10" descr="A screenshot of a cell phone&#10;&#10;Description automatically generated">
+          <p:cNvPr id="4" name="Picture 3" descr="A screenshot of a cell phone&#10;&#10;Description automatically generated">
             <a:extLst>
               <a:ext uri="{FF2B5EF4-FFF2-40B4-BE49-F238E27FC236}">
-                <a16:creationId xmlns:a16="http://schemas.microsoft.com/office/drawing/2014/main" id="{D410852F-8456-4B0C-938B-7C79CC6B1CA4}"/>
+                <a16:creationId xmlns:a16="http://schemas.microsoft.com/office/drawing/2014/main" id="{7E99994E-B1BA-4D25-BE42-963F0B104805}"/>
+              </a:ext>
+            </a:extLst>
+          </p:cNvPr>
+          <p:cNvPicPr>
+            <a:picLocks noChangeAspect="1"/>
+          </p:cNvPicPr>
+          <p:nvPr/>
+        </p:nvPicPr>
+        <p:blipFill>
+          <a:blip r:embed="rId2"/>
+          <a:stretch>
+            <a:fillRect/>
+          </a:stretch>
+        </p:blipFill>
+        <p:spPr>
+          <a:xfrm>
+            <a:off x="4538366" y="3491469"/>
+            <a:ext cx="2668036" cy="1778691"/>
+          </a:xfrm>
+          <a:prstGeom prst="rect">
+            <a:avLst/>
+          </a:prstGeom>
+        </p:spPr>
+      </p:pic>
+      <p:pic>
+        <p:nvPicPr>
+          <p:cNvPr id="8" name="Picture 7" descr="A screenshot of a cell phone&#10;&#10;Description automatically generated">
+            <a:extLst>
+              <a:ext uri="{FF2B5EF4-FFF2-40B4-BE49-F238E27FC236}">
+                <a16:creationId xmlns:a16="http://schemas.microsoft.com/office/drawing/2014/main" id="{649D965B-0959-487D-9455-38860D00AA02}"/>
+              </a:ext>
+            </a:extLst>
+          </p:cNvPr>
+          <p:cNvPicPr>
+            <a:picLocks noChangeAspect="1"/>
+          </p:cNvPicPr>
+          <p:nvPr/>
+        </p:nvPicPr>
+        <p:blipFill>
+          <a:blip r:embed="rId3"/>
+          <a:stretch>
+            <a:fillRect/>
+          </a:stretch>
+        </p:blipFill>
+        <p:spPr>
+          <a:xfrm>
+            <a:off x="570090" y="5006753"/>
+            <a:ext cx="2509502" cy="1673001"/>
+          </a:xfrm>
+          <a:prstGeom prst="rect">
+            <a:avLst/>
+          </a:prstGeom>
+        </p:spPr>
+      </p:pic>
+      <p:pic>
+        <p:nvPicPr>
+          <p:cNvPr id="12" name="Picture 11" descr="A screenshot of a cell phone&#10;&#10;Description automatically generated">
+            <a:extLst>
+              <a:ext uri="{FF2B5EF4-FFF2-40B4-BE49-F238E27FC236}">
+                <a16:creationId xmlns:a16="http://schemas.microsoft.com/office/drawing/2014/main" id="{7722657C-33E9-478A-9E1E-B0977E0FB984}"/>
               </a:ext>
             </a:extLst>
           </p:cNvPr>
@@ -7477,8 +7477,8 @@
         </p:blipFill>
         <p:spPr>
           <a:xfrm>
-            <a:off x="664602" y="2421124"/>
-            <a:ext cx="2639326" cy="1759551"/>
+            <a:off x="5293195" y="110575"/>
+            <a:ext cx="2297301" cy="1531534"/>
           </a:xfrm>
           <a:prstGeom prst="rect">
             <a:avLst/>
@@ -7487,10 +7487,10 @@
       </p:pic>
       <p:pic>
         <p:nvPicPr>
-          <p:cNvPr id="13" name="Picture 12" descr="A screenshot of a cell phone&#10;&#10;Description automatically generated">
+          <p:cNvPr id="16" name="Picture 15" descr="A screenshot of a cell phone&#10;&#10;Description automatically generated">
             <a:extLst>
               <a:ext uri="{FF2B5EF4-FFF2-40B4-BE49-F238E27FC236}">
-                <a16:creationId xmlns:a16="http://schemas.microsoft.com/office/drawing/2014/main" id="{C96D7CF7-FB6C-46B4-9542-DA7A8E97E4A8}"/>
+                <a16:creationId xmlns:a16="http://schemas.microsoft.com/office/drawing/2014/main" id="{CF7A7384-88AC-47BD-98A7-887C0E112240}"/>
               </a:ext>
             </a:extLst>
           </p:cNvPr>
@@ -7507,20 +7507,104 @@
         </p:blipFill>
         <p:spPr>
           <a:xfrm>
-            <a:off x="1294255" y="5010261"/>
-            <a:ext cx="1917699" cy="1278466"/>
+            <a:off x="8680857" y="3491469"/>
+            <a:ext cx="3246836" cy="2164557"/>
           </a:xfrm>
           <a:prstGeom prst="rect">
             <a:avLst/>
           </a:prstGeom>
         </p:spPr>
       </p:pic>
+      <p:sp>
+        <p:nvSpPr>
+          <p:cNvPr id="17" name="TextBox 16">
+            <a:extLst>
+              <a:ext uri="{FF2B5EF4-FFF2-40B4-BE49-F238E27FC236}">
+                <a16:creationId xmlns:a16="http://schemas.microsoft.com/office/drawing/2014/main" id="{FA14430D-D6F5-465E-B083-6D79D405F07D}"/>
+              </a:ext>
+            </a:extLst>
+          </p:cNvPr>
+          <p:cNvSpPr txBox="1"/>
+          <p:nvPr/>
+        </p:nvSpPr>
+        <p:spPr>
+          <a:xfrm>
+            <a:off x="3566739" y="5541390"/>
+            <a:ext cx="6844145" cy="1077218"/>
+          </a:xfrm>
+          <a:prstGeom prst="rect">
+            <a:avLst/>
+          </a:prstGeom>
+          <a:solidFill>
+            <a:schemeClr val="bg1"/>
+          </a:solidFill>
+          <a:ln>
+            <a:solidFill>
+              <a:schemeClr val="tx1"/>
+            </a:solidFill>
+          </a:ln>
+        </p:spPr>
+        <p:txBody>
+          <a:bodyPr wrap="square" rtlCol="0">
+            <a:spAutoFit/>
+          </a:bodyPr>
+          <a:lstStyle/>
+          <a:p>
+            <a:pPr algn="ctr"/>
+            <a:r>
+              <a:rPr lang="en-US" sz="2400" b="1" dirty="0">
+                <a:solidFill>
+                  <a:schemeClr val="bg2">
+                    <a:lumMod val="20000"/>
+                    <a:lumOff val="80000"/>
+                  </a:schemeClr>
+                </a:solidFill>
+              </a:rPr>
+              <a:t>Tempo trends over the last 60+ years</a:t>
+            </a:r>
+          </a:p>
+          <a:p>
+            <a:pPr marL="342900" indent="-342900">
+              <a:buFont typeface="Arial" panose="020B0604020202020204" pitchFamily="34" charset="0"/>
+              <a:buChar char="•"/>
+            </a:pPr>
+            <a:r>
+              <a:rPr lang="en-US" sz="2000" b="1" dirty="0">
+                <a:solidFill>
+                  <a:schemeClr val="bg2">
+                    <a:lumMod val="20000"/>
+                    <a:lumOff val="80000"/>
+                  </a:schemeClr>
+                </a:solidFill>
+              </a:rPr>
+              <a:t>Large jump from 50’s to 60’s</a:t>
+            </a:r>
+          </a:p>
+          <a:p>
+            <a:pPr marL="342900" indent="-342900">
+              <a:buFont typeface="Arial" panose="020B0604020202020204" pitchFamily="34" charset="0"/>
+              <a:buChar char="•"/>
+            </a:pPr>
+            <a:r>
+              <a:rPr lang="en-US" sz="2000" b="1" dirty="0">
+                <a:solidFill>
+                  <a:schemeClr val="bg2">
+                    <a:lumMod val="20000"/>
+                    <a:lumOff val="80000"/>
+                  </a:schemeClr>
+                </a:solidFill>
+              </a:rPr>
+              <a:t>Slow increase for the last 60 years</a:t>
+            </a:r>
+          </a:p>
+        </p:txBody>
+      </p:sp>
       <p:pic>
         <p:nvPicPr>
-          <p:cNvPr id="7" name="Picture 6" descr="A screenshot of a cell phone&#10;&#10;Description automatically generated">
+          <p:cNvPr id="21" name="Picture 20" descr="A screenshot of a cell phone&#10;&#10;Description automatically generated">
             <a:extLst>
               <a:ext uri="{FF2B5EF4-FFF2-40B4-BE49-F238E27FC236}">
-                <a16:creationId xmlns:a16="http://schemas.microsoft.com/office/drawing/2014/main" id="{A7026E82-BF07-48DA-88B8-4C6F2CA2D1D4}"/>
+                <a16:creationId xmlns:a16="http://schemas.microsoft.com/office/drawing/2014/main" id="{05A05D0A-7B3D-427F-948F-ACC4A102EDBC}"/>
               </a:ext>
             </a:extLst>
           </p:cNvPr>
@@ -7537,8 +7621,8 @@
         </p:blipFill>
         <p:spPr>
           <a:xfrm>
-            <a:off x="8203981" y="3780484"/>
-            <a:ext cx="3217333" cy="2144888"/>
+            <a:off x="8951331" y="108496"/>
+            <a:ext cx="3102174" cy="2068115"/>
           </a:xfrm>
           <a:prstGeom prst="rect">
             <a:avLst/>
@@ -7547,10 +7631,10 @@
       </p:pic>
       <p:pic>
         <p:nvPicPr>
-          <p:cNvPr id="15" name="Picture 14" descr="A close up of text on a white background&#10;&#10;Description automatically generated">
+          <p:cNvPr id="25" name="Picture 24" descr="A screenshot of a cell phone&#10;&#10;Description automatically generated">
             <a:extLst>
               <a:ext uri="{FF2B5EF4-FFF2-40B4-BE49-F238E27FC236}">
-                <a16:creationId xmlns:a16="http://schemas.microsoft.com/office/drawing/2014/main" id="{055749DF-FA1E-4E22-93CB-4FCC465B0876}"/>
+                <a16:creationId xmlns:a16="http://schemas.microsoft.com/office/drawing/2014/main" id="{723F8AC8-9ECA-4B6E-9D3A-EDCE8E143B27}"/>
               </a:ext>
             </a:extLst>
           </p:cNvPr>
@@ -7567,8 +7651,8 @@
         </p:blipFill>
         <p:spPr>
           <a:xfrm>
-            <a:off x="542043" y="177522"/>
-            <a:ext cx="3024696" cy="2016464"/>
+            <a:off x="457770" y="2280652"/>
+            <a:ext cx="3057493" cy="2038328"/>
           </a:xfrm>
           <a:prstGeom prst="rect">
             <a:avLst/>
@@ -7577,10 +7661,10 @@
       </p:pic>
       <p:pic>
         <p:nvPicPr>
-          <p:cNvPr id="5" name="Picture 4" descr="A screenshot of a cell phone&#10;&#10;Description automatically generated">
+          <p:cNvPr id="29" name="Picture 28" descr="A close up of text on a white background&#10;&#10;Description automatically generated">
             <a:extLst>
               <a:ext uri="{FF2B5EF4-FFF2-40B4-BE49-F238E27FC236}">
-                <a16:creationId xmlns:a16="http://schemas.microsoft.com/office/drawing/2014/main" id="{578AF76E-AF71-4203-98B0-72238FAF18D4}"/>
+                <a16:creationId xmlns:a16="http://schemas.microsoft.com/office/drawing/2014/main" id="{9500D081-9168-40C7-86CE-84D7058F9A17}"/>
               </a:ext>
             </a:extLst>
           </p:cNvPr>
@@ -7597,98 +7681,14 @@
         </p:blipFill>
         <p:spPr>
           <a:xfrm>
-            <a:off x="9020889" y="112418"/>
-            <a:ext cx="3055525" cy="2037016"/>
+            <a:off x="457770" y="130070"/>
+            <a:ext cx="3057493" cy="2038328"/>
           </a:xfrm>
           <a:prstGeom prst="rect">
             <a:avLst/>
           </a:prstGeom>
         </p:spPr>
       </p:pic>
-      <p:sp>
-        <p:nvSpPr>
-          <p:cNvPr id="17" name="TextBox 16">
-            <a:extLst>
-              <a:ext uri="{FF2B5EF4-FFF2-40B4-BE49-F238E27FC236}">
-                <a16:creationId xmlns:a16="http://schemas.microsoft.com/office/drawing/2014/main" id="{FA14430D-D6F5-465E-B083-6D79D405F07D}"/>
-              </a:ext>
-            </a:extLst>
-          </p:cNvPr>
-          <p:cNvSpPr txBox="1"/>
-          <p:nvPr/>
-        </p:nvSpPr>
-        <p:spPr>
-          <a:xfrm>
-            <a:off x="3566739" y="5541390"/>
-            <a:ext cx="6844145" cy="1077218"/>
-          </a:xfrm>
-          <a:prstGeom prst="rect">
-            <a:avLst/>
-          </a:prstGeom>
-          <a:solidFill>
-            <a:schemeClr val="bg1"/>
-          </a:solidFill>
-          <a:ln>
-            <a:solidFill>
-              <a:schemeClr val="tx1"/>
-            </a:solidFill>
-          </a:ln>
-        </p:spPr>
-        <p:txBody>
-          <a:bodyPr wrap="square" rtlCol="0">
-            <a:spAutoFit/>
-          </a:bodyPr>
-          <a:lstStyle/>
-          <a:p>
-            <a:pPr algn="ctr"/>
-            <a:r>
-              <a:rPr lang="en-US" sz="2400" b="1" dirty="0">
-                <a:solidFill>
-                  <a:schemeClr val="bg2">
-                    <a:lumMod val="20000"/>
-                    <a:lumOff val="80000"/>
-                  </a:schemeClr>
-                </a:solidFill>
-              </a:rPr>
-              <a:t>Tempo trends over the last 60+ years</a:t>
-            </a:r>
-          </a:p>
-          <a:p>
-            <a:pPr marL="342900" indent="-342900">
-              <a:buFont typeface="Arial" panose="020B0604020202020204" pitchFamily="34" charset="0"/>
-              <a:buChar char="•"/>
-            </a:pPr>
-            <a:r>
-              <a:rPr lang="en-US" sz="2000" b="1" dirty="0">
-                <a:solidFill>
-                  <a:schemeClr val="bg2">
-                    <a:lumMod val="20000"/>
-                    <a:lumOff val="80000"/>
-                  </a:schemeClr>
-                </a:solidFill>
-              </a:rPr>
-              <a:t>Large jump from 50’s to 60’s</a:t>
-            </a:r>
-          </a:p>
-          <a:p>
-            <a:pPr marL="342900" indent="-342900">
-              <a:buFont typeface="Arial" panose="020B0604020202020204" pitchFamily="34" charset="0"/>
-              <a:buChar char="•"/>
-            </a:pPr>
-            <a:r>
-              <a:rPr lang="en-US" sz="2000" b="1" dirty="0">
-                <a:solidFill>
-                  <a:schemeClr val="bg2">
-                    <a:lumMod val="20000"/>
-                    <a:lumOff val="80000"/>
-                  </a:schemeClr>
-                </a:solidFill>
-              </a:rPr>
-              <a:t>Slow increase for the last 60 years</a:t>
-            </a:r>
-          </a:p>
-        </p:txBody>
-      </p:sp>
     </p:spTree>
     <p:extLst>
       <p:ext uri="{BB962C8B-B14F-4D97-AF65-F5344CB8AC3E}">
@@ -7724,7 +7724,7 @@
           <p:cNvPr id="3" name="Picture 2" descr="A close up of a map&#10;&#10;Description automatically generated">
             <a:extLst>
               <a:ext uri="{FF2B5EF4-FFF2-40B4-BE49-F238E27FC236}">
-                <a16:creationId xmlns:a16="http://schemas.microsoft.com/office/drawing/2014/main" id="{36179786-E955-4DE6-AFD9-AB760A7DCFA6}"/>
+                <a16:creationId xmlns:a16="http://schemas.microsoft.com/office/drawing/2014/main" id="{5B136913-14F4-43E6-B66A-FEC091BA8B14}"/>
               </a:ext>
             </a:extLst>
           </p:cNvPr>
@@ -7741,8 +7741,8 @@
         </p:blipFill>
         <p:spPr>
           <a:xfrm>
-            <a:off x="220601" y="103491"/>
-            <a:ext cx="3225405" cy="2150270"/>
+            <a:off x="610599" y="226871"/>
+            <a:ext cx="3104951" cy="2069967"/>
           </a:xfrm>
           <a:prstGeom prst="rect">
             <a:avLst/>
@@ -7754,7 +7754,7 @@
           <p:cNvPr id="5" name="Picture 4" descr="A screenshot of a cell phone&#10;&#10;Description automatically generated">
             <a:extLst>
               <a:ext uri="{FF2B5EF4-FFF2-40B4-BE49-F238E27FC236}">
-                <a16:creationId xmlns:a16="http://schemas.microsoft.com/office/drawing/2014/main" id="{3BCFC70E-6057-4B6D-89F1-E7D043D685D0}"/>
+                <a16:creationId xmlns:a16="http://schemas.microsoft.com/office/drawing/2014/main" id="{80DBB9A5-49C2-493A-90D6-039F33147AF1}"/>
               </a:ext>
             </a:extLst>
           </p:cNvPr>
@@ -7771,8 +7771,8 @@
         </p:blipFill>
         <p:spPr>
           <a:xfrm>
-            <a:off x="4162176" y="103491"/>
-            <a:ext cx="3225404" cy="2150269"/>
+            <a:off x="4543524" y="226870"/>
+            <a:ext cx="3104951" cy="2069967"/>
           </a:xfrm>
           <a:prstGeom prst="rect">
             <a:avLst/>
@@ -7784,7 +7784,7 @@
           <p:cNvPr id="7" name="Picture 6" descr="A screenshot of a cell phone&#10;&#10;Description automatically generated">
             <a:extLst>
               <a:ext uri="{FF2B5EF4-FFF2-40B4-BE49-F238E27FC236}">
-                <a16:creationId xmlns:a16="http://schemas.microsoft.com/office/drawing/2014/main" id="{8FF34F0F-2765-4A68-A2F6-9F708C8DFBC8}"/>
+                <a16:creationId xmlns:a16="http://schemas.microsoft.com/office/drawing/2014/main" id="{D4C7278A-D02D-42C6-8001-4AC2DDB24322}"/>
               </a:ext>
             </a:extLst>
           </p:cNvPr>
@@ -7801,8 +7801,8 @@
         </p:blipFill>
         <p:spPr>
           <a:xfrm>
-            <a:off x="8103750" y="103491"/>
-            <a:ext cx="3225406" cy="2150270"/>
+            <a:off x="8476138" y="226870"/>
+            <a:ext cx="3104951" cy="2069967"/>
           </a:xfrm>
           <a:prstGeom prst="rect">
             <a:avLst/>
@@ -7814,7 +7814,7 @@
           <p:cNvPr id="9" name="Picture 8" descr="A close up of a map&#10;&#10;Description automatically generated">
             <a:extLst>
               <a:ext uri="{FF2B5EF4-FFF2-40B4-BE49-F238E27FC236}">
-                <a16:creationId xmlns:a16="http://schemas.microsoft.com/office/drawing/2014/main" id="{678D6515-BB5E-4797-82FF-3D8B685F0F0D}"/>
+                <a16:creationId xmlns:a16="http://schemas.microsoft.com/office/drawing/2014/main" id="{4CE0337E-28CA-462B-94FD-1E551A0A0C40}"/>
               </a:ext>
             </a:extLst>
           </p:cNvPr>
@@ -7831,8 +7831,8 @@
         </p:blipFill>
         <p:spPr>
           <a:xfrm>
-            <a:off x="220600" y="2410272"/>
-            <a:ext cx="3225405" cy="2150269"/>
+            <a:off x="610913" y="2345427"/>
+            <a:ext cx="3104951" cy="2069967"/>
           </a:xfrm>
           <a:prstGeom prst="rect">
             <a:avLst/>
@@ -7844,7 +7844,7 @@
           <p:cNvPr id="11" name="Picture 10" descr="A close up of a map&#10;&#10;Description automatically generated">
             <a:extLst>
               <a:ext uri="{FF2B5EF4-FFF2-40B4-BE49-F238E27FC236}">
-                <a16:creationId xmlns:a16="http://schemas.microsoft.com/office/drawing/2014/main" id="{FC336E67-438E-40DE-B4AC-0B617692CF08}"/>
+                <a16:creationId xmlns:a16="http://schemas.microsoft.com/office/drawing/2014/main" id="{41261E2C-208B-43CB-BBE3-A8A08D3E706C}"/>
               </a:ext>
             </a:extLst>
           </p:cNvPr>
@@ -7861,8 +7861,8 @@
         </p:blipFill>
         <p:spPr>
           <a:xfrm>
-            <a:off x="4162174" y="2410271"/>
-            <a:ext cx="3225406" cy="2150270"/>
+            <a:off x="4543524" y="2394015"/>
+            <a:ext cx="3104951" cy="2069967"/>
           </a:xfrm>
           <a:prstGeom prst="rect">
             <a:avLst/>
@@ -7874,7 +7874,7 @@
           <p:cNvPr id="13" name="Picture 12" descr="A screenshot of a cell phone&#10;&#10;Description automatically generated">
             <a:extLst>
               <a:ext uri="{FF2B5EF4-FFF2-40B4-BE49-F238E27FC236}">
-                <a16:creationId xmlns:a16="http://schemas.microsoft.com/office/drawing/2014/main" id="{72B6400E-3C8D-4F2F-8288-0A883A5CD1A4}"/>
+                <a16:creationId xmlns:a16="http://schemas.microsoft.com/office/drawing/2014/main" id="{79324278-2034-4E88-A6F6-B906015F4315}"/>
               </a:ext>
             </a:extLst>
           </p:cNvPr>
@@ -7891,8 +7891,8 @@
         </p:blipFill>
         <p:spPr>
           <a:xfrm>
-            <a:off x="8103752" y="2453970"/>
-            <a:ext cx="3225404" cy="2150269"/>
+            <a:off x="8476138" y="2394015"/>
+            <a:ext cx="3104951" cy="2069967"/>
           </a:xfrm>
           <a:prstGeom prst="rect">
             <a:avLst/>
@@ -7901,10 +7901,10 @@
       </p:pic>
       <p:pic>
         <p:nvPicPr>
-          <p:cNvPr id="17" name="Picture 16" descr="A screenshot of a cell phone&#10;&#10;Description automatically generated">
+          <p:cNvPr id="15" name="Picture 14" descr="A screenshot of a cell phone&#10;&#10;Description automatically generated">
             <a:extLst>
               <a:ext uri="{FF2B5EF4-FFF2-40B4-BE49-F238E27FC236}">
-                <a16:creationId xmlns:a16="http://schemas.microsoft.com/office/drawing/2014/main" id="{F911470E-0436-4F5B-8204-4640ABF63536}"/>
+                <a16:creationId xmlns:a16="http://schemas.microsoft.com/office/drawing/2014/main" id="{B45E6066-7D3E-4E61-AD6D-279B76C9E26A}"/>
               </a:ext>
             </a:extLst>
           </p:cNvPr>
@@ -7921,8 +7921,8 @@
         </p:blipFill>
         <p:spPr>
           <a:xfrm>
-            <a:off x="220599" y="4707730"/>
-            <a:ext cx="3225405" cy="2150270"/>
+            <a:off x="610599" y="4463983"/>
+            <a:ext cx="3104951" cy="2069967"/>
           </a:xfrm>
           <a:prstGeom prst="rect">
             <a:avLst/>
@@ -7931,10 +7931,10 @@
       </p:pic>
       <p:sp>
         <p:nvSpPr>
-          <p:cNvPr id="18" name="TextBox 17">
+          <p:cNvPr id="16" name="TextBox 15">
             <a:extLst>
               <a:ext uri="{FF2B5EF4-FFF2-40B4-BE49-F238E27FC236}">
-                <a16:creationId xmlns:a16="http://schemas.microsoft.com/office/drawing/2014/main" id="{728EC546-ACA8-49B9-8F8E-F74496FD813D}"/>
+                <a16:creationId xmlns:a16="http://schemas.microsoft.com/office/drawing/2014/main" id="{F2F2ACCA-85E2-4720-A52E-D4970AFD6FB9}"/>
               </a:ext>
             </a:extLst>
           </p:cNvPr>
@@ -8015,7 +8015,7 @@
     </p:spTree>
     <p:extLst>
       <p:ext uri="{BB962C8B-B14F-4D97-AF65-F5344CB8AC3E}">
-        <p14:creationId xmlns:p14="http://schemas.microsoft.com/office/powerpoint/2010/main" val="463451567"/>
+        <p14:creationId xmlns:p14="http://schemas.microsoft.com/office/powerpoint/2010/main" val="1868884944"/>
       </p:ext>
     </p:extLst>
   </p:cSld>
@@ -10540,12 +10540,153 @@
           <a:chExt cx="0" cy="0"/>
         </a:xfrm>
       </p:grpSpPr>
+      <p:sp>
+        <p:nvSpPr>
+          <p:cNvPr id="7" name="TextBox 6">
+            <a:extLst>
+              <a:ext uri="{FF2B5EF4-FFF2-40B4-BE49-F238E27FC236}">
+                <a16:creationId xmlns:a16="http://schemas.microsoft.com/office/drawing/2014/main" id="{79A064E4-72F1-41DD-96D9-986D8C1D7D49}"/>
+              </a:ext>
+            </a:extLst>
+          </p:cNvPr>
+          <p:cNvSpPr txBox="1"/>
+          <p:nvPr/>
+        </p:nvSpPr>
+        <p:spPr>
+          <a:xfrm>
+            <a:off x="117138" y="1839884"/>
+            <a:ext cx="3272050" cy="1384995"/>
+          </a:xfrm>
+          <a:prstGeom prst="rect">
+            <a:avLst/>
+          </a:prstGeom>
+          <a:noFill/>
+        </p:spPr>
+        <p:txBody>
+          <a:bodyPr wrap="none" rtlCol="0">
+            <a:spAutoFit/>
+          </a:bodyPr>
+          <a:lstStyle/>
+          <a:p>
+            <a:pPr lvl="0" defTabSz="914400" eaLnBrk="0" fontAlgn="base" hangingPunct="0">
+              <a:spcBef>
+                <a:spcPct val="0"/>
+              </a:spcBef>
+              <a:spcAft>
+                <a:spcPct val="0"/>
+              </a:spcAft>
+            </a:pPr>
+            <a:r>
+              <a:rPr lang="en-US" altLang="en-US" b="1" u="sng" dirty="0"/>
+              <a:t>Popularity:</a:t>
+            </a:r>
+          </a:p>
+          <a:p>
+            <a:pPr lvl="0" defTabSz="914400" eaLnBrk="0" fontAlgn="base" hangingPunct="0">
+              <a:spcBef>
+                <a:spcPct val="0"/>
+              </a:spcBef>
+              <a:spcAft>
+                <a:spcPct val="0"/>
+              </a:spcAft>
+            </a:pPr>
+            <a:r>
+              <a:rPr lang="en-US" altLang="en-US" sz="1600" dirty="0"/>
+              <a:t>-The correlation between both </a:t>
+            </a:r>
+          </a:p>
+          <a:p>
+            <a:pPr lvl="0" defTabSz="914400" eaLnBrk="0" fontAlgn="base" hangingPunct="0">
+              <a:spcBef>
+                <a:spcPct val="0"/>
+              </a:spcBef>
+              <a:spcAft>
+                <a:spcPct val="0"/>
+              </a:spcAft>
+            </a:pPr>
+            <a:r>
+              <a:rPr lang="en-US" altLang="en-US" sz="1600" dirty="0"/>
+              <a:t>factors is -0.33 </a:t>
+            </a:r>
+          </a:p>
+          <a:p>
+            <a:pPr lvl="0" defTabSz="914400" eaLnBrk="0" fontAlgn="base" hangingPunct="0">
+              <a:spcBef>
+                <a:spcPct val="0"/>
+              </a:spcBef>
+              <a:spcAft>
+                <a:spcPct val="0"/>
+              </a:spcAft>
+            </a:pPr>
+            <a:r>
+              <a:rPr lang="en-US" altLang="en-US" sz="1600" dirty="0"/>
+              <a:t>-The p-value is 0.0 </a:t>
+            </a:r>
+          </a:p>
+          <a:p>
+            <a:endParaRPr lang="en-US" dirty="0"/>
+          </a:p>
+        </p:txBody>
+      </p:sp>
+      <p:sp>
+        <p:nvSpPr>
+          <p:cNvPr id="6" name="TextBox 5">
+            <a:extLst>
+              <a:ext uri="{FF2B5EF4-FFF2-40B4-BE49-F238E27FC236}">
+                <a16:creationId xmlns:a16="http://schemas.microsoft.com/office/drawing/2014/main" id="{8FE9A7BD-1EA3-4D7D-9D1C-FE95959C8F20}"/>
+              </a:ext>
+            </a:extLst>
+          </p:cNvPr>
+          <p:cNvSpPr txBox="1"/>
+          <p:nvPr/>
+        </p:nvSpPr>
+        <p:spPr>
+          <a:xfrm>
+            <a:off x="1163782" y="275600"/>
+            <a:ext cx="10912240" cy="523220"/>
+          </a:xfrm>
+          <a:prstGeom prst="rect">
+            <a:avLst/>
+          </a:prstGeom>
+          <a:noFill/>
+          <a:ln w="19050">
+            <a:solidFill>
+              <a:srgbClr val="0070C0"/>
+            </a:solidFill>
+          </a:ln>
+        </p:spPr>
+        <p:txBody>
+          <a:bodyPr wrap="square" rtlCol="0">
+            <a:spAutoFit/>
+          </a:bodyPr>
+          <a:lstStyle/>
+          <a:p>
+            <a:r>
+              <a:rPr lang="en-US" sz="2800" b="1" dirty="0">
+                <a:solidFill>
+                  <a:schemeClr val="bg2">
+                    <a:lumMod val="75000"/>
+                  </a:schemeClr>
+                </a:solidFill>
+              </a:rPr>
+              <a:t>Correlation amongst the popularity Spotify attributes</a:t>
+            </a:r>
+            <a:endParaRPr lang="en-US" b="1" dirty="0">
+              <a:solidFill>
+                <a:schemeClr val="bg2">
+                  <a:lumMod val="75000"/>
+                </a:schemeClr>
+              </a:solidFill>
+            </a:endParaRPr>
+          </a:p>
+        </p:txBody>
+      </p:sp>
       <p:pic>
         <p:nvPicPr>
-          <p:cNvPr id="3" name="Picture 2" descr="A screenshot of a cell phone&#10;&#10;Description automatically generated">
+          <p:cNvPr id="10" name="Picture 9" descr="A screenshot of a cell phone&#10;&#10;Description automatically generated">
             <a:extLst>
               <a:ext uri="{FF2B5EF4-FFF2-40B4-BE49-F238E27FC236}">
-                <a16:creationId xmlns:a16="http://schemas.microsoft.com/office/drawing/2014/main" id="{EF9CCB30-5F7E-48F7-A945-9CAA89AAB368}"/>
+                <a16:creationId xmlns:a16="http://schemas.microsoft.com/office/drawing/2014/main" id="{8DF4E518-7882-4D77-8D61-EC39F4954468}"/>
               </a:ext>
             </a:extLst>
           </p:cNvPr>
@@ -10562,7 +10703,7 @@
         </p:blipFill>
         <p:spPr>
           <a:xfrm>
-            <a:off x="3657600" y="1205541"/>
+            <a:off x="3663508" y="1090966"/>
             <a:ext cx="8237152" cy="5491434"/>
           </a:xfrm>
           <a:prstGeom prst="rect">
@@ -10570,147 +10711,6 @@
           </a:prstGeom>
         </p:spPr>
       </p:pic>
-      <p:sp>
-        <p:nvSpPr>
-          <p:cNvPr id="7" name="TextBox 6">
-            <a:extLst>
-              <a:ext uri="{FF2B5EF4-FFF2-40B4-BE49-F238E27FC236}">
-                <a16:creationId xmlns:a16="http://schemas.microsoft.com/office/drawing/2014/main" id="{79A064E4-72F1-41DD-96D9-986D8C1D7D49}"/>
-              </a:ext>
-            </a:extLst>
-          </p:cNvPr>
-          <p:cNvSpPr txBox="1"/>
-          <p:nvPr/>
-        </p:nvSpPr>
-        <p:spPr>
-          <a:xfrm>
-            <a:off x="117138" y="1839884"/>
-            <a:ext cx="3272050" cy="1384995"/>
-          </a:xfrm>
-          <a:prstGeom prst="rect">
-            <a:avLst/>
-          </a:prstGeom>
-          <a:noFill/>
-        </p:spPr>
-        <p:txBody>
-          <a:bodyPr wrap="none" rtlCol="0">
-            <a:spAutoFit/>
-          </a:bodyPr>
-          <a:lstStyle/>
-          <a:p>
-            <a:pPr lvl="0" defTabSz="914400" eaLnBrk="0" fontAlgn="base" hangingPunct="0">
-              <a:spcBef>
-                <a:spcPct val="0"/>
-              </a:spcBef>
-              <a:spcAft>
-                <a:spcPct val="0"/>
-              </a:spcAft>
-            </a:pPr>
-            <a:r>
-              <a:rPr lang="en-US" altLang="en-US" b="1" u="sng" dirty="0"/>
-              <a:t>Popularity:</a:t>
-            </a:r>
-          </a:p>
-          <a:p>
-            <a:pPr lvl="0" defTabSz="914400" eaLnBrk="0" fontAlgn="base" hangingPunct="0">
-              <a:spcBef>
-                <a:spcPct val="0"/>
-              </a:spcBef>
-              <a:spcAft>
-                <a:spcPct val="0"/>
-              </a:spcAft>
-            </a:pPr>
-            <a:r>
-              <a:rPr lang="en-US" altLang="en-US" sz="1600" dirty="0"/>
-              <a:t>-The correlation between both </a:t>
-            </a:r>
-          </a:p>
-          <a:p>
-            <a:pPr lvl="0" defTabSz="914400" eaLnBrk="0" fontAlgn="base" hangingPunct="0">
-              <a:spcBef>
-                <a:spcPct val="0"/>
-              </a:spcBef>
-              <a:spcAft>
-                <a:spcPct val="0"/>
-              </a:spcAft>
-            </a:pPr>
-            <a:r>
-              <a:rPr lang="en-US" altLang="en-US" sz="1600" dirty="0"/>
-              <a:t>factors is -0.33 </a:t>
-            </a:r>
-          </a:p>
-          <a:p>
-            <a:pPr lvl="0" defTabSz="914400" eaLnBrk="0" fontAlgn="base" hangingPunct="0">
-              <a:spcBef>
-                <a:spcPct val="0"/>
-              </a:spcBef>
-              <a:spcAft>
-                <a:spcPct val="0"/>
-              </a:spcAft>
-            </a:pPr>
-            <a:r>
-              <a:rPr lang="en-US" altLang="en-US" sz="1600" dirty="0"/>
-              <a:t>-The p-value is 0.0 </a:t>
-            </a:r>
-          </a:p>
-          <a:p>
-            <a:endParaRPr lang="en-US" dirty="0"/>
-          </a:p>
-        </p:txBody>
-      </p:sp>
-      <p:sp>
-        <p:nvSpPr>
-          <p:cNvPr id="6" name="TextBox 5">
-            <a:extLst>
-              <a:ext uri="{FF2B5EF4-FFF2-40B4-BE49-F238E27FC236}">
-                <a16:creationId xmlns:a16="http://schemas.microsoft.com/office/drawing/2014/main" id="{8FE9A7BD-1EA3-4D7D-9D1C-FE95959C8F20}"/>
-              </a:ext>
-            </a:extLst>
-          </p:cNvPr>
-          <p:cNvSpPr txBox="1"/>
-          <p:nvPr/>
-        </p:nvSpPr>
-        <p:spPr>
-          <a:xfrm>
-            <a:off x="1163782" y="275600"/>
-            <a:ext cx="10912240" cy="523220"/>
-          </a:xfrm>
-          <a:prstGeom prst="rect">
-            <a:avLst/>
-          </a:prstGeom>
-          <a:noFill/>
-          <a:ln w="19050">
-            <a:solidFill>
-              <a:srgbClr val="0070C0"/>
-            </a:solidFill>
-          </a:ln>
-        </p:spPr>
-        <p:txBody>
-          <a:bodyPr wrap="square" rtlCol="0">
-            <a:spAutoFit/>
-          </a:bodyPr>
-          <a:lstStyle/>
-          <a:p>
-            <a:r>
-              <a:rPr lang="en-US" sz="2800" b="1" dirty="0">
-                <a:solidFill>
-                  <a:schemeClr val="bg2">
-                    <a:lumMod val="75000"/>
-                  </a:schemeClr>
-                </a:solidFill>
-              </a:rPr>
-              <a:t>Correlation amongst the popularity Spotify attributes</a:t>
-            </a:r>
-            <a:endParaRPr lang="en-US" b="1" dirty="0">
-              <a:solidFill>
-                <a:schemeClr val="bg2">
-                  <a:lumMod val="75000"/>
-                </a:schemeClr>
-              </a:solidFill>
-            </a:endParaRPr>
-          </a:p>
-        </p:txBody>
-      </p:sp>
     </p:spTree>
     <p:extLst>
       <p:ext uri="{BB962C8B-B14F-4D97-AF65-F5344CB8AC3E}">
@@ -10741,12 +10741,113 @@
           <a:chExt cx="0" cy="0"/>
         </a:xfrm>
       </p:grpSpPr>
+      <p:sp>
+        <p:nvSpPr>
+          <p:cNvPr id="3" name="TextBox 2">
+            <a:extLst>
+              <a:ext uri="{FF2B5EF4-FFF2-40B4-BE49-F238E27FC236}">
+                <a16:creationId xmlns:a16="http://schemas.microsoft.com/office/drawing/2014/main" id="{83578F5B-6C91-49C1-BE40-3948FA0C1054}"/>
+              </a:ext>
+            </a:extLst>
+          </p:cNvPr>
+          <p:cNvSpPr txBox="1"/>
+          <p:nvPr/>
+        </p:nvSpPr>
+        <p:spPr>
+          <a:xfrm>
+            <a:off x="5436984" y="743111"/>
+            <a:ext cx="6494612" cy="1354217"/>
+          </a:xfrm>
+          <a:prstGeom prst="rect">
+            <a:avLst/>
+          </a:prstGeom>
+          <a:noFill/>
+        </p:spPr>
+        <p:txBody>
+          <a:bodyPr wrap="square" rtlCol="0">
+            <a:spAutoFit/>
+          </a:bodyPr>
+          <a:lstStyle/>
+          <a:p>
+            <a:pPr lvl="0" defTabSz="914400" eaLnBrk="0" fontAlgn="base" hangingPunct="0">
+              <a:spcBef>
+                <a:spcPct val="0"/>
+              </a:spcBef>
+              <a:spcAft>
+                <a:spcPct val="0"/>
+              </a:spcAft>
+            </a:pPr>
+            <a:r>
+              <a:rPr lang="en-US" altLang="en-US" sz="2400" dirty="0">
+                <a:latin typeface="Times New Roman" panose="02020603050405020304" pitchFamily="18" charset="0"/>
+                <a:cs typeface="Times New Roman" panose="02020603050405020304" pitchFamily="18" charset="0"/>
+              </a:rPr>
+              <a:t>Danceability, </a:t>
+            </a:r>
+            <a:r>
+              <a:rPr lang="en-US" altLang="en-US" sz="2400" dirty="0" err="1">
+                <a:latin typeface="Times New Roman" panose="02020603050405020304" pitchFamily="18" charset="0"/>
+                <a:cs typeface="Times New Roman" panose="02020603050405020304" pitchFamily="18" charset="0"/>
+              </a:rPr>
+              <a:t>Speechiness</a:t>
+            </a:r>
+            <a:r>
+              <a:rPr lang="en-US" altLang="en-US" sz="2400" dirty="0">
+                <a:latin typeface="Times New Roman" panose="02020603050405020304" pitchFamily="18" charset="0"/>
+                <a:cs typeface="Times New Roman" panose="02020603050405020304" pitchFamily="18" charset="0"/>
+              </a:rPr>
+              <a:t>, and Valence</a:t>
+            </a:r>
+          </a:p>
+          <a:p>
+            <a:pPr lvl="0" defTabSz="914400" eaLnBrk="0" fontAlgn="base" hangingPunct="0">
+              <a:spcBef>
+                <a:spcPct val="0"/>
+              </a:spcBef>
+              <a:spcAft>
+                <a:spcPct val="0"/>
+              </a:spcAft>
+            </a:pPr>
+            <a:r>
+              <a:rPr lang="en-US" altLang="en-US" sz="2000" dirty="0">
+                <a:latin typeface="Times New Roman" panose="02020603050405020304" pitchFamily="18" charset="0"/>
+                <a:cs typeface="Times New Roman" panose="02020603050405020304" pitchFamily="18" charset="0"/>
+              </a:rPr>
+              <a:t>- The correlation between both factors is -0.05 </a:t>
+            </a:r>
+          </a:p>
+          <a:p>
+            <a:pPr lvl="0" defTabSz="914400" eaLnBrk="0" fontAlgn="base" hangingPunct="0">
+              <a:spcBef>
+                <a:spcPct val="0"/>
+              </a:spcBef>
+              <a:spcAft>
+                <a:spcPct val="0"/>
+              </a:spcAft>
+            </a:pPr>
+            <a:r>
+              <a:rPr lang="en-US" altLang="en-US" sz="2000" dirty="0">
+                <a:latin typeface="Times New Roman" panose="02020603050405020304" pitchFamily="18" charset="0"/>
+                <a:cs typeface="Times New Roman" panose="02020603050405020304" pitchFamily="18" charset="0"/>
+              </a:rPr>
+              <a:t>- The p-value is 0.0 </a:t>
+            </a:r>
+            <a:endParaRPr lang="en-US" altLang="en-US" sz="4400" dirty="0">
+              <a:latin typeface="Times New Roman" panose="02020603050405020304" pitchFamily="18" charset="0"/>
+              <a:cs typeface="Times New Roman" panose="02020603050405020304" pitchFamily="18" charset="0"/>
+            </a:endParaRPr>
+          </a:p>
+          <a:p>
+            <a:endParaRPr lang="en-US" dirty="0"/>
+          </a:p>
+        </p:txBody>
+      </p:sp>
       <p:pic>
         <p:nvPicPr>
-          <p:cNvPr id="2" name="Picture 1" descr="A screenshot of a cell phone&#10;&#10;Description automatically generated">
+          <p:cNvPr id="7" name="Picture 6" descr="A screenshot of a cell phone&#10;&#10;Description automatically generated">
             <a:extLst>
               <a:ext uri="{FF2B5EF4-FFF2-40B4-BE49-F238E27FC236}">
-                <a16:creationId xmlns:a16="http://schemas.microsoft.com/office/drawing/2014/main" id="{1D043B19-414A-4F6D-8B2F-5871F608D7FB}"/>
+                <a16:creationId xmlns:a16="http://schemas.microsoft.com/office/drawing/2014/main" id="{6452DC82-4028-4920-85E6-10CA347A2DA0}"/>
               </a:ext>
             </a:extLst>
           </p:cNvPr>
@@ -10763,121 +10864,20 @@
         </p:blipFill>
         <p:spPr>
           <a:xfrm>
-            <a:off x="6359236" y="3368408"/>
-            <a:ext cx="4650108" cy="3100072"/>
+            <a:off x="379088" y="155413"/>
+            <a:ext cx="4631076" cy="3087384"/>
           </a:xfrm>
           <a:prstGeom prst="rect">
             <a:avLst/>
           </a:prstGeom>
         </p:spPr>
       </p:pic>
-      <p:sp>
-        <p:nvSpPr>
-          <p:cNvPr id="3" name="TextBox 2">
+      <p:pic>
+        <p:nvPicPr>
+          <p:cNvPr id="9" name="Picture 8" descr="A screenshot of a cell phone&#10;&#10;Description automatically generated">
             <a:extLst>
               <a:ext uri="{FF2B5EF4-FFF2-40B4-BE49-F238E27FC236}">
-                <a16:creationId xmlns:a16="http://schemas.microsoft.com/office/drawing/2014/main" id="{83578F5B-6C91-49C1-BE40-3948FA0C1054}"/>
-              </a:ext>
-            </a:extLst>
-          </p:cNvPr>
-          <p:cNvSpPr txBox="1"/>
-          <p:nvPr/>
-        </p:nvSpPr>
-        <p:spPr>
-          <a:xfrm>
-            <a:off x="5436984" y="743111"/>
-            <a:ext cx="6494612" cy="1354217"/>
-          </a:xfrm>
-          <a:prstGeom prst="rect">
-            <a:avLst/>
-          </a:prstGeom>
-          <a:noFill/>
-        </p:spPr>
-        <p:txBody>
-          <a:bodyPr wrap="square" rtlCol="0">
-            <a:spAutoFit/>
-          </a:bodyPr>
-          <a:lstStyle/>
-          <a:p>
-            <a:pPr lvl="0" defTabSz="914400" eaLnBrk="0" fontAlgn="base" hangingPunct="0">
-              <a:spcBef>
-                <a:spcPct val="0"/>
-              </a:spcBef>
-              <a:spcAft>
-                <a:spcPct val="0"/>
-              </a:spcAft>
-            </a:pPr>
-            <a:r>
-              <a:rPr lang="en-US" altLang="en-US" sz="2400" dirty="0">
-                <a:latin typeface="Times New Roman" panose="02020603050405020304" pitchFamily="18" charset="0"/>
-                <a:cs typeface="Times New Roman" panose="02020603050405020304" pitchFamily="18" charset="0"/>
-              </a:rPr>
-              <a:t>Danceability, </a:t>
-            </a:r>
-            <a:r>
-              <a:rPr lang="en-US" altLang="en-US" sz="2400" dirty="0" err="1">
-                <a:latin typeface="Times New Roman" panose="02020603050405020304" pitchFamily="18" charset="0"/>
-                <a:cs typeface="Times New Roman" panose="02020603050405020304" pitchFamily="18" charset="0"/>
-              </a:rPr>
-              <a:t>Speechiness</a:t>
-            </a:r>
-            <a:r>
-              <a:rPr lang="en-US" altLang="en-US" sz="2400" dirty="0">
-                <a:latin typeface="Times New Roman" panose="02020603050405020304" pitchFamily="18" charset="0"/>
-                <a:cs typeface="Times New Roman" panose="02020603050405020304" pitchFamily="18" charset="0"/>
-              </a:rPr>
-              <a:t>, and Valence</a:t>
-            </a:r>
-          </a:p>
-          <a:p>
-            <a:pPr lvl="0" defTabSz="914400" eaLnBrk="0" fontAlgn="base" hangingPunct="0">
-              <a:spcBef>
-                <a:spcPct val="0"/>
-              </a:spcBef>
-              <a:spcAft>
-                <a:spcPct val="0"/>
-              </a:spcAft>
-            </a:pPr>
-            <a:r>
-              <a:rPr lang="en-US" altLang="en-US" sz="2000" dirty="0">
-                <a:latin typeface="Times New Roman" panose="02020603050405020304" pitchFamily="18" charset="0"/>
-                <a:cs typeface="Times New Roman" panose="02020603050405020304" pitchFamily="18" charset="0"/>
-              </a:rPr>
-              <a:t>- The correlation between both factors is -0.05 </a:t>
-            </a:r>
-          </a:p>
-          <a:p>
-            <a:pPr lvl="0" defTabSz="914400" eaLnBrk="0" fontAlgn="base" hangingPunct="0">
-              <a:spcBef>
-                <a:spcPct val="0"/>
-              </a:spcBef>
-              <a:spcAft>
-                <a:spcPct val="0"/>
-              </a:spcAft>
-            </a:pPr>
-            <a:r>
-              <a:rPr lang="en-US" altLang="en-US" sz="2000" dirty="0">
-                <a:latin typeface="Times New Roman" panose="02020603050405020304" pitchFamily="18" charset="0"/>
-                <a:cs typeface="Times New Roman" panose="02020603050405020304" pitchFamily="18" charset="0"/>
-              </a:rPr>
-              <a:t>- The p-value is 0.0 </a:t>
-            </a:r>
-            <a:endParaRPr lang="en-US" altLang="en-US" sz="4400" dirty="0">
-              <a:latin typeface="Times New Roman" panose="02020603050405020304" pitchFamily="18" charset="0"/>
-              <a:cs typeface="Times New Roman" panose="02020603050405020304" pitchFamily="18" charset="0"/>
-            </a:endParaRPr>
-          </a:p>
-          <a:p>
-            <a:endParaRPr lang="en-US" dirty="0"/>
-          </a:p>
-        </p:txBody>
-      </p:sp>
-      <p:pic>
-        <p:nvPicPr>
-          <p:cNvPr id="4" name="Picture 3" descr="A screenshot of a cell phone&#10;&#10;Description automatically generated">
-            <a:extLst>
-              <a:ext uri="{FF2B5EF4-FFF2-40B4-BE49-F238E27FC236}">
-                <a16:creationId xmlns:a16="http://schemas.microsoft.com/office/drawing/2014/main" id="{4CB2CED7-BB50-4D3D-AB9B-3CB428036DA0}"/>
+                <a16:creationId xmlns:a16="http://schemas.microsoft.com/office/drawing/2014/main" id="{B4A76F43-AB20-4B09-ABAF-2CC673650A1C}"/>
               </a:ext>
             </a:extLst>
           </p:cNvPr>
@@ -10894,7 +10894,7 @@
         </p:blipFill>
         <p:spPr>
           <a:xfrm>
-            <a:off x="379088" y="3394657"/>
+            <a:off x="379088" y="3502505"/>
             <a:ext cx="4631076" cy="3087384"/>
           </a:xfrm>
           <a:prstGeom prst="rect">
@@ -10904,10 +10904,10 @@
       </p:pic>
       <p:pic>
         <p:nvPicPr>
-          <p:cNvPr id="6" name="Picture 5" descr="A screenshot of a cell phone&#10;&#10;Description automatically generated">
+          <p:cNvPr id="11" name="Picture 10" descr="A screenshot of a cell phone&#10;&#10;Description automatically generated">
             <a:extLst>
               <a:ext uri="{FF2B5EF4-FFF2-40B4-BE49-F238E27FC236}">
-                <a16:creationId xmlns:a16="http://schemas.microsoft.com/office/drawing/2014/main" id="{14562FD9-74DC-49F3-A93B-058AB29E615C}"/>
+                <a16:creationId xmlns:a16="http://schemas.microsoft.com/office/drawing/2014/main" id="{8AE7FC14-BF97-44EB-8F31-29EF9F2F6863}"/>
               </a:ext>
             </a:extLst>
           </p:cNvPr>
@@ -10924,7 +10924,7 @@
         </p:blipFill>
         <p:spPr>
           <a:xfrm>
-            <a:off x="379088" y="168559"/>
+            <a:off x="5790575" y="3502505"/>
             <a:ext cx="4631076" cy="3087384"/>
           </a:xfrm>
           <a:prstGeom prst="rect">
@@ -11227,10 +11227,10 @@
       </p:grpSpPr>
       <p:pic>
         <p:nvPicPr>
-          <p:cNvPr id="7" name="Picture 6" descr="A screenshot of a cell phone&#10;&#10;Description automatically generated">
+          <p:cNvPr id="4" name="Picture 3" descr="A screenshot of a cell phone&#10;&#10;Description automatically generated">
             <a:extLst>
               <a:ext uri="{FF2B5EF4-FFF2-40B4-BE49-F238E27FC236}">
-                <a16:creationId xmlns:a16="http://schemas.microsoft.com/office/drawing/2014/main" id="{FE335714-B7A1-4EB5-A22F-90476E5CBF4B}"/>
+                <a16:creationId xmlns:a16="http://schemas.microsoft.com/office/drawing/2014/main" id="{93A586D7-DCCF-4BC1-A146-61329DF87807}"/>
               </a:ext>
             </a:extLst>
           </p:cNvPr>
@@ -11247,8 +11247,8 @@
         </p:blipFill>
         <p:spPr>
           <a:xfrm>
-            <a:off x="3296757" y="3674225"/>
-            <a:ext cx="5487650" cy="2997156"/>
+            <a:off x="290321" y="186619"/>
+            <a:ext cx="5487650" cy="3658433"/>
           </a:xfrm>
           <a:prstGeom prst="rect">
             <a:avLst/>
@@ -11257,10 +11257,10 @@
       </p:pic>
       <p:pic>
         <p:nvPicPr>
-          <p:cNvPr id="3" name="Picture 2" descr="A screenshot of a cell phone&#10;&#10;Description automatically generated">
+          <p:cNvPr id="8" name="Picture 7" descr="A screenshot of a cell phone&#10;&#10;Description automatically generated">
             <a:extLst>
               <a:ext uri="{FF2B5EF4-FFF2-40B4-BE49-F238E27FC236}">
-                <a16:creationId xmlns:a16="http://schemas.microsoft.com/office/drawing/2014/main" id="{B3639C4C-9112-47E2-8DFE-F3CF847D91E6}"/>
+                <a16:creationId xmlns:a16="http://schemas.microsoft.com/office/drawing/2014/main" id="{882BC318-B2FF-440C-9FB6-042454E127E2}"/>
               </a:ext>
             </a:extLst>
           </p:cNvPr>
@@ -11277,7 +11277,7 @@
         </p:blipFill>
         <p:spPr>
           <a:xfrm>
-            <a:off x="318030" y="186619"/>
+            <a:off x="6303193" y="191259"/>
             <a:ext cx="5487650" cy="3658433"/>
           </a:xfrm>
           <a:prstGeom prst="rect">
@@ -11287,10 +11287,10 @@
       </p:pic>
       <p:pic>
         <p:nvPicPr>
-          <p:cNvPr id="5" name="Picture 4" descr="A screenshot of a cell phone&#10;&#10;Description automatically generated">
+          <p:cNvPr id="10" name="Picture 9" descr="A screenshot of a cell phone&#10;&#10;Description automatically generated">
             <a:extLst>
               <a:ext uri="{FF2B5EF4-FFF2-40B4-BE49-F238E27FC236}">
-                <a16:creationId xmlns:a16="http://schemas.microsoft.com/office/drawing/2014/main" id="{7C2059AB-7C43-4F8F-8D46-FB4A873E6A3B}"/>
+                <a16:creationId xmlns:a16="http://schemas.microsoft.com/office/drawing/2014/main" id="{BAFEE906-E648-4995-BEEB-48FC87E88C1F}"/>
               </a:ext>
             </a:extLst>
           </p:cNvPr>
@@ -11307,8 +11307,8 @@
         </p:blipFill>
         <p:spPr>
           <a:xfrm>
-            <a:off x="6096000" y="186619"/>
-            <a:ext cx="5487650" cy="3658433"/>
+            <a:off x="3823229" y="3624856"/>
+            <a:ext cx="4849716" cy="3233144"/>
           </a:xfrm>
           <a:prstGeom prst="rect">
             <a:avLst/>

</xml_diff>